<commit_message>
slides and quant image
</commit_message>
<xml_diff>
--- a/KDD-2024/Slides/part4_feature_based.pptx
+++ b/KDD-2024/Slides/part4_feature_based.pptx
@@ -5,25 +5,24 @@
     <p:sldMasterId id="2147483659" r:id="rId1"/>
   </p:sldMasterIdLst>
   <p:notesMasterIdLst>
-    <p:notesMasterId r:id="rId18"/>
+    <p:notesMasterId r:id="rId17"/>
   </p:notesMasterIdLst>
   <p:sldIdLst>
     <p:sldId id="256" r:id="rId2"/>
-    <p:sldId id="337" r:id="rId3"/>
-    <p:sldId id="351" r:id="rId4"/>
-    <p:sldId id="451" r:id="rId5"/>
-    <p:sldId id="439" r:id="rId6"/>
-    <p:sldId id="453" r:id="rId7"/>
-    <p:sldId id="440" r:id="rId8"/>
-    <p:sldId id="448" r:id="rId9"/>
-    <p:sldId id="450" r:id="rId10"/>
-    <p:sldId id="449" r:id="rId11"/>
-    <p:sldId id="358" r:id="rId12"/>
-    <p:sldId id="442" r:id="rId13"/>
-    <p:sldId id="443" r:id="rId14"/>
-    <p:sldId id="441" r:id="rId15"/>
-    <p:sldId id="452" r:id="rId16"/>
-    <p:sldId id="265" r:id="rId17"/>
+    <p:sldId id="351" r:id="rId3"/>
+    <p:sldId id="451" r:id="rId4"/>
+    <p:sldId id="439" r:id="rId5"/>
+    <p:sldId id="453" r:id="rId6"/>
+    <p:sldId id="440" r:id="rId7"/>
+    <p:sldId id="448" r:id="rId8"/>
+    <p:sldId id="450" r:id="rId9"/>
+    <p:sldId id="449" r:id="rId10"/>
+    <p:sldId id="358" r:id="rId11"/>
+    <p:sldId id="442" r:id="rId12"/>
+    <p:sldId id="443" r:id="rId13"/>
+    <p:sldId id="441" r:id="rId14"/>
+    <p:sldId id="452" r:id="rId15"/>
+    <p:sldId id="265" r:id="rId16"/>
   </p:sldIdLst>
   <p:sldSz cx="12192000" cy="6858000"/>
   <p:notesSz cx="6858000" cy="1114425"/>
@@ -895,7 +894,7 @@
     </p:spTree>
     <p:extLst>
       <p:ext uri="{BB962C8B-B14F-4D97-AF65-F5344CB8AC3E}">
-        <p14:creationId xmlns:p14="http://schemas.microsoft.com/office/powerpoint/2010/main" val="2292001981"/>
+        <p14:creationId xmlns:p14="http://schemas.microsoft.com/office/powerpoint/2010/main" val="96696920"/>
       </p:ext>
     </p:extLst>
   </p:cSld>
@@ -949,7 +948,6 @@
           <a:bodyPr/>
           <a:lstStyle/>
           <a:p>
-            <a:pPr marL="457200" indent="-298450"/>
             <a:endParaRPr lang="en-GB" dirty="0"/>
           </a:p>
         </p:txBody>
@@ -957,7 +955,7 @@
     </p:spTree>
     <p:extLst>
       <p:ext uri="{BB962C8B-B14F-4D97-AF65-F5344CB8AC3E}">
-        <p14:creationId xmlns:p14="http://schemas.microsoft.com/office/powerpoint/2010/main" val="96696920"/>
+        <p14:creationId xmlns:p14="http://schemas.microsoft.com/office/powerpoint/2010/main" val="4006884163"/>
       </p:ext>
     </p:extLst>
   </p:cSld>
@@ -1018,7 +1016,7 @@
     </p:spTree>
     <p:extLst>
       <p:ext uri="{BB962C8B-B14F-4D97-AF65-F5344CB8AC3E}">
-        <p14:creationId xmlns:p14="http://schemas.microsoft.com/office/powerpoint/2010/main" val="4006884163"/>
+        <p14:creationId xmlns:p14="http://schemas.microsoft.com/office/powerpoint/2010/main" val="4100088519"/>
       </p:ext>
     </p:extLst>
   </p:cSld>
@@ -1029,67 +1027,6 @@
 </file>
 
 <file path=ppt/notesSlides/notesSlide13.xml><?xml version="1.0" encoding="utf-8"?>
-<p:notes xmlns:a="http://schemas.openxmlformats.org/drawingml/2006/main" xmlns:r="http://schemas.openxmlformats.org/officeDocument/2006/relationships" xmlns:p="http://schemas.openxmlformats.org/presentationml/2006/main">
-  <p:cSld>
-    <p:spTree>
-      <p:nvGrpSpPr>
-        <p:cNvPr id="1" name=""/>
-        <p:cNvGrpSpPr/>
-        <p:nvPr/>
-      </p:nvGrpSpPr>
-      <p:grpSpPr>
-        <a:xfrm>
-          <a:off x="0" y="0"/>
-          <a:ext cx="0" cy="0"/>
-          <a:chOff x="0" y="0"/>
-          <a:chExt cx="0" cy="0"/>
-        </a:xfrm>
-      </p:grpSpPr>
-      <p:sp>
-        <p:nvSpPr>
-          <p:cNvPr id="2" name="Slide Image Placeholder 1"/>
-          <p:cNvSpPr>
-            <a:spLocks noGrp="1" noRot="1" noChangeAspect="1"/>
-          </p:cNvSpPr>
-          <p:nvPr>
-            <p:ph type="sldImg"/>
-          </p:nvPr>
-        </p:nvSpPr>
-        <p:spPr/>
-      </p:sp>
-      <p:sp>
-        <p:nvSpPr>
-          <p:cNvPr id="3" name="Notes Placeholder 2"/>
-          <p:cNvSpPr>
-            <a:spLocks noGrp="1"/>
-          </p:cNvSpPr>
-          <p:nvPr>
-            <p:ph type="body" idx="1"/>
-          </p:nvPr>
-        </p:nvSpPr>
-        <p:spPr/>
-        <p:txBody>
-          <a:bodyPr/>
-          <a:lstStyle/>
-          <a:p>
-            <a:endParaRPr lang="en-GB" dirty="0"/>
-          </a:p>
-        </p:txBody>
-      </p:sp>
-    </p:spTree>
-    <p:extLst>
-      <p:ext uri="{BB962C8B-B14F-4D97-AF65-F5344CB8AC3E}">
-        <p14:creationId xmlns:p14="http://schemas.microsoft.com/office/powerpoint/2010/main" val="4100088519"/>
-      </p:ext>
-    </p:extLst>
-  </p:cSld>
-  <p:clrMapOvr>
-    <a:masterClrMapping/>
-  </p:clrMapOvr>
-</p:notes>
-</file>
-
-<file path=ppt/notesSlides/notesSlide14.xml><?xml version="1.0" encoding="utf-8"?>
 <p:notes xmlns:a="http://schemas.openxmlformats.org/drawingml/2006/main" xmlns:r="http://schemas.openxmlformats.org/officeDocument/2006/relationships" xmlns:p="http://schemas.openxmlformats.org/presentationml/2006/main" showMasterSp="0" showMasterPhAnim="0">
   <p:cSld>
     <p:spTree>
@@ -1237,7 +1174,7 @@
     </p:spTree>
     <p:extLst>
       <p:ext uri="{BB962C8B-B14F-4D97-AF65-F5344CB8AC3E}">
-        <p14:creationId xmlns:p14="http://schemas.microsoft.com/office/powerpoint/2010/main" val="1441073430"/>
+        <p14:creationId xmlns:p14="http://schemas.microsoft.com/office/powerpoint/2010/main" val="3423971097"/>
       </p:ext>
     </p:extLst>
   </p:cSld>
@@ -1299,7 +1236,7 @@
     </p:spTree>
     <p:extLst>
       <p:ext uri="{BB962C8B-B14F-4D97-AF65-F5344CB8AC3E}">
-        <p14:creationId xmlns:p14="http://schemas.microsoft.com/office/powerpoint/2010/main" val="3423971097"/>
+        <p14:creationId xmlns:p14="http://schemas.microsoft.com/office/powerpoint/2010/main" val="1437090905"/>
       </p:ext>
     </p:extLst>
   </p:cSld>
@@ -1353,7 +1290,9 @@
           <a:bodyPr/>
           <a:lstStyle/>
           <a:p>
-            <a:pPr marL="457200" indent="-298450"/>
+            <a:pPr marL="158750" indent="0">
+              <a:buNone/>
+            </a:pPr>
             <a:endParaRPr lang="en-GB" dirty="0"/>
           </a:p>
         </p:txBody>
@@ -1361,7 +1300,7 @@
     </p:spTree>
     <p:extLst>
       <p:ext uri="{BB962C8B-B14F-4D97-AF65-F5344CB8AC3E}">
-        <p14:creationId xmlns:p14="http://schemas.microsoft.com/office/powerpoint/2010/main" val="1437090905"/>
+        <p14:creationId xmlns:p14="http://schemas.microsoft.com/office/powerpoint/2010/main" val="10915162"/>
       </p:ext>
     </p:extLst>
   </p:cSld>
@@ -1415,9 +1354,6 @@
           <a:bodyPr/>
           <a:lstStyle/>
           <a:p>
-            <a:pPr marL="158750" indent="0">
-              <a:buNone/>
-            </a:pPr>
             <a:endParaRPr lang="en-GB" dirty="0"/>
           </a:p>
         </p:txBody>
@@ -1425,7 +1361,7 @@
     </p:spTree>
     <p:extLst>
       <p:ext uri="{BB962C8B-B14F-4D97-AF65-F5344CB8AC3E}">
-        <p14:creationId xmlns:p14="http://schemas.microsoft.com/office/powerpoint/2010/main" val="10915162"/>
+        <p14:creationId xmlns:p14="http://schemas.microsoft.com/office/powerpoint/2010/main" val="1523493122"/>
       </p:ext>
     </p:extLst>
   </p:cSld>
@@ -1486,7 +1422,7 @@
     </p:spTree>
     <p:extLst>
       <p:ext uri="{BB962C8B-B14F-4D97-AF65-F5344CB8AC3E}">
-        <p14:creationId xmlns:p14="http://schemas.microsoft.com/office/powerpoint/2010/main" val="1523493122"/>
+        <p14:creationId xmlns:p14="http://schemas.microsoft.com/office/powerpoint/2010/main" val="3164069869"/>
       </p:ext>
     </p:extLst>
   </p:cSld>
@@ -1540,6 +1476,7 @@
           <a:bodyPr/>
           <a:lstStyle/>
           <a:p>
+            <a:pPr marL="457200" indent="-298450"/>
             <a:endParaRPr lang="en-GB" dirty="0"/>
           </a:p>
         </p:txBody>
@@ -1547,7 +1484,7 @@
     </p:spTree>
     <p:extLst>
       <p:ext uri="{BB962C8B-B14F-4D97-AF65-F5344CB8AC3E}">
-        <p14:creationId xmlns:p14="http://schemas.microsoft.com/office/powerpoint/2010/main" val="3164069869"/>
+        <p14:creationId xmlns:p14="http://schemas.microsoft.com/office/powerpoint/2010/main" val="4191338137"/>
       </p:ext>
     </p:extLst>
   </p:cSld>
@@ -1601,7 +1538,6 @@
           <a:bodyPr/>
           <a:lstStyle/>
           <a:p>
-            <a:pPr marL="457200" indent="-298450"/>
             <a:endParaRPr lang="en-GB" dirty="0"/>
           </a:p>
         </p:txBody>
@@ -1609,7 +1545,7 @@
     </p:spTree>
     <p:extLst>
       <p:ext uri="{BB962C8B-B14F-4D97-AF65-F5344CB8AC3E}">
-        <p14:creationId xmlns:p14="http://schemas.microsoft.com/office/powerpoint/2010/main" val="4191338137"/>
+        <p14:creationId xmlns:p14="http://schemas.microsoft.com/office/powerpoint/2010/main" val="3458466144"/>
       </p:ext>
     </p:extLst>
   </p:cSld>
@@ -1663,6 +1599,7 @@
           <a:bodyPr/>
           <a:lstStyle/>
           <a:p>
+            <a:pPr marL="457200" indent="-298450"/>
             <a:endParaRPr lang="en-GB" dirty="0"/>
           </a:p>
         </p:txBody>
@@ -1670,7 +1607,7 @@
     </p:spTree>
     <p:extLst>
       <p:ext uri="{BB962C8B-B14F-4D97-AF65-F5344CB8AC3E}">
-        <p14:creationId xmlns:p14="http://schemas.microsoft.com/office/powerpoint/2010/main" val="3458466144"/>
+        <p14:creationId xmlns:p14="http://schemas.microsoft.com/office/powerpoint/2010/main" val="2292001981"/>
       </p:ext>
     </p:extLst>
   </p:cSld>
@@ -3635,558 +3572,6 @@
       </p:grpSpPr>
       <p:sp>
         <p:nvSpPr>
-          <p:cNvPr id="2" name="Text Placeholder 1">
-            <a:extLst>
-              <a:ext uri="{FF2B5EF4-FFF2-40B4-BE49-F238E27FC236}">
-                <a16:creationId xmlns:a16="http://schemas.microsoft.com/office/drawing/2014/main" id="{4E2E7867-6C62-6814-B5A6-64F1AF853927}"/>
-              </a:ext>
-            </a:extLst>
-          </p:cNvPr>
-          <p:cNvSpPr>
-            <a:spLocks noGrp="1"/>
-          </p:cNvSpPr>
-          <p:nvPr>
-            <p:ph type="body" idx="1"/>
-          </p:nvPr>
-        </p:nvSpPr>
-        <p:spPr>
-          <a:xfrm>
-            <a:off x="549712" y="1514121"/>
-            <a:ext cx="5680400" cy="4555200"/>
-          </a:xfrm>
-        </p:spPr>
-        <p:txBody>
-          <a:bodyPr/>
-          <a:lstStyle/>
-          <a:p>
-            <a:pPr marL="114300" indent="0">
-              <a:buNone/>
-            </a:pPr>
-            <a:r>
-              <a:rPr lang="en-GB" sz="2000" b="1" dirty="0" err="1"/>
-              <a:t>TSFresh</a:t>
-            </a:r>
-            <a:r>
-              <a:rPr lang="en-GB" sz="2000" b="1" dirty="0"/>
-              <a:t> feature set</a:t>
-            </a:r>
-          </a:p>
-          <a:p>
-            <a:pPr marL="114300" indent="0">
-              <a:buFont typeface="Arial"/>
-              <a:buNone/>
-            </a:pPr>
-            <a:endParaRPr lang="en-GB" sz="2000" b="1" dirty="0"/>
-          </a:p>
-          <a:p>
-            <a:pPr marL="114300" indent="0">
-              <a:buFont typeface="Arial"/>
-              <a:buNone/>
-            </a:pPr>
-            <a:endParaRPr lang="en-GB" sz="2000" b="1" dirty="0"/>
-          </a:p>
-          <a:p>
-            <a:pPr marL="114300" indent="0">
-              <a:buFont typeface="Arial"/>
-              <a:buNone/>
-            </a:pPr>
-            <a:r>
-              <a:rPr lang="en-GB" sz="2000" dirty="0"/>
-              <a:t>Just under 800 features (no features selection).</a:t>
-            </a:r>
-          </a:p>
-          <a:p>
-            <a:pPr marL="114300" indent="0">
-              <a:buFont typeface="Arial"/>
-              <a:buNone/>
-            </a:pPr>
-            <a:endParaRPr lang="en-GB" sz="2000" dirty="0"/>
-          </a:p>
-          <a:p>
-            <a:pPr marL="114300" indent="0">
-              <a:buFont typeface="Arial"/>
-              <a:buNone/>
-            </a:pPr>
-            <a:r>
-              <a:rPr lang="en-GB" sz="2000" dirty="0"/>
-              <a:t>Implemented in Python.</a:t>
-            </a:r>
-          </a:p>
-          <a:p>
-            <a:pPr marL="114300" indent="0">
-              <a:buFont typeface="Arial"/>
-              <a:buNone/>
-            </a:pPr>
-            <a:endParaRPr lang="en-GB" sz="2000" dirty="0"/>
-          </a:p>
-          <a:p>
-            <a:pPr marL="114300" indent="0">
-              <a:buFont typeface="Arial"/>
-              <a:buNone/>
-            </a:pPr>
-            <a:r>
-              <a:rPr lang="en-GB" sz="2000" dirty="0"/>
-              <a:t>One of the more popular feature sets (Over 8000 GitHub start and 1000 citations)</a:t>
-            </a:r>
-          </a:p>
-          <a:p>
-            <a:pPr marL="114300" indent="0">
-              <a:buFont typeface="Arial"/>
-              <a:buNone/>
-            </a:pPr>
-            <a:endParaRPr lang="en-GB" sz="2000" dirty="0"/>
-          </a:p>
-          <a:p>
-            <a:pPr marL="114300" indent="0">
-              <a:buFont typeface="Arial"/>
-              <a:buNone/>
-            </a:pPr>
-            <a:endParaRPr lang="en-GB" sz="2000" dirty="0"/>
-          </a:p>
-          <a:p>
-            <a:pPr marL="114300" indent="0">
-              <a:buFont typeface="Arial"/>
-              <a:buNone/>
-            </a:pPr>
-            <a:r>
-              <a:rPr lang="en-GB" sz="2000" i="1" u="sng" dirty="0"/>
-              <a:t>https://github.com/blue-yonder/tsfresh</a:t>
-            </a:r>
-          </a:p>
-          <a:p>
-            <a:pPr marL="114300" indent="0">
-              <a:buNone/>
-            </a:pPr>
-            <a:endParaRPr lang="en-GB" sz="2000" dirty="0"/>
-          </a:p>
-        </p:txBody>
-      </p:sp>
-      <p:sp>
-        <p:nvSpPr>
-          <p:cNvPr id="3" name="Title 2">
-            <a:extLst>
-              <a:ext uri="{FF2B5EF4-FFF2-40B4-BE49-F238E27FC236}">
-                <a16:creationId xmlns:a16="http://schemas.microsoft.com/office/drawing/2014/main" id="{899533FC-BE2F-24D0-E4BA-AC770051A2B3}"/>
-              </a:ext>
-            </a:extLst>
-          </p:cNvPr>
-          <p:cNvSpPr>
-            <a:spLocks noGrp="1"/>
-          </p:cNvSpPr>
-          <p:nvPr>
-            <p:ph type="title"/>
-          </p:nvPr>
-        </p:nvSpPr>
-        <p:spPr/>
-        <p:txBody>
-          <a:bodyPr/>
-          <a:lstStyle/>
-          <a:p>
-            <a:pPr marL="114300" indent="0">
-              <a:buFont typeface="Arial"/>
-              <a:buNone/>
-            </a:pPr>
-            <a:r>
-              <a:rPr lang="en-GB" sz="2400" b="1" dirty="0"/>
-              <a:t>Time Series Feature extraction based on scalable hypothesis tests (</a:t>
-            </a:r>
-            <a:r>
-              <a:rPr lang="en-GB" sz="2400" b="1" dirty="0" err="1"/>
-              <a:t>TSFresh</a:t>
-            </a:r>
-            <a:r>
-              <a:rPr lang="en-GB" sz="2400" b="1" dirty="0"/>
-              <a:t>)</a:t>
-            </a:r>
-          </a:p>
-        </p:txBody>
-      </p:sp>
-      <p:pic>
-        <p:nvPicPr>
-          <p:cNvPr id="5" name="Picture 4">
-            <a:extLst>
-              <a:ext uri="{FF2B5EF4-FFF2-40B4-BE49-F238E27FC236}">
-                <a16:creationId xmlns:a16="http://schemas.microsoft.com/office/drawing/2014/main" id="{6A382F17-A944-C9CE-4792-2AD38277D8C0}"/>
-              </a:ext>
-            </a:extLst>
-          </p:cNvPr>
-          <p:cNvPicPr>
-            <a:picLocks noChangeAspect="1"/>
-          </p:cNvPicPr>
-          <p:nvPr/>
-        </p:nvPicPr>
-        <p:blipFill>
-          <a:blip r:embed="rId3"/>
-          <a:stretch>
-            <a:fillRect/>
-          </a:stretch>
-        </p:blipFill>
-        <p:spPr>
-          <a:xfrm>
-            <a:off x="7058586" y="2228489"/>
-            <a:ext cx="3931205" cy="2401021"/>
-          </a:xfrm>
-          <a:prstGeom prst="rect">
-            <a:avLst/>
-          </a:prstGeom>
-        </p:spPr>
-      </p:pic>
-      <p:sp>
-        <p:nvSpPr>
-          <p:cNvPr id="4" name="Text Placeholder 1">
-            <a:extLst>
-              <a:ext uri="{FF2B5EF4-FFF2-40B4-BE49-F238E27FC236}">
-                <a16:creationId xmlns:a16="http://schemas.microsoft.com/office/drawing/2014/main" id="{D5EE724A-60FD-D922-453C-9202E32FECE8}"/>
-              </a:ext>
-            </a:extLst>
-          </p:cNvPr>
-          <p:cNvSpPr txBox="1">
-            <a:spLocks/>
-          </p:cNvSpPr>
-          <p:nvPr/>
-        </p:nvSpPr>
-        <p:spPr>
-          <a:xfrm>
-            <a:off x="208336" y="6069321"/>
-            <a:ext cx="11568064" cy="597399"/>
-          </a:xfrm>
-          <a:prstGeom prst="rect">
-            <a:avLst/>
-          </a:prstGeom>
-        </p:spPr>
-        <p:txBody>
-          <a:bodyPr spcFirstLastPara="1" wrap="square" lIns="91425" tIns="91425" rIns="91425" bIns="91425" anchor="t" anchorCtr="0"/>
-          <a:lstStyle>
-            <a:defPPr marR="0" lvl="0" algn="l" rtl="0">
-              <a:lnSpc>
-                <a:spcPct val="100000"/>
-              </a:lnSpc>
-              <a:spcBef>
-                <a:spcPts val="0"/>
-              </a:spcBef>
-              <a:spcAft>
-                <a:spcPts val="0"/>
-              </a:spcAft>
-            </a:defPPr>
-            <a:lvl1pPr marL="457200" marR="0" lvl="0" indent="-342900" algn="l" rtl="0">
-              <a:lnSpc>
-                <a:spcPct val="100000"/>
-              </a:lnSpc>
-              <a:spcBef>
-                <a:spcPts val="0"/>
-              </a:spcBef>
-              <a:spcAft>
-                <a:spcPts val="0"/>
-              </a:spcAft>
-              <a:buClr>
-                <a:srgbClr val="500064"/>
-              </a:buClr>
-              <a:buSzPts val="1800"/>
-              <a:buFont typeface="Arial"/>
-              <a:buChar char="●"/>
-              <a:defRPr sz="1800" b="0" i="0" u="none" strike="noStrike" cap="none">
-                <a:solidFill>
-                  <a:schemeClr val="tx1"/>
-                </a:solidFill>
-                <a:latin typeface="Aptos" panose="020B0004020202020204" pitchFamily="34" charset="0"/>
-                <a:ea typeface="Arial"/>
-                <a:cs typeface="Arial"/>
-                <a:sym typeface="Arial"/>
-              </a:defRPr>
-            </a:lvl1pPr>
-            <a:lvl2pPr marL="914400" marR="0" lvl="1" indent="-317500" algn="l" rtl="0">
-              <a:lnSpc>
-                <a:spcPct val="100000"/>
-              </a:lnSpc>
-              <a:spcBef>
-                <a:spcPts val="1600"/>
-              </a:spcBef>
-              <a:spcAft>
-                <a:spcPts val="0"/>
-              </a:spcAft>
-              <a:buClr>
-                <a:srgbClr val="000000"/>
-              </a:buClr>
-              <a:buSzPts val="1400"/>
-              <a:buFont typeface="Arial"/>
-              <a:buChar char="○"/>
-              <a:defRPr sz="1400" b="0" i="0" u="none" strike="noStrike" cap="none">
-                <a:solidFill>
-                  <a:srgbClr val="000000"/>
-                </a:solidFill>
-                <a:latin typeface="Arial"/>
-                <a:ea typeface="Arial"/>
-                <a:cs typeface="Arial"/>
-                <a:sym typeface="Arial"/>
-              </a:defRPr>
-            </a:lvl2pPr>
-            <a:lvl3pPr marL="1371600" marR="0" lvl="2" indent="-317500" algn="l" rtl="0">
-              <a:lnSpc>
-                <a:spcPct val="100000"/>
-              </a:lnSpc>
-              <a:spcBef>
-                <a:spcPts val="1600"/>
-              </a:spcBef>
-              <a:spcAft>
-                <a:spcPts val="0"/>
-              </a:spcAft>
-              <a:buClr>
-                <a:srgbClr val="000000"/>
-              </a:buClr>
-              <a:buSzPts val="1400"/>
-              <a:buFont typeface="Arial"/>
-              <a:buChar char="■"/>
-              <a:defRPr sz="1400" b="0" i="0" u="none" strike="noStrike" cap="none">
-                <a:solidFill>
-                  <a:srgbClr val="000000"/>
-                </a:solidFill>
-                <a:latin typeface="Arial"/>
-                <a:ea typeface="Arial"/>
-                <a:cs typeface="Arial"/>
-                <a:sym typeface="Arial"/>
-              </a:defRPr>
-            </a:lvl3pPr>
-            <a:lvl4pPr marL="1828800" marR="0" lvl="3" indent="-317500" algn="l" rtl="0">
-              <a:lnSpc>
-                <a:spcPct val="100000"/>
-              </a:lnSpc>
-              <a:spcBef>
-                <a:spcPts val="1600"/>
-              </a:spcBef>
-              <a:spcAft>
-                <a:spcPts val="0"/>
-              </a:spcAft>
-              <a:buClr>
-                <a:srgbClr val="000000"/>
-              </a:buClr>
-              <a:buSzPts val="1400"/>
-              <a:buFont typeface="Arial"/>
-              <a:buChar char="●"/>
-              <a:defRPr sz="1400" b="0" i="0" u="none" strike="noStrike" cap="none">
-                <a:solidFill>
-                  <a:srgbClr val="000000"/>
-                </a:solidFill>
-                <a:latin typeface="Arial"/>
-                <a:ea typeface="Arial"/>
-                <a:cs typeface="Arial"/>
-                <a:sym typeface="Arial"/>
-              </a:defRPr>
-            </a:lvl4pPr>
-            <a:lvl5pPr marL="2286000" marR="0" lvl="4" indent="-317500" algn="l" rtl="0">
-              <a:lnSpc>
-                <a:spcPct val="100000"/>
-              </a:lnSpc>
-              <a:spcBef>
-                <a:spcPts val="1600"/>
-              </a:spcBef>
-              <a:spcAft>
-                <a:spcPts val="0"/>
-              </a:spcAft>
-              <a:buClr>
-                <a:srgbClr val="000000"/>
-              </a:buClr>
-              <a:buSzPts val="1400"/>
-              <a:buFont typeface="Arial"/>
-              <a:buChar char="○"/>
-              <a:defRPr sz="1400" b="0" i="0" u="none" strike="noStrike" cap="none">
-                <a:solidFill>
-                  <a:srgbClr val="000000"/>
-                </a:solidFill>
-                <a:latin typeface="Arial"/>
-                <a:ea typeface="Arial"/>
-                <a:cs typeface="Arial"/>
-                <a:sym typeface="Arial"/>
-              </a:defRPr>
-            </a:lvl5pPr>
-            <a:lvl6pPr marL="2743200" marR="0" lvl="5" indent="-317500" algn="l" rtl="0">
-              <a:lnSpc>
-                <a:spcPct val="100000"/>
-              </a:lnSpc>
-              <a:spcBef>
-                <a:spcPts val="1600"/>
-              </a:spcBef>
-              <a:spcAft>
-                <a:spcPts val="0"/>
-              </a:spcAft>
-              <a:buClr>
-                <a:srgbClr val="000000"/>
-              </a:buClr>
-              <a:buSzPts val="1400"/>
-              <a:buFont typeface="Arial"/>
-              <a:buChar char="■"/>
-              <a:defRPr sz="1400" b="0" i="0" u="none" strike="noStrike" cap="none">
-                <a:solidFill>
-                  <a:srgbClr val="000000"/>
-                </a:solidFill>
-                <a:latin typeface="Arial"/>
-                <a:ea typeface="Arial"/>
-                <a:cs typeface="Arial"/>
-                <a:sym typeface="Arial"/>
-              </a:defRPr>
-            </a:lvl6pPr>
-            <a:lvl7pPr marL="3200400" marR="0" lvl="6" indent="-317500" algn="l" rtl="0">
-              <a:lnSpc>
-                <a:spcPct val="100000"/>
-              </a:lnSpc>
-              <a:spcBef>
-                <a:spcPts val="1600"/>
-              </a:spcBef>
-              <a:spcAft>
-                <a:spcPts val="0"/>
-              </a:spcAft>
-              <a:buClr>
-                <a:srgbClr val="000000"/>
-              </a:buClr>
-              <a:buSzPts val="1400"/>
-              <a:buFont typeface="Arial"/>
-              <a:buChar char="●"/>
-              <a:defRPr sz="1400" b="0" i="0" u="none" strike="noStrike" cap="none">
-                <a:solidFill>
-                  <a:srgbClr val="000000"/>
-                </a:solidFill>
-                <a:latin typeface="Arial"/>
-                <a:ea typeface="Arial"/>
-                <a:cs typeface="Arial"/>
-                <a:sym typeface="Arial"/>
-              </a:defRPr>
-            </a:lvl7pPr>
-            <a:lvl8pPr marL="3657600" marR="0" lvl="7" indent="-317500" algn="l" rtl="0">
-              <a:lnSpc>
-                <a:spcPct val="100000"/>
-              </a:lnSpc>
-              <a:spcBef>
-                <a:spcPts val="1600"/>
-              </a:spcBef>
-              <a:spcAft>
-                <a:spcPts val="0"/>
-              </a:spcAft>
-              <a:buClr>
-                <a:srgbClr val="000000"/>
-              </a:buClr>
-              <a:buSzPts val="1400"/>
-              <a:buFont typeface="Arial"/>
-              <a:buChar char="○"/>
-              <a:defRPr sz="1400" b="0" i="0" u="none" strike="noStrike" cap="none">
-                <a:solidFill>
-                  <a:srgbClr val="000000"/>
-                </a:solidFill>
-                <a:latin typeface="Arial"/>
-                <a:ea typeface="Arial"/>
-                <a:cs typeface="Arial"/>
-                <a:sym typeface="Arial"/>
-              </a:defRPr>
-            </a:lvl8pPr>
-            <a:lvl9pPr marL="4114800" marR="0" lvl="8" indent="-317500" algn="l" rtl="0">
-              <a:lnSpc>
-                <a:spcPct val="100000"/>
-              </a:lnSpc>
-              <a:spcBef>
-                <a:spcPts val="1600"/>
-              </a:spcBef>
-              <a:spcAft>
-                <a:spcPts val="1600"/>
-              </a:spcAft>
-              <a:buClr>
-                <a:srgbClr val="000000"/>
-              </a:buClr>
-              <a:buSzPts val="1400"/>
-              <a:buFont typeface="Arial"/>
-              <a:buChar char="■"/>
-              <a:defRPr sz="1400" b="0" i="0" u="none" strike="noStrike" cap="none">
-                <a:solidFill>
-                  <a:srgbClr val="000000"/>
-                </a:solidFill>
-                <a:latin typeface="Arial"/>
-                <a:ea typeface="Arial"/>
-                <a:cs typeface="Arial"/>
-                <a:sym typeface="Arial"/>
-              </a:defRPr>
-            </a:lvl9pPr>
-          </a:lstStyle>
-          <a:p>
-            <a:pPr marL="114300" indent="0">
-              <a:buFont typeface="Arial"/>
-              <a:buNone/>
-            </a:pPr>
-            <a:r>
-              <a:rPr lang="en-GB" sz="1400" dirty="0"/>
-              <a:t>Christ, M., Braun, N., </a:t>
-            </a:r>
-            <a:r>
-              <a:rPr lang="en-GB" sz="1400" dirty="0" err="1"/>
-              <a:t>Neuffer</a:t>
-            </a:r>
-            <a:r>
-              <a:rPr lang="en-GB" sz="1400" dirty="0"/>
-              <a:t>, J. and </a:t>
-            </a:r>
-            <a:r>
-              <a:rPr lang="en-GB" sz="1400" dirty="0" err="1"/>
-              <a:t>Kempa-Liehr</a:t>
-            </a:r>
-            <a:r>
-              <a:rPr lang="en-GB" sz="1400" dirty="0"/>
-              <a:t>, A.W., 2018. Time series feature extraction on basis of scalable hypothesis tests (</a:t>
-            </a:r>
-            <a:r>
-              <a:rPr lang="en-GB" sz="1400" dirty="0" err="1"/>
-              <a:t>tsfresh</a:t>
-            </a:r>
-            <a:r>
-              <a:rPr lang="en-GB" sz="1400" dirty="0"/>
-              <a:t>–a python package). </a:t>
-            </a:r>
-            <a:r>
-              <a:rPr lang="en-GB" sz="1400" i="1" dirty="0"/>
-              <a:t>Neurocomputing</a:t>
-            </a:r>
-            <a:r>
-              <a:rPr lang="en-GB" sz="1400" dirty="0"/>
-              <a:t>, </a:t>
-            </a:r>
-            <a:r>
-              <a:rPr lang="en-GB" sz="1400" i="1" dirty="0"/>
-              <a:t>307</a:t>
-            </a:r>
-            <a:r>
-              <a:rPr lang="en-GB" sz="1400" dirty="0"/>
-              <a:t>, pp.72-77.</a:t>
-            </a:r>
-          </a:p>
-        </p:txBody>
-      </p:sp>
-    </p:spTree>
-    <p:extLst>
-      <p:ext uri="{BB962C8B-B14F-4D97-AF65-F5344CB8AC3E}">
-        <p14:creationId xmlns:p14="http://schemas.microsoft.com/office/powerpoint/2010/main" val="93847987"/>
-      </p:ext>
-    </p:extLst>
-  </p:cSld>
-  <p:clrMapOvr>
-    <a:masterClrMapping/>
-  </p:clrMapOvr>
-</p:sld>
-</file>
-
-<file path=ppt/slides/slide11.xml><?xml version="1.0" encoding="utf-8"?>
-<p:sld xmlns:a="http://schemas.openxmlformats.org/drawingml/2006/main" xmlns:r="http://schemas.openxmlformats.org/officeDocument/2006/relationships" xmlns:p="http://schemas.openxmlformats.org/presentationml/2006/main">
-  <p:cSld>
-    <p:spTree>
-      <p:nvGrpSpPr>
-        <p:cNvPr id="1" name=""/>
-        <p:cNvGrpSpPr/>
-        <p:nvPr/>
-      </p:nvGrpSpPr>
-      <p:grpSpPr>
-        <a:xfrm>
-          <a:off x="0" y="0"/>
-          <a:ext cx="0" cy="0"/>
-          <a:chOff x="0" y="0"/>
-          <a:chExt cx="0" cy="0"/>
-        </a:xfrm>
-      </p:grpSpPr>
-      <p:sp>
-        <p:nvSpPr>
           <p:cNvPr id="3" name="Title 2">
             <a:extLst>
               <a:ext uri="{FF2B5EF4-FFF2-40B4-BE49-F238E27FC236}">
@@ -4248,24 +3633,384 @@
           <a:lstStyle/>
           <a:p>
             <a:r>
-              <a:rPr lang="en-GB" sz="2000" b="1" dirty="0" err="1">
-                <a:effectLst/>
-                <a:latin typeface="+mn-lt"/>
-              </a:rPr>
-              <a:t>todo</a:t>
+              <a:rPr lang="en-GB" sz="2000" b="1" dirty="0" err="1"/>
+              <a:t>linear_trend_timewise</a:t>
+            </a:r>
+            <a:r>
+              <a:rPr lang="en-GB" sz="2000" b="1" dirty="0"/>
+              <a:t> </a:t>
+            </a:r>
+            <a:r>
+              <a:rPr lang="en-GB" sz="2000" dirty="0"/>
+              <a:t>- Calculate a linear least-squares regression for the values of the time series versus the sequence from 0 to length of the time series minus one</a:t>
             </a:r>
             <a:endParaRPr lang="en-GB" sz="2000" dirty="0">
               <a:effectLst/>
-              <a:latin typeface="+mn-lt"/>
             </a:endParaRPr>
           </a:p>
           <a:p>
-            <a:endParaRPr lang="en-GB" sz="2000" dirty="0">
-              <a:latin typeface="Times New Roman" panose="02020603050405020304" pitchFamily="18" charset="0"/>
-            </a:endParaRPr>
-          </a:p>
-          <a:p>
+            <a:pPr marL="114300" indent="0">
+              <a:buNone/>
+            </a:pPr>
             <a:endParaRPr lang="en-GB" sz="2000" dirty="0"/>
+          </a:p>
+          <a:p>
+            <a:endParaRPr lang="en-GB" sz="2000" dirty="0"/>
+          </a:p>
+          <a:p>
+            <a:r>
+              <a:rPr lang="en-GB" sz="2000" b="1" dirty="0" err="1"/>
+              <a:t>partial_autocorrelation</a:t>
+            </a:r>
+            <a:r>
+              <a:rPr lang="en-GB" sz="2000" b="1" dirty="0"/>
+              <a:t> </a:t>
+            </a:r>
+            <a:r>
+              <a:rPr lang="en-GB" sz="2000" dirty="0"/>
+              <a:t>-</a:t>
+            </a:r>
+            <a:r>
+              <a:rPr lang="en-GB" sz="2000" dirty="0">
+                <a:effectLst/>
+              </a:rPr>
+              <a:t> </a:t>
+            </a:r>
+            <a:r>
+              <a:rPr lang="en-GB" sz="2000" dirty="0"/>
+              <a:t>Calculates the value of the partial autocorrelation function at the given lag</a:t>
+            </a:r>
+          </a:p>
+          <a:p>
+            <a:endParaRPr lang="en-GB" sz="2000" dirty="0"/>
+          </a:p>
+          <a:p>
+            <a:endParaRPr lang="en-GB" sz="2000" dirty="0"/>
+          </a:p>
+          <a:p>
+            <a:r>
+              <a:rPr lang="en-GB" sz="2000" b="1" dirty="0" err="1"/>
+              <a:t>sum_of_reoccurring_values</a:t>
+            </a:r>
+            <a:r>
+              <a:rPr lang="en-GB" sz="2000" b="1" dirty="0"/>
+              <a:t> </a:t>
+            </a:r>
+            <a:r>
+              <a:rPr lang="en-GB" sz="2000" dirty="0"/>
+              <a:t>- Returns the sum of all values, that are present in the time series more than once</a:t>
+            </a:r>
+          </a:p>
+          <a:p>
+            <a:endParaRPr lang="en-GB" sz="2000" dirty="0"/>
+          </a:p>
+          <a:p>
+            <a:endParaRPr lang="en-GB" sz="2000" dirty="0"/>
+          </a:p>
+          <a:p>
+            <a:r>
+              <a:rPr lang="en-GB" sz="2000" b="1" dirty="0" err="1"/>
+              <a:t>longest_strike_above_mean</a:t>
+            </a:r>
+            <a:r>
+              <a:rPr lang="en-GB" sz="2000" b="1" dirty="0"/>
+              <a:t> </a:t>
+            </a:r>
+            <a:r>
+              <a:rPr lang="en-GB" sz="2000" dirty="0"/>
+              <a:t>- Returns the length of the longest consecutive subsequence in x that is bigger than the mean of x</a:t>
+            </a:r>
+          </a:p>
+        </p:txBody>
+      </p:sp>
+      <p:sp>
+        <p:nvSpPr>
+          <p:cNvPr id="2" name="Text Placeholder 1">
+            <a:extLst>
+              <a:ext uri="{FF2B5EF4-FFF2-40B4-BE49-F238E27FC236}">
+                <a16:creationId xmlns:a16="http://schemas.microsoft.com/office/drawing/2014/main" id="{40557986-10CD-EB1A-E6A7-44E14628358D}"/>
+              </a:ext>
+            </a:extLst>
+          </p:cNvPr>
+          <p:cNvSpPr txBox="1">
+            <a:spLocks/>
+          </p:cNvSpPr>
+          <p:nvPr/>
+        </p:nvSpPr>
+        <p:spPr>
+          <a:xfrm>
+            <a:off x="208336" y="6278880"/>
+            <a:ext cx="11568064" cy="387840"/>
+          </a:xfrm>
+          <a:prstGeom prst="rect">
+            <a:avLst/>
+          </a:prstGeom>
+        </p:spPr>
+        <p:txBody>
+          <a:bodyPr spcFirstLastPara="1" wrap="square" lIns="91425" tIns="91425" rIns="91425" bIns="91425" anchor="t" anchorCtr="0"/>
+          <a:lstStyle>
+            <a:defPPr marR="0" lvl="0" algn="l" rtl="0">
+              <a:lnSpc>
+                <a:spcPct val="100000"/>
+              </a:lnSpc>
+              <a:spcBef>
+                <a:spcPts val="0"/>
+              </a:spcBef>
+              <a:spcAft>
+                <a:spcPts val="0"/>
+              </a:spcAft>
+            </a:defPPr>
+            <a:lvl1pPr marL="457200" marR="0" lvl="0" indent="-342900" algn="l" rtl="0">
+              <a:lnSpc>
+                <a:spcPct val="100000"/>
+              </a:lnSpc>
+              <a:spcBef>
+                <a:spcPts val="0"/>
+              </a:spcBef>
+              <a:spcAft>
+                <a:spcPts val="0"/>
+              </a:spcAft>
+              <a:buClr>
+                <a:srgbClr val="500064"/>
+              </a:buClr>
+              <a:buSzPts val="1800"/>
+              <a:buFont typeface="Arial"/>
+              <a:buChar char="●"/>
+              <a:defRPr sz="1800" b="0" i="0" u="none" strike="noStrike" cap="none">
+                <a:solidFill>
+                  <a:schemeClr val="tx1"/>
+                </a:solidFill>
+                <a:latin typeface="Aptos" panose="020B0004020202020204" pitchFamily="34" charset="0"/>
+                <a:ea typeface="Arial"/>
+                <a:cs typeface="Arial"/>
+                <a:sym typeface="Arial"/>
+              </a:defRPr>
+            </a:lvl1pPr>
+            <a:lvl2pPr marL="914400" marR="0" lvl="1" indent="-317500" algn="l" rtl="0">
+              <a:lnSpc>
+                <a:spcPct val="100000"/>
+              </a:lnSpc>
+              <a:spcBef>
+                <a:spcPts val="1600"/>
+              </a:spcBef>
+              <a:spcAft>
+                <a:spcPts val="0"/>
+              </a:spcAft>
+              <a:buClr>
+                <a:srgbClr val="000000"/>
+              </a:buClr>
+              <a:buSzPts val="1400"/>
+              <a:buFont typeface="Arial"/>
+              <a:buChar char="○"/>
+              <a:defRPr sz="1400" b="0" i="0" u="none" strike="noStrike" cap="none">
+                <a:solidFill>
+                  <a:srgbClr val="000000"/>
+                </a:solidFill>
+                <a:latin typeface="Arial"/>
+                <a:ea typeface="Arial"/>
+                <a:cs typeface="Arial"/>
+                <a:sym typeface="Arial"/>
+              </a:defRPr>
+            </a:lvl2pPr>
+            <a:lvl3pPr marL="1371600" marR="0" lvl="2" indent="-317500" algn="l" rtl="0">
+              <a:lnSpc>
+                <a:spcPct val="100000"/>
+              </a:lnSpc>
+              <a:spcBef>
+                <a:spcPts val="1600"/>
+              </a:spcBef>
+              <a:spcAft>
+                <a:spcPts val="0"/>
+              </a:spcAft>
+              <a:buClr>
+                <a:srgbClr val="000000"/>
+              </a:buClr>
+              <a:buSzPts val="1400"/>
+              <a:buFont typeface="Arial"/>
+              <a:buChar char="■"/>
+              <a:defRPr sz="1400" b="0" i="0" u="none" strike="noStrike" cap="none">
+                <a:solidFill>
+                  <a:srgbClr val="000000"/>
+                </a:solidFill>
+                <a:latin typeface="Arial"/>
+                <a:ea typeface="Arial"/>
+                <a:cs typeface="Arial"/>
+                <a:sym typeface="Arial"/>
+              </a:defRPr>
+            </a:lvl3pPr>
+            <a:lvl4pPr marL="1828800" marR="0" lvl="3" indent="-317500" algn="l" rtl="0">
+              <a:lnSpc>
+                <a:spcPct val="100000"/>
+              </a:lnSpc>
+              <a:spcBef>
+                <a:spcPts val="1600"/>
+              </a:spcBef>
+              <a:spcAft>
+                <a:spcPts val="0"/>
+              </a:spcAft>
+              <a:buClr>
+                <a:srgbClr val="000000"/>
+              </a:buClr>
+              <a:buSzPts val="1400"/>
+              <a:buFont typeface="Arial"/>
+              <a:buChar char="●"/>
+              <a:defRPr sz="1400" b="0" i="0" u="none" strike="noStrike" cap="none">
+                <a:solidFill>
+                  <a:srgbClr val="000000"/>
+                </a:solidFill>
+                <a:latin typeface="Arial"/>
+                <a:ea typeface="Arial"/>
+                <a:cs typeface="Arial"/>
+                <a:sym typeface="Arial"/>
+              </a:defRPr>
+            </a:lvl4pPr>
+            <a:lvl5pPr marL="2286000" marR="0" lvl="4" indent="-317500" algn="l" rtl="0">
+              <a:lnSpc>
+                <a:spcPct val="100000"/>
+              </a:lnSpc>
+              <a:spcBef>
+                <a:spcPts val="1600"/>
+              </a:spcBef>
+              <a:spcAft>
+                <a:spcPts val="0"/>
+              </a:spcAft>
+              <a:buClr>
+                <a:srgbClr val="000000"/>
+              </a:buClr>
+              <a:buSzPts val="1400"/>
+              <a:buFont typeface="Arial"/>
+              <a:buChar char="○"/>
+              <a:defRPr sz="1400" b="0" i="0" u="none" strike="noStrike" cap="none">
+                <a:solidFill>
+                  <a:srgbClr val="000000"/>
+                </a:solidFill>
+                <a:latin typeface="Arial"/>
+                <a:ea typeface="Arial"/>
+                <a:cs typeface="Arial"/>
+                <a:sym typeface="Arial"/>
+              </a:defRPr>
+            </a:lvl5pPr>
+            <a:lvl6pPr marL="2743200" marR="0" lvl="5" indent="-317500" algn="l" rtl="0">
+              <a:lnSpc>
+                <a:spcPct val="100000"/>
+              </a:lnSpc>
+              <a:spcBef>
+                <a:spcPts val="1600"/>
+              </a:spcBef>
+              <a:spcAft>
+                <a:spcPts val="0"/>
+              </a:spcAft>
+              <a:buClr>
+                <a:srgbClr val="000000"/>
+              </a:buClr>
+              <a:buSzPts val="1400"/>
+              <a:buFont typeface="Arial"/>
+              <a:buChar char="■"/>
+              <a:defRPr sz="1400" b="0" i="0" u="none" strike="noStrike" cap="none">
+                <a:solidFill>
+                  <a:srgbClr val="000000"/>
+                </a:solidFill>
+                <a:latin typeface="Arial"/>
+                <a:ea typeface="Arial"/>
+                <a:cs typeface="Arial"/>
+                <a:sym typeface="Arial"/>
+              </a:defRPr>
+            </a:lvl6pPr>
+            <a:lvl7pPr marL="3200400" marR="0" lvl="6" indent="-317500" algn="l" rtl="0">
+              <a:lnSpc>
+                <a:spcPct val="100000"/>
+              </a:lnSpc>
+              <a:spcBef>
+                <a:spcPts val="1600"/>
+              </a:spcBef>
+              <a:spcAft>
+                <a:spcPts val="0"/>
+              </a:spcAft>
+              <a:buClr>
+                <a:srgbClr val="000000"/>
+              </a:buClr>
+              <a:buSzPts val="1400"/>
+              <a:buFont typeface="Arial"/>
+              <a:buChar char="●"/>
+              <a:defRPr sz="1400" b="0" i="0" u="none" strike="noStrike" cap="none">
+                <a:solidFill>
+                  <a:srgbClr val="000000"/>
+                </a:solidFill>
+                <a:latin typeface="Arial"/>
+                <a:ea typeface="Arial"/>
+                <a:cs typeface="Arial"/>
+                <a:sym typeface="Arial"/>
+              </a:defRPr>
+            </a:lvl7pPr>
+            <a:lvl8pPr marL="3657600" marR="0" lvl="7" indent="-317500" algn="l" rtl="0">
+              <a:lnSpc>
+                <a:spcPct val="100000"/>
+              </a:lnSpc>
+              <a:spcBef>
+                <a:spcPts val="1600"/>
+              </a:spcBef>
+              <a:spcAft>
+                <a:spcPts val="0"/>
+              </a:spcAft>
+              <a:buClr>
+                <a:srgbClr val="000000"/>
+              </a:buClr>
+              <a:buSzPts val="1400"/>
+              <a:buFont typeface="Arial"/>
+              <a:buChar char="○"/>
+              <a:defRPr sz="1400" b="0" i="0" u="none" strike="noStrike" cap="none">
+                <a:solidFill>
+                  <a:srgbClr val="000000"/>
+                </a:solidFill>
+                <a:latin typeface="Arial"/>
+                <a:ea typeface="Arial"/>
+                <a:cs typeface="Arial"/>
+                <a:sym typeface="Arial"/>
+              </a:defRPr>
+            </a:lvl8pPr>
+            <a:lvl9pPr marL="4114800" marR="0" lvl="8" indent="-317500" algn="l" rtl="0">
+              <a:lnSpc>
+                <a:spcPct val="100000"/>
+              </a:lnSpc>
+              <a:spcBef>
+                <a:spcPts val="1600"/>
+              </a:spcBef>
+              <a:spcAft>
+                <a:spcPts val="1600"/>
+              </a:spcAft>
+              <a:buClr>
+                <a:srgbClr val="000000"/>
+              </a:buClr>
+              <a:buSzPts val="1400"/>
+              <a:buFont typeface="Arial"/>
+              <a:buChar char="■"/>
+              <a:defRPr sz="1400" b="0" i="0" u="none" strike="noStrike" cap="none">
+                <a:solidFill>
+                  <a:srgbClr val="000000"/>
+                </a:solidFill>
+                <a:latin typeface="Arial"/>
+                <a:ea typeface="Arial"/>
+                <a:cs typeface="Arial"/>
+                <a:sym typeface="Arial"/>
+              </a:defRPr>
+            </a:lvl9pPr>
+          </a:lstStyle>
+          <a:p>
+            <a:pPr marL="114300" indent="0">
+              <a:buFont typeface="Arial"/>
+              <a:buNone/>
+            </a:pPr>
+            <a:r>
+              <a:rPr lang="en-GB" sz="1400" dirty="0"/>
+              <a:t>Further descriptions: </a:t>
+            </a:r>
+            <a:r>
+              <a:rPr lang="en-GB" sz="1400" dirty="0">
+                <a:hlinkClick r:id="rId3"/>
+              </a:rPr>
+              <a:t>https://tsfresh.readthedocs.io/en/latest/text/list_of_features.html</a:t>
+            </a:r>
+            <a:endParaRPr lang="en-GB" sz="1400" dirty="0"/>
           </a:p>
         </p:txBody>
       </p:sp>
@@ -4282,7 +4027,7 @@
 </p:sld>
 </file>
 
-<file path=ppt/slides/slide12.xml><?xml version="1.0" encoding="utf-8"?>
+<file path=ppt/slides/slide11.xml><?xml version="1.0" encoding="utf-8"?>
 <p:sld xmlns:a="http://schemas.openxmlformats.org/drawingml/2006/main" xmlns:r="http://schemas.openxmlformats.org/officeDocument/2006/relationships" xmlns:p="http://schemas.openxmlformats.org/presentationml/2006/main">
   <p:cSld>
     <p:spTree>
@@ -5349,7 +5094,7 @@
 </p:sld>
 </file>
 
-<file path=ppt/slides/slide13.xml><?xml version="1.0" encoding="utf-8"?>
+<file path=ppt/slides/slide12.xml><?xml version="1.0" encoding="utf-8"?>
 <p:sld xmlns:a="http://schemas.openxmlformats.org/drawingml/2006/main" xmlns:r="http://schemas.openxmlformats.org/officeDocument/2006/relationships" xmlns:p="http://schemas.openxmlformats.org/presentationml/2006/main">
   <p:cSld>
     <p:spTree>
@@ -5641,7 +5386,7 @@
 </p:sld>
 </file>
 
-<file path=ppt/slides/slide14.xml><?xml version="1.0" encoding="utf-8"?>
+<file path=ppt/slides/slide13.xml><?xml version="1.0" encoding="utf-8"?>
 <p:sld xmlns:a="http://schemas.openxmlformats.org/drawingml/2006/main" xmlns:r="http://schemas.openxmlformats.org/officeDocument/2006/relationships" xmlns:p="http://schemas.openxmlformats.org/presentationml/2006/main">
   <p:cSld>
     <p:spTree>
@@ -6476,7 +6221,7 @@
 </p:sld>
 </file>
 
-<file path=ppt/slides/slide15.xml><?xml version="1.0" encoding="utf-8"?>
+<file path=ppt/slides/slide14.xml><?xml version="1.0" encoding="utf-8"?>
 <p:sld xmlns:a="http://schemas.openxmlformats.org/drawingml/2006/main" xmlns:r="http://schemas.openxmlformats.org/officeDocument/2006/relationships" xmlns:p="http://schemas.openxmlformats.org/presentationml/2006/main">
   <p:cSld>
     <p:spTree>
@@ -6509,14 +6254,22 @@
             <p:ph type="body" idx="1"/>
           </p:nvPr>
         </p:nvSpPr>
-        <p:spPr/>
+        <p:spPr>
+          <a:xfrm>
+            <a:off x="415600" y="1402521"/>
+            <a:ext cx="5033896" cy="4555200"/>
+          </a:xfrm>
+        </p:spPr>
         <p:txBody>
           <a:bodyPr/>
           <a:lstStyle/>
           <a:p>
-            <a:r>
-              <a:rPr lang="en-GB" dirty="0"/>
-              <a:t>CD</a:t>
+            <a:pPr marL="114300" indent="0">
+              <a:buNone/>
+            </a:pPr>
+            <a:r>
+              <a:rPr lang="en-GB" sz="2000" dirty="0"/>
+              <a:t>While a lot faster, the smaller feature sets are usually perform worse.</a:t>
             </a:r>
           </a:p>
         </p:txBody>
@@ -6549,6 +6302,401 @@
           </a:p>
         </p:txBody>
       </p:sp>
+      <p:pic>
+        <p:nvPicPr>
+          <p:cNvPr id="5" name="Picture 4">
+            <a:extLst>
+              <a:ext uri="{FF2B5EF4-FFF2-40B4-BE49-F238E27FC236}">
+                <a16:creationId xmlns:a16="http://schemas.microsoft.com/office/drawing/2014/main" id="{A8FEC70E-C88B-827B-CB83-6FD181B1259F}"/>
+              </a:ext>
+            </a:extLst>
+          </p:cNvPr>
+          <p:cNvPicPr>
+            <a:picLocks noChangeAspect="1"/>
+          </p:cNvPicPr>
+          <p:nvPr/>
+        </p:nvPicPr>
+        <p:blipFill rotWithShape="1">
+          <a:blip r:embed="rId2"/>
+          <a:srcRect r="1564"/>
+          <a:stretch/>
+        </p:blipFill>
+        <p:spPr>
+          <a:xfrm>
+            <a:off x="97087" y="3255264"/>
+            <a:ext cx="6846972" cy="2348889"/>
+          </a:xfrm>
+          <a:prstGeom prst="rect">
+            <a:avLst/>
+          </a:prstGeom>
+        </p:spPr>
+      </p:pic>
+      <p:pic>
+        <p:nvPicPr>
+          <p:cNvPr id="7" name="Picture 6">
+            <a:extLst>
+              <a:ext uri="{FF2B5EF4-FFF2-40B4-BE49-F238E27FC236}">
+                <a16:creationId xmlns:a16="http://schemas.microsoft.com/office/drawing/2014/main" id="{87F2D56C-6658-DA8E-DACF-713469FC4B01}"/>
+              </a:ext>
+            </a:extLst>
+          </p:cNvPr>
+          <p:cNvPicPr>
+            <a:picLocks noChangeAspect="1"/>
+          </p:cNvPicPr>
+          <p:nvPr/>
+        </p:nvPicPr>
+        <p:blipFill>
+          <a:blip r:embed="rId3"/>
+          <a:stretch>
+            <a:fillRect/>
+          </a:stretch>
+        </p:blipFill>
+        <p:spPr>
+          <a:xfrm>
+            <a:off x="6961633" y="1452760"/>
+            <a:ext cx="5033896" cy="4454721"/>
+          </a:xfrm>
+          <a:prstGeom prst="rect">
+            <a:avLst/>
+          </a:prstGeom>
+        </p:spPr>
+      </p:pic>
+      <p:sp>
+        <p:nvSpPr>
+          <p:cNvPr id="8" name="Text Placeholder 1">
+            <a:extLst>
+              <a:ext uri="{FF2B5EF4-FFF2-40B4-BE49-F238E27FC236}">
+                <a16:creationId xmlns:a16="http://schemas.microsoft.com/office/drawing/2014/main" id="{B78EE9E4-C6A7-54D1-B074-15A4AAE2C383}"/>
+              </a:ext>
+            </a:extLst>
+          </p:cNvPr>
+          <p:cNvSpPr txBox="1">
+            <a:spLocks/>
+          </p:cNvSpPr>
+          <p:nvPr/>
+        </p:nvSpPr>
+        <p:spPr>
+          <a:xfrm>
+            <a:off x="208336" y="6069321"/>
+            <a:ext cx="11568064" cy="597399"/>
+          </a:xfrm>
+          <a:prstGeom prst="rect">
+            <a:avLst/>
+          </a:prstGeom>
+        </p:spPr>
+        <p:txBody>
+          <a:bodyPr spcFirstLastPara="1" wrap="square" lIns="91425" tIns="91425" rIns="91425" bIns="91425" anchor="t" anchorCtr="0"/>
+          <a:lstStyle>
+            <a:defPPr marR="0" lvl="0" algn="l" rtl="0">
+              <a:lnSpc>
+                <a:spcPct val="100000"/>
+              </a:lnSpc>
+              <a:spcBef>
+                <a:spcPts val="0"/>
+              </a:spcBef>
+              <a:spcAft>
+                <a:spcPts val="0"/>
+              </a:spcAft>
+            </a:defPPr>
+            <a:lvl1pPr marL="457200" marR="0" lvl="0" indent="-342900" algn="l" rtl="0">
+              <a:lnSpc>
+                <a:spcPct val="100000"/>
+              </a:lnSpc>
+              <a:spcBef>
+                <a:spcPts val="0"/>
+              </a:spcBef>
+              <a:spcAft>
+                <a:spcPts val="0"/>
+              </a:spcAft>
+              <a:buClr>
+                <a:srgbClr val="500064"/>
+              </a:buClr>
+              <a:buSzPts val="1800"/>
+              <a:buFont typeface="Arial"/>
+              <a:buChar char="●"/>
+              <a:defRPr sz="1800" b="0" i="0" u="none" strike="noStrike" cap="none">
+                <a:solidFill>
+                  <a:schemeClr val="tx1"/>
+                </a:solidFill>
+                <a:latin typeface="Aptos" panose="020B0004020202020204" pitchFamily="34" charset="0"/>
+                <a:ea typeface="Arial"/>
+                <a:cs typeface="Arial"/>
+                <a:sym typeface="Arial"/>
+              </a:defRPr>
+            </a:lvl1pPr>
+            <a:lvl2pPr marL="914400" marR="0" lvl="1" indent="-317500" algn="l" rtl="0">
+              <a:lnSpc>
+                <a:spcPct val="100000"/>
+              </a:lnSpc>
+              <a:spcBef>
+                <a:spcPts val="1600"/>
+              </a:spcBef>
+              <a:spcAft>
+                <a:spcPts val="0"/>
+              </a:spcAft>
+              <a:buClr>
+                <a:srgbClr val="000000"/>
+              </a:buClr>
+              <a:buSzPts val="1400"/>
+              <a:buFont typeface="Arial"/>
+              <a:buChar char="○"/>
+              <a:defRPr sz="1400" b="0" i="0" u="none" strike="noStrike" cap="none">
+                <a:solidFill>
+                  <a:srgbClr val="000000"/>
+                </a:solidFill>
+                <a:latin typeface="Arial"/>
+                <a:ea typeface="Arial"/>
+                <a:cs typeface="Arial"/>
+                <a:sym typeface="Arial"/>
+              </a:defRPr>
+            </a:lvl2pPr>
+            <a:lvl3pPr marL="1371600" marR="0" lvl="2" indent="-317500" algn="l" rtl="0">
+              <a:lnSpc>
+                <a:spcPct val="100000"/>
+              </a:lnSpc>
+              <a:spcBef>
+                <a:spcPts val="1600"/>
+              </a:spcBef>
+              <a:spcAft>
+                <a:spcPts val="0"/>
+              </a:spcAft>
+              <a:buClr>
+                <a:srgbClr val="000000"/>
+              </a:buClr>
+              <a:buSzPts val="1400"/>
+              <a:buFont typeface="Arial"/>
+              <a:buChar char="■"/>
+              <a:defRPr sz="1400" b="0" i="0" u="none" strike="noStrike" cap="none">
+                <a:solidFill>
+                  <a:srgbClr val="000000"/>
+                </a:solidFill>
+                <a:latin typeface="Arial"/>
+                <a:ea typeface="Arial"/>
+                <a:cs typeface="Arial"/>
+                <a:sym typeface="Arial"/>
+              </a:defRPr>
+            </a:lvl3pPr>
+            <a:lvl4pPr marL="1828800" marR="0" lvl="3" indent="-317500" algn="l" rtl="0">
+              <a:lnSpc>
+                <a:spcPct val="100000"/>
+              </a:lnSpc>
+              <a:spcBef>
+                <a:spcPts val="1600"/>
+              </a:spcBef>
+              <a:spcAft>
+                <a:spcPts val="0"/>
+              </a:spcAft>
+              <a:buClr>
+                <a:srgbClr val="000000"/>
+              </a:buClr>
+              <a:buSzPts val="1400"/>
+              <a:buFont typeface="Arial"/>
+              <a:buChar char="●"/>
+              <a:defRPr sz="1400" b="0" i="0" u="none" strike="noStrike" cap="none">
+                <a:solidFill>
+                  <a:srgbClr val="000000"/>
+                </a:solidFill>
+                <a:latin typeface="Arial"/>
+                <a:ea typeface="Arial"/>
+                <a:cs typeface="Arial"/>
+                <a:sym typeface="Arial"/>
+              </a:defRPr>
+            </a:lvl4pPr>
+            <a:lvl5pPr marL="2286000" marR="0" lvl="4" indent="-317500" algn="l" rtl="0">
+              <a:lnSpc>
+                <a:spcPct val="100000"/>
+              </a:lnSpc>
+              <a:spcBef>
+                <a:spcPts val="1600"/>
+              </a:spcBef>
+              <a:spcAft>
+                <a:spcPts val="0"/>
+              </a:spcAft>
+              <a:buClr>
+                <a:srgbClr val="000000"/>
+              </a:buClr>
+              <a:buSzPts val="1400"/>
+              <a:buFont typeface="Arial"/>
+              <a:buChar char="○"/>
+              <a:defRPr sz="1400" b="0" i="0" u="none" strike="noStrike" cap="none">
+                <a:solidFill>
+                  <a:srgbClr val="000000"/>
+                </a:solidFill>
+                <a:latin typeface="Arial"/>
+                <a:ea typeface="Arial"/>
+                <a:cs typeface="Arial"/>
+                <a:sym typeface="Arial"/>
+              </a:defRPr>
+            </a:lvl5pPr>
+            <a:lvl6pPr marL="2743200" marR="0" lvl="5" indent="-317500" algn="l" rtl="0">
+              <a:lnSpc>
+                <a:spcPct val="100000"/>
+              </a:lnSpc>
+              <a:spcBef>
+                <a:spcPts val="1600"/>
+              </a:spcBef>
+              <a:spcAft>
+                <a:spcPts val="0"/>
+              </a:spcAft>
+              <a:buClr>
+                <a:srgbClr val="000000"/>
+              </a:buClr>
+              <a:buSzPts val="1400"/>
+              <a:buFont typeface="Arial"/>
+              <a:buChar char="■"/>
+              <a:defRPr sz="1400" b="0" i="0" u="none" strike="noStrike" cap="none">
+                <a:solidFill>
+                  <a:srgbClr val="000000"/>
+                </a:solidFill>
+                <a:latin typeface="Arial"/>
+                <a:ea typeface="Arial"/>
+                <a:cs typeface="Arial"/>
+                <a:sym typeface="Arial"/>
+              </a:defRPr>
+            </a:lvl6pPr>
+            <a:lvl7pPr marL="3200400" marR="0" lvl="6" indent="-317500" algn="l" rtl="0">
+              <a:lnSpc>
+                <a:spcPct val="100000"/>
+              </a:lnSpc>
+              <a:spcBef>
+                <a:spcPts val="1600"/>
+              </a:spcBef>
+              <a:spcAft>
+                <a:spcPts val="0"/>
+              </a:spcAft>
+              <a:buClr>
+                <a:srgbClr val="000000"/>
+              </a:buClr>
+              <a:buSzPts val="1400"/>
+              <a:buFont typeface="Arial"/>
+              <a:buChar char="●"/>
+              <a:defRPr sz="1400" b="0" i="0" u="none" strike="noStrike" cap="none">
+                <a:solidFill>
+                  <a:srgbClr val="000000"/>
+                </a:solidFill>
+                <a:latin typeface="Arial"/>
+                <a:ea typeface="Arial"/>
+                <a:cs typeface="Arial"/>
+                <a:sym typeface="Arial"/>
+              </a:defRPr>
+            </a:lvl7pPr>
+            <a:lvl8pPr marL="3657600" marR="0" lvl="7" indent="-317500" algn="l" rtl="0">
+              <a:lnSpc>
+                <a:spcPct val="100000"/>
+              </a:lnSpc>
+              <a:spcBef>
+                <a:spcPts val="1600"/>
+              </a:spcBef>
+              <a:spcAft>
+                <a:spcPts val="0"/>
+              </a:spcAft>
+              <a:buClr>
+                <a:srgbClr val="000000"/>
+              </a:buClr>
+              <a:buSzPts val="1400"/>
+              <a:buFont typeface="Arial"/>
+              <a:buChar char="○"/>
+              <a:defRPr sz="1400" b="0" i="0" u="none" strike="noStrike" cap="none">
+                <a:solidFill>
+                  <a:srgbClr val="000000"/>
+                </a:solidFill>
+                <a:latin typeface="Arial"/>
+                <a:ea typeface="Arial"/>
+                <a:cs typeface="Arial"/>
+                <a:sym typeface="Arial"/>
+              </a:defRPr>
+            </a:lvl8pPr>
+            <a:lvl9pPr marL="4114800" marR="0" lvl="8" indent="-317500" algn="l" rtl="0">
+              <a:lnSpc>
+                <a:spcPct val="100000"/>
+              </a:lnSpc>
+              <a:spcBef>
+                <a:spcPts val="1600"/>
+              </a:spcBef>
+              <a:spcAft>
+                <a:spcPts val="1600"/>
+              </a:spcAft>
+              <a:buClr>
+                <a:srgbClr val="000000"/>
+              </a:buClr>
+              <a:buSzPts val="1400"/>
+              <a:buFont typeface="Arial"/>
+              <a:buChar char="■"/>
+              <a:defRPr sz="1400" b="0" i="0" u="none" strike="noStrike" cap="none">
+                <a:solidFill>
+                  <a:srgbClr val="000000"/>
+                </a:solidFill>
+                <a:latin typeface="Arial"/>
+                <a:ea typeface="Arial"/>
+                <a:cs typeface="Arial"/>
+                <a:sym typeface="Arial"/>
+              </a:defRPr>
+            </a:lvl9pPr>
+          </a:lstStyle>
+          <a:p>
+            <a:pPr marL="114300" indent="0">
+              <a:buFont typeface="Arial"/>
+              <a:buNone/>
+            </a:pPr>
+            <a:r>
+              <a:rPr lang="en-GB" sz="1400" dirty="0"/>
+              <a:t>Dau, H.A., Bagnall, A., </a:t>
+            </a:r>
+            <a:r>
+              <a:rPr lang="en-GB" sz="1400" dirty="0" err="1"/>
+              <a:t>Kamgar</a:t>
+            </a:r>
+            <a:r>
+              <a:rPr lang="en-GB" sz="1400" dirty="0"/>
+              <a:t>, K., Yeh, C.C.M., Zhu, Y., </a:t>
+            </a:r>
+            <a:r>
+              <a:rPr lang="en-GB" sz="1400" dirty="0" err="1"/>
+              <a:t>Gharghabi</a:t>
+            </a:r>
+            <a:r>
+              <a:rPr lang="en-GB" sz="1400" dirty="0"/>
+              <a:t>, S., </a:t>
+            </a:r>
+            <a:r>
+              <a:rPr lang="en-GB" sz="1400" dirty="0" err="1"/>
+              <a:t>Ratanamahatana</a:t>
+            </a:r>
+            <a:r>
+              <a:rPr lang="en-GB" sz="1400" dirty="0"/>
+              <a:t>, C.A. and Keogh, E., 2019. The UCR time series archive. </a:t>
+            </a:r>
+            <a:r>
+              <a:rPr lang="en-GB" sz="1400" i="1" dirty="0"/>
+              <a:t>IEEE/CAA Journal of </a:t>
+            </a:r>
+            <a:r>
+              <a:rPr lang="en-GB" sz="1400" i="1" dirty="0" err="1"/>
+              <a:t>Automatica</a:t>
+            </a:r>
+            <a:r>
+              <a:rPr lang="en-GB" sz="1400" i="1" dirty="0"/>
+              <a:t> </a:t>
+            </a:r>
+            <a:r>
+              <a:rPr lang="en-GB" sz="1400" i="1" dirty="0" err="1"/>
+              <a:t>Sinica</a:t>
+            </a:r>
+            <a:r>
+              <a:rPr lang="en-GB" sz="1400" dirty="0"/>
+              <a:t>, </a:t>
+            </a:r>
+            <a:r>
+              <a:rPr lang="en-GB" sz="1400" i="1" dirty="0"/>
+              <a:t>6</a:t>
+            </a:r>
+            <a:r>
+              <a:rPr lang="en-GB" sz="1400" dirty="0"/>
+              <a:t>(6), pp.1293-1305.</a:t>
+            </a:r>
+          </a:p>
+        </p:txBody>
+      </p:sp>
     </p:spTree>
     <p:extLst>
       <p:ext uri="{BB962C8B-B14F-4D97-AF65-F5344CB8AC3E}">
@@ -6562,7 +6710,7 @@
 </p:sld>
 </file>
 
-<file path=ppt/slides/slide16.xml><?xml version="1.0" encoding="utf-8"?>
+<file path=ppt/slides/slide15.xml><?xml version="1.0" encoding="utf-8"?>
 <p:sld xmlns:a="http://schemas.openxmlformats.org/drawingml/2006/main" xmlns:r="http://schemas.openxmlformats.org/officeDocument/2006/relationships" xmlns:p="http://schemas.openxmlformats.org/presentationml/2006/main">
   <p:cSld>
     <p:spTree>
@@ -7186,131 +7334,6 @@
 </file>
 
 <file path=ppt/slides/slide2.xml><?xml version="1.0" encoding="utf-8"?>
-<p:sld xmlns:a="http://schemas.openxmlformats.org/drawingml/2006/main" xmlns:r="http://schemas.openxmlformats.org/officeDocument/2006/relationships" xmlns:p="http://schemas.openxmlformats.org/presentationml/2006/main">
-  <p:cSld>
-    <p:spTree>
-      <p:nvGrpSpPr>
-        <p:cNvPr id="1" name=""/>
-        <p:cNvGrpSpPr/>
-        <p:nvPr/>
-      </p:nvGrpSpPr>
-      <p:grpSpPr>
-        <a:xfrm>
-          <a:off x="0" y="0"/>
-          <a:ext cx="0" cy="0"/>
-          <a:chOff x="0" y="0"/>
-          <a:chExt cx="0" cy="0"/>
-        </a:xfrm>
-      </p:grpSpPr>
-      <p:sp>
-        <p:nvSpPr>
-          <p:cNvPr id="3" name="Title 2">
-            <a:extLst>
-              <a:ext uri="{FF2B5EF4-FFF2-40B4-BE49-F238E27FC236}">
-                <a16:creationId xmlns:a16="http://schemas.microsoft.com/office/drawing/2014/main" id="{CCF86655-7DDA-4074-B8EC-4CEC97924A42}"/>
-              </a:ext>
-            </a:extLst>
-          </p:cNvPr>
-          <p:cNvSpPr>
-            <a:spLocks noGrp="1"/>
-          </p:cNvSpPr>
-          <p:nvPr>
-            <p:ph type="title"/>
-          </p:nvPr>
-        </p:nvSpPr>
-        <p:spPr/>
-        <p:txBody>
-          <a:bodyPr/>
-          <a:lstStyle/>
-          <a:p>
-            <a:r>
-              <a:rPr lang="en-GB" dirty="0"/>
-              <a:t>Time Series Machine Learning (</a:t>
-            </a:r>
-            <a:r>
-              <a:rPr lang="en-GB" dirty="0" err="1"/>
-              <a:t>tsml</a:t>
-            </a:r>
-            <a:r>
-              <a:rPr lang="en-GB" dirty="0"/>
-              <a:t>)</a:t>
-            </a:r>
-          </a:p>
-        </p:txBody>
-      </p:sp>
-      <p:pic>
-        <p:nvPicPr>
-          <p:cNvPr id="20" name="Picture 19">
-            <a:extLst>
-              <a:ext uri="{FF2B5EF4-FFF2-40B4-BE49-F238E27FC236}">
-                <a16:creationId xmlns:a16="http://schemas.microsoft.com/office/drawing/2014/main" id="{0566F619-B263-4A92-93F4-CBFBA3345EE5}"/>
-              </a:ext>
-            </a:extLst>
-          </p:cNvPr>
-          <p:cNvPicPr>
-            <a:picLocks noChangeAspect="1"/>
-          </p:cNvPicPr>
-          <p:nvPr/>
-        </p:nvPicPr>
-        <p:blipFill>
-          <a:blip r:embed="rId3"/>
-          <a:stretch>
-            <a:fillRect/>
-          </a:stretch>
-        </p:blipFill>
-        <p:spPr>
-          <a:xfrm>
-            <a:off x="364779" y="1328737"/>
-            <a:ext cx="5731221" cy="3067316"/>
-          </a:xfrm>
-          <a:prstGeom prst="rect">
-            <a:avLst/>
-          </a:prstGeom>
-        </p:spPr>
-      </p:pic>
-      <p:pic>
-        <p:nvPicPr>
-          <p:cNvPr id="2" name="Picture 1">
-            <a:extLst>
-              <a:ext uri="{FF2B5EF4-FFF2-40B4-BE49-F238E27FC236}">
-                <a16:creationId xmlns:a16="http://schemas.microsoft.com/office/drawing/2014/main" id="{511435FD-39BD-ED7D-1401-0277C528459C}"/>
-              </a:ext>
-            </a:extLst>
-          </p:cNvPr>
-          <p:cNvPicPr>
-            <a:picLocks noChangeAspect="1"/>
-          </p:cNvPicPr>
-          <p:nvPr/>
-        </p:nvPicPr>
-        <p:blipFill rotWithShape="1">
-          <a:blip r:embed="rId4"/>
-          <a:srcRect t="129" b="-1"/>
-          <a:stretch/>
-        </p:blipFill>
-        <p:spPr>
-          <a:xfrm>
-            <a:off x="6096000" y="3279648"/>
-            <a:ext cx="5948416" cy="3276667"/>
-          </a:xfrm>
-          <a:prstGeom prst="rect">
-            <a:avLst/>
-          </a:prstGeom>
-        </p:spPr>
-      </p:pic>
-    </p:spTree>
-    <p:extLst>
-      <p:ext uri="{BB962C8B-B14F-4D97-AF65-F5344CB8AC3E}">
-        <p14:creationId xmlns:p14="http://schemas.microsoft.com/office/powerpoint/2010/main" val="4279366238"/>
-      </p:ext>
-    </p:extLst>
-  </p:cSld>
-  <p:clrMapOvr>
-    <a:masterClrMapping/>
-  </p:clrMapOvr>
-</p:sld>
-</file>
-
-<file path=ppt/slides/slide3.xml><?xml version="1.0" encoding="utf-8"?>
 <p:sld xmlns:a="http://schemas.openxmlformats.org/drawingml/2006/main" xmlns:r="http://schemas.openxmlformats.org/officeDocument/2006/relationships" xmlns:p="http://schemas.openxmlformats.org/presentationml/2006/main">
   <p:cSld>
     <p:spTree>
@@ -7416,7 +7439,7 @@
             </a:pPr>
             <a:r>
               <a:rPr lang="en-GB" sz="2000" dirty="0"/>
-              <a:t>One of the easiest approaches is to just summarise the full set of series into a collection of feature vectors.</a:t>
+              <a:t>One of the easiest approaches is to just summarise the full set of series into a collection of feature vectors. Other categories also use pipelines, i.e. ROCKET.</a:t>
             </a:r>
           </a:p>
         </p:txBody>
@@ -8002,7 +8025,7 @@
 </p:sld>
 </file>
 
-<file path=ppt/slides/slide4.xml><?xml version="1.0" encoding="utf-8"?>
+<file path=ppt/slides/slide3.xml><?xml version="1.0" encoding="utf-8"?>
 <p:sld xmlns:a="http://schemas.openxmlformats.org/drawingml/2006/main" xmlns:r="http://schemas.openxmlformats.org/officeDocument/2006/relationships" xmlns:p="http://schemas.openxmlformats.org/presentationml/2006/main">
   <p:cSld>
     <p:spTree>
@@ -8065,7 +8088,7 @@
         </p:nvSpPr>
         <p:spPr>
           <a:xfrm>
-            <a:off x="415600" y="1536633"/>
+            <a:off x="415600" y="1317177"/>
             <a:ext cx="11360800" cy="4555200"/>
           </a:xfrm>
         </p:spPr>
@@ -8073,13 +8096,268 @@
           <a:bodyPr/>
           <a:lstStyle/>
           <a:p>
-            <a:r>
-              <a:rPr lang="en-GB" sz="2000" dirty="0" err="1"/>
-              <a:t>todo</a:t>
-            </a:r>
+            <a:pPr marL="114300" indent="0">
+              <a:buNone/>
+            </a:pPr>
+            <a:r>
+              <a:rPr lang="en-GB" sz="2000" dirty="0"/>
+              <a:t>We include statistics that average, select single values or are otherwise well-known and simple to understand in this category</a:t>
+            </a:r>
+          </a:p>
+          <a:p>
             <a:endParaRPr lang="en-GB" sz="2000" dirty="0"/>
           </a:p>
           <a:p>
+            <a:r>
+              <a:rPr lang="en-GB" sz="2000" dirty="0"/>
+              <a:t>Averages: </a:t>
+            </a:r>
+            <a:r>
+              <a:rPr lang="en-GB" sz="2000" b="1" dirty="0"/>
+              <a:t>mean</a:t>
+            </a:r>
+            <a:r>
+              <a:rPr lang="en-GB" sz="2000" dirty="0"/>
+              <a:t>,</a:t>
+            </a:r>
+            <a:r>
+              <a:rPr lang="en-GB" sz="2000" b="1" dirty="0"/>
+              <a:t> std</a:t>
+            </a:r>
+            <a:r>
+              <a:rPr lang="en-GB" sz="2000" dirty="0"/>
+              <a:t>,</a:t>
+            </a:r>
+            <a:r>
+              <a:rPr lang="en-GB" sz="2000" b="1" dirty="0"/>
+              <a:t> min</a:t>
+            </a:r>
+            <a:r>
+              <a:rPr lang="en-GB" sz="2000" dirty="0"/>
+              <a:t>,</a:t>
+            </a:r>
+            <a:r>
+              <a:rPr lang="en-GB" sz="2000" b="1" dirty="0"/>
+              <a:t> max</a:t>
+            </a:r>
+            <a:r>
+              <a:rPr lang="en-GB" sz="2000" dirty="0"/>
+              <a:t>,</a:t>
+            </a:r>
+            <a:r>
+              <a:rPr lang="en-GB" sz="2000" b="1" dirty="0"/>
+              <a:t> 25% percentile</a:t>
+            </a:r>
+            <a:r>
+              <a:rPr lang="en-GB" sz="2000" dirty="0"/>
+              <a:t>,</a:t>
+            </a:r>
+            <a:r>
+              <a:rPr lang="en-GB" sz="2000" b="1" dirty="0"/>
+              <a:t> 50% percentile</a:t>
+            </a:r>
+            <a:r>
+              <a:rPr lang="en-GB" sz="2000" dirty="0"/>
+              <a:t>,</a:t>
+            </a:r>
+            <a:r>
+              <a:rPr lang="en-GB" sz="2000" b="1" dirty="0"/>
+              <a:t> 75 % percentile</a:t>
+            </a:r>
+          </a:p>
+          <a:p>
+            <a:endParaRPr lang="en-GB" sz="2000" dirty="0"/>
+          </a:p>
+          <a:p>
+            <a:endParaRPr lang="en-GB" sz="2000" dirty="0"/>
+          </a:p>
+          <a:p>
+            <a:r>
+              <a:rPr lang="en-GB" sz="2000" dirty="0"/>
+              <a:t>Percentiles: </a:t>
+            </a:r>
+            <a:r>
+              <a:rPr lang="en-GB" sz="2000" b="1" dirty="0"/>
+              <a:t>2.15% percentile</a:t>
+            </a:r>
+            <a:r>
+              <a:rPr lang="en-GB" sz="2000" dirty="0"/>
+              <a:t>, </a:t>
+            </a:r>
+            <a:r>
+              <a:rPr lang="en-GB" sz="2000" b="1" dirty="0"/>
+              <a:t>8.87% percentile</a:t>
+            </a:r>
+            <a:r>
+              <a:rPr lang="en-GB" sz="2000" dirty="0"/>
+              <a:t>, </a:t>
+            </a:r>
+            <a:r>
+              <a:rPr lang="en-GB" sz="2000" b="1" dirty="0"/>
+              <a:t>25% percentile</a:t>
+            </a:r>
+            <a:r>
+              <a:rPr lang="en-GB" sz="2000" dirty="0"/>
+              <a:t>, </a:t>
+            </a:r>
+            <a:r>
+              <a:rPr lang="en-GB" sz="2000" b="1" dirty="0"/>
+              <a:t>50% percentile</a:t>
+            </a:r>
+            <a:r>
+              <a:rPr lang="en-GB" sz="2000" dirty="0"/>
+              <a:t>, </a:t>
+            </a:r>
+            <a:r>
+              <a:rPr lang="en-GB" sz="2000" b="1" dirty="0"/>
+              <a:t>75% percentile</a:t>
+            </a:r>
+            <a:r>
+              <a:rPr lang="en-GB" sz="2000" dirty="0"/>
+              <a:t>, </a:t>
+            </a:r>
+            <a:r>
+              <a:rPr lang="en-GB" sz="2000" b="1" dirty="0"/>
+              <a:t>91.13% percentile</a:t>
+            </a:r>
+            <a:r>
+              <a:rPr lang="en-GB" sz="2000" dirty="0"/>
+              <a:t>, </a:t>
+            </a:r>
+            <a:r>
+              <a:rPr lang="en-GB" sz="2000" b="1" dirty="0"/>
+              <a:t>97.85% percentile</a:t>
+            </a:r>
+            <a:endParaRPr lang="en-GB" sz="2000" dirty="0"/>
+          </a:p>
+          <a:p>
+            <a:endParaRPr lang="en-GB" sz="2000" dirty="0"/>
+          </a:p>
+          <a:p>
+            <a:endParaRPr lang="en-GB" sz="2000" dirty="0"/>
+          </a:p>
+          <a:p>
+            <a:r>
+              <a:rPr lang="en-GB" sz="2000" dirty="0"/>
+              <a:t>Bowley: </a:t>
+            </a:r>
+            <a:r>
+              <a:rPr lang="en-GB" sz="2000" b="1" dirty="0"/>
+              <a:t>min</a:t>
+            </a:r>
+            <a:r>
+              <a:rPr lang="en-GB" sz="2000" dirty="0"/>
+              <a:t>, </a:t>
+            </a:r>
+            <a:r>
+              <a:rPr lang="en-GB" sz="2000" b="1" dirty="0"/>
+              <a:t>max</a:t>
+            </a:r>
+            <a:r>
+              <a:rPr lang="en-GB" sz="2000" dirty="0"/>
+              <a:t>, </a:t>
+            </a:r>
+            <a:r>
+              <a:rPr lang="en-GB" sz="2000" b="1" dirty="0"/>
+              <a:t>10% percentile</a:t>
+            </a:r>
+            <a:r>
+              <a:rPr lang="en-GB" sz="2000" dirty="0"/>
+              <a:t>, </a:t>
+            </a:r>
+            <a:r>
+              <a:rPr lang="en-GB" sz="2000" b="1" dirty="0"/>
+              <a:t>25% percentile</a:t>
+            </a:r>
+            <a:r>
+              <a:rPr lang="en-GB" sz="2000" dirty="0"/>
+              <a:t>, </a:t>
+            </a:r>
+            <a:r>
+              <a:rPr lang="en-GB" sz="2000" b="1" dirty="0"/>
+              <a:t>50% percentile</a:t>
+            </a:r>
+            <a:r>
+              <a:rPr lang="en-GB" sz="2000" dirty="0"/>
+              <a:t>, </a:t>
+            </a:r>
+            <a:r>
+              <a:rPr lang="en-GB" sz="2000" b="1" dirty="0"/>
+              <a:t>75% percentile</a:t>
+            </a:r>
+            <a:r>
+              <a:rPr lang="en-GB" sz="2000" dirty="0"/>
+              <a:t>, </a:t>
+            </a:r>
+            <a:r>
+              <a:rPr lang="en-GB" sz="2000" b="1" dirty="0"/>
+              <a:t>90% percentile</a:t>
+            </a:r>
+            <a:endParaRPr lang="en-GB" sz="2000" dirty="0"/>
+          </a:p>
+          <a:p>
+            <a:endParaRPr lang="en-GB" sz="2000" dirty="0"/>
+          </a:p>
+          <a:p>
+            <a:endParaRPr lang="en-GB" sz="2000" dirty="0"/>
+          </a:p>
+          <a:p>
+            <a:r>
+              <a:rPr lang="en-GB" sz="2000" dirty="0"/>
+              <a:t>Tukey: </a:t>
+            </a:r>
+            <a:r>
+              <a:rPr lang="en-GB" sz="2000" b="1" dirty="0"/>
+              <a:t>min</a:t>
+            </a:r>
+            <a:r>
+              <a:rPr lang="en-GB" sz="2000" dirty="0"/>
+              <a:t>, </a:t>
+            </a:r>
+            <a:r>
+              <a:rPr lang="en-GB" sz="2000" b="1" dirty="0"/>
+              <a:t>max</a:t>
+            </a:r>
+            <a:r>
+              <a:rPr lang="en-GB" sz="2000" dirty="0"/>
+              <a:t>, </a:t>
+            </a:r>
+            <a:r>
+              <a:rPr lang="en-GB" sz="2000" b="1" dirty="0"/>
+              <a:t>12.5% percentile</a:t>
+            </a:r>
+            <a:r>
+              <a:rPr lang="en-GB" sz="2000" dirty="0"/>
+              <a:t>, </a:t>
+            </a:r>
+            <a:r>
+              <a:rPr lang="en-GB" sz="2000" b="1" dirty="0"/>
+              <a:t>25% percentile</a:t>
+            </a:r>
+            <a:r>
+              <a:rPr lang="en-GB" sz="2000" dirty="0"/>
+              <a:t>, </a:t>
+            </a:r>
+            <a:r>
+              <a:rPr lang="en-GB" sz="2000" b="1" dirty="0"/>
+              <a:t>50% percentile</a:t>
+            </a:r>
+            <a:r>
+              <a:rPr lang="en-GB" sz="2000" dirty="0"/>
+              <a:t>, </a:t>
+            </a:r>
+            <a:r>
+              <a:rPr lang="en-GB" sz="2000" b="1" dirty="0"/>
+              <a:t>75% percentile</a:t>
+            </a:r>
+            <a:r>
+              <a:rPr lang="en-GB" sz="2000" dirty="0"/>
+              <a:t>, </a:t>
+            </a:r>
+            <a:r>
+              <a:rPr lang="en-GB" sz="2000" b="1" dirty="0"/>
+              <a:t>87.5% percentile</a:t>
+            </a:r>
             <a:endParaRPr lang="en-GB" sz="2000" dirty="0"/>
           </a:p>
         </p:txBody>
@@ -8097,7 +8375,7 @@
 </p:sld>
 </file>
 
-<file path=ppt/slides/slide5.xml><?xml version="1.0" encoding="utf-8"?>
+<file path=ppt/slides/slide4.xml><?xml version="1.0" encoding="utf-8"?>
 <p:sld xmlns:a="http://schemas.openxmlformats.org/drawingml/2006/main" xmlns:r="http://schemas.openxmlformats.org/officeDocument/2006/relationships" xmlns:p="http://schemas.openxmlformats.org/presentationml/2006/main">
   <p:cSld>
     <p:spTree>
@@ -10639,7 +10917,7 @@
 </p:sld>
 </file>
 
-<file path=ppt/slides/slide6.xml><?xml version="1.0" encoding="utf-8"?>
+<file path=ppt/slides/slide5.xml><?xml version="1.0" encoding="utf-8"?>
 <p:sld xmlns:a="http://schemas.openxmlformats.org/drawingml/2006/main" xmlns:r="http://schemas.openxmlformats.org/officeDocument/2006/relationships" xmlns:p="http://schemas.openxmlformats.org/presentationml/2006/main">
   <p:cSld>
     <p:spTree>
@@ -10792,7 +11070,7 @@
 </p:sld>
 </file>
 
-<file path=ppt/slides/slide7.xml><?xml version="1.0" encoding="utf-8"?>
+<file path=ppt/slides/slide6.xml><?xml version="1.0" encoding="utf-8"?>
 <p:sld xmlns:a="http://schemas.openxmlformats.org/drawingml/2006/main" xmlns:r="http://schemas.openxmlformats.org/officeDocument/2006/relationships" xmlns:p="http://schemas.openxmlformats.org/presentationml/2006/main">
   <p:cSld>
     <p:spTree>
@@ -11362,7 +11640,7 @@
 </p:sld>
 </file>
 
-<file path=ppt/slides/slide8.xml><?xml version="1.0" encoding="utf-8"?>
+<file path=ppt/slides/slide7.xml><?xml version="1.0" encoding="utf-8"?>
 <p:sld xmlns:a="http://schemas.openxmlformats.org/drawingml/2006/main" xmlns:r="http://schemas.openxmlformats.org/officeDocument/2006/relationships" xmlns:p="http://schemas.openxmlformats.org/presentationml/2006/main">
   <p:cSld>
     <p:spTree>
@@ -12177,7 +12455,7 @@
 </p:sld>
 </file>
 
-<file path=ppt/slides/slide9.xml><?xml version="1.0" encoding="utf-8"?>
+<file path=ppt/slides/slide8.xml><?xml version="1.0" encoding="utf-8"?>
 <p:sld xmlns:a="http://schemas.openxmlformats.org/drawingml/2006/main" xmlns:r="http://schemas.openxmlformats.org/officeDocument/2006/relationships" xmlns:p="http://schemas.openxmlformats.org/presentationml/2006/main">
   <p:cSld>
     <p:spTree>
@@ -12249,11 +12527,150 @@
           <a:lstStyle/>
           <a:p>
             <a:r>
-              <a:rPr lang="en-GB" sz="2000" b="1" dirty="0" err="1">
+              <a:rPr lang="en-GB" sz="2000" b="1" dirty="0">
                 <a:effectLst/>
                 <a:latin typeface="+mn-lt"/>
               </a:rPr>
-              <a:t>todo</a:t>
+              <a:t>SB_BinaryStats_mean_longstretch1 (</a:t>
+            </a:r>
+            <a:r>
+              <a:rPr lang="en-GB" sz="2000" dirty="0" err="1">
+                <a:effectLst/>
+                <a:latin typeface="+mn-lt"/>
+              </a:rPr>
+              <a:t>stretch_high</a:t>
+            </a:r>
+            <a:r>
+              <a:rPr lang="en-GB" sz="2000" b="1" dirty="0">
+                <a:effectLst/>
+                <a:latin typeface="+mn-lt"/>
+              </a:rPr>
+              <a:t>) </a:t>
+            </a:r>
+            <a:r>
+              <a:rPr lang="en-GB" sz="2000" dirty="0">
+                <a:effectLst/>
+                <a:latin typeface="+mn-lt"/>
+              </a:rPr>
+              <a:t>- Longest period of consecutive values</a:t>
+            </a:r>
+            <a:br>
+              <a:rPr lang="en-GB" sz="2000" dirty="0">
+                <a:latin typeface="+mn-lt"/>
+              </a:rPr>
+            </a:br>
+            <a:r>
+              <a:rPr lang="en-GB" sz="2000" dirty="0">
+                <a:effectLst/>
+                <a:latin typeface="+mn-lt"/>
+              </a:rPr>
+              <a:t>above the mean</a:t>
+            </a:r>
+          </a:p>
+          <a:p>
+            <a:pPr marL="114300" indent="0">
+              <a:buNone/>
+            </a:pPr>
+            <a:endParaRPr lang="en-GB" sz="2000" dirty="0">
+              <a:latin typeface="+mn-lt"/>
+            </a:endParaRPr>
+          </a:p>
+          <a:p>
+            <a:endParaRPr lang="en-GB" sz="2000" dirty="0">
+              <a:latin typeface="+mn-lt"/>
+            </a:endParaRPr>
+          </a:p>
+          <a:p>
+            <a:r>
+              <a:rPr lang="en-GB" sz="2000" b="1" dirty="0">
+                <a:effectLst/>
+                <a:latin typeface="+mn-lt"/>
+              </a:rPr>
+              <a:t>SP_Summaries_welch_rect_area_5_1 (</a:t>
+            </a:r>
+            <a:r>
+              <a:rPr lang="en-GB" sz="2000" dirty="0" err="1">
+                <a:effectLst/>
+                <a:latin typeface="+mn-lt"/>
+              </a:rPr>
+              <a:t>low_freq_power</a:t>
+            </a:r>
+            <a:r>
+              <a:rPr lang="en-GB" sz="2000" b="1" dirty="0">
+                <a:effectLst/>
+                <a:latin typeface="+mn-lt"/>
+              </a:rPr>
+              <a:t>) </a:t>
+            </a:r>
+            <a:r>
+              <a:rPr lang="en-GB" sz="2000" dirty="0">
+                <a:effectLst/>
+                <a:latin typeface="+mn-lt"/>
+              </a:rPr>
+              <a:t>- Total power in lowest fifth of frequencies in the Fourier power spectrum</a:t>
+            </a:r>
+          </a:p>
+          <a:p>
+            <a:endParaRPr lang="en-GB" sz="2000" dirty="0">
+              <a:latin typeface="+mn-lt"/>
+            </a:endParaRPr>
+          </a:p>
+          <a:p>
+            <a:endParaRPr lang="en-GB" sz="2000" dirty="0">
+              <a:latin typeface="+mn-lt"/>
+            </a:endParaRPr>
+          </a:p>
+          <a:p>
+            <a:r>
+              <a:rPr lang="en-GB" sz="2000" b="1" dirty="0">
+                <a:latin typeface="+mn-lt"/>
+              </a:rPr>
+              <a:t>FC_LocalSimple_mean3_stderr </a:t>
+            </a:r>
+            <a:r>
+              <a:rPr lang="en-GB" sz="2000" b="1" dirty="0">
+                <a:effectLst/>
+                <a:latin typeface="+mn-lt"/>
+              </a:rPr>
+              <a:t>(</a:t>
+            </a:r>
+            <a:r>
+              <a:rPr kumimoji="0" lang="en-US" altLang="en-US" sz="2000" b="0" i="0" u="none" strike="noStrike" cap="none" normalizeH="0" baseline="0" dirty="0" err="1">
+                <a:ln>
+                  <a:noFill/>
+                </a:ln>
+                <a:solidFill>
+                  <a:schemeClr val="tx1"/>
+                </a:solidFill>
+                <a:effectLst/>
+                <a:latin typeface="Arial Unicode MS"/>
+              </a:rPr>
+              <a:t>forecast_error</a:t>
+            </a:r>
+            <a:r>
+              <a:rPr kumimoji="0" lang="en-US" altLang="en-US" sz="1600" b="0" i="0" u="none" strike="noStrike" cap="none" normalizeH="0" baseline="0" dirty="0">
+                <a:ln>
+                  <a:noFill/>
+                </a:ln>
+                <a:solidFill>
+                  <a:schemeClr val="tx1"/>
+                </a:solidFill>
+                <a:effectLst/>
+              </a:rPr>
+              <a:t> </a:t>
+            </a:r>
+            <a:r>
+              <a:rPr lang="en-GB" sz="2000" b="1" dirty="0">
+                <a:effectLst/>
+                <a:latin typeface="+mn-lt"/>
+              </a:rPr>
+              <a:t>) </a:t>
+            </a:r>
+            <a:r>
+              <a:rPr lang="en-GB" sz="2000" dirty="0">
+                <a:latin typeface="+mn-lt"/>
+              </a:rPr>
+              <a:t>– Mean error from a rolling 3-sample mean forecasting</a:t>
             </a:r>
             <a:endParaRPr lang="en-GB" sz="2000" dirty="0">
               <a:effectLst/>
@@ -12261,12 +12678,352 @@
             </a:endParaRPr>
           </a:p>
           <a:p>
+            <a:pPr marL="114300" indent="0">
+              <a:buNone/>
+            </a:pPr>
+            <a:endParaRPr lang="en-GB" sz="2000" dirty="0">
+              <a:latin typeface="+mn-lt"/>
+            </a:endParaRPr>
+          </a:p>
+          <a:p>
+            <a:pPr marL="114300" indent="0">
+              <a:buNone/>
+            </a:pPr>
+            <a:endParaRPr lang="en-GB" sz="2000" dirty="0">
+              <a:latin typeface="+mn-lt"/>
+            </a:endParaRPr>
+          </a:p>
+          <a:p>
+            <a:r>
+              <a:rPr lang="en-GB" sz="2000" b="1" dirty="0">
+                <a:effectLst/>
+                <a:latin typeface="+mn-lt"/>
+              </a:rPr>
+              <a:t>DN_OutlierInclude_p_001_mdrmd (</a:t>
+            </a:r>
+            <a:r>
+              <a:rPr lang="en-GB" sz="2000" dirty="0" err="1">
+                <a:effectLst/>
+                <a:latin typeface="+mn-lt"/>
+              </a:rPr>
+              <a:t>outlier_timing_pos</a:t>
+            </a:r>
+            <a:r>
+              <a:rPr lang="en-GB" sz="2000" b="1" dirty="0">
+                <a:effectLst/>
+                <a:latin typeface="+mn-lt"/>
+              </a:rPr>
+              <a:t>) </a:t>
+            </a:r>
+            <a:r>
+              <a:rPr lang="en-GB" sz="2000" dirty="0">
+                <a:effectLst/>
+                <a:latin typeface="+mn-lt"/>
+              </a:rPr>
+              <a:t>– Time intervals between successive extreme events above the mean</a:t>
+            </a:r>
+          </a:p>
+          <a:p>
+            <a:pPr marL="114300" indent="0">
+              <a:buNone/>
+            </a:pPr>
             <a:endParaRPr lang="en-GB" sz="2000" dirty="0">
               <a:latin typeface="Times New Roman" panose="02020603050405020304" pitchFamily="18" charset="0"/>
             </a:endParaRPr>
           </a:p>
           <a:p>
             <a:endParaRPr lang="en-GB" sz="2000" dirty="0"/>
+          </a:p>
+        </p:txBody>
+      </p:sp>
+      <p:sp>
+        <p:nvSpPr>
+          <p:cNvPr id="2" name="Text Placeholder 1">
+            <a:extLst>
+              <a:ext uri="{FF2B5EF4-FFF2-40B4-BE49-F238E27FC236}">
+                <a16:creationId xmlns:a16="http://schemas.microsoft.com/office/drawing/2014/main" id="{3F2C0817-DE85-46D4-0511-88F4E8158A7A}"/>
+              </a:ext>
+            </a:extLst>
+          </p:cNvPr>
+          <p:cNvSpPr txBox="1">
+            <a:spLocks/>
+          </p:cNvSpPr>
+          <p:nvPr/>
+        </p:nvSpPr>
+        <p:spPr>
+          <a:xfrm>
+            <a:off x="208336" y="6278880"/>
+            <a:ext cx="11568064" cy="387840"/>
+          </a:xfrm>
+          <a:prstGeom prst="rect">
+            <a:avLst/>
+          </a:prstGeom>
+        </p:spPr>
+        <p:txBody>
+          <a:bodyPr spcFirstLastPara="1" wrap="square" lIns="91425" tIns="91425" rIns="91425" bIns="91425" anchor="t" anchorCtr="0"/>
+          <a:lstStyle>
+            <a:defPPr marR="0" lvl="0" algn="l" rtl="0">
+              <a:lnSpc>
+                <a:spcPct val="100000"/>
+              </a:lnSpc>
+              <a:spcBef>
+                <a:spcPts val="0"/>
+              </a:spcBef>
+              <a:spcAft>
+                <a:spcPts val="0"/>
+              </a:spcAft>
+            </a:defPPr>
+            <a:lvl1pPr marL="457200" marR="0" lvl="0" indent="-342900" algn="l" rtl="0">
+              <a:lnSpc>
+                <a:spcPct val="100000"/>
+              </a:lnSpc>
+              <a:spcBef>
+                <a:spcPts val="0"/>
+              </a:spcBef>
+              <a:spcAft>
+                <a:spcPts val="0"/>
+              </a:spcAft>
+              <a:buClr>
+                <a:srgbClr val="500064"/>
+              </a:buClr>
+              <a:buSzPts val="1800"/>
+              <a:buFont typeface="Arial"/>
+              <a:buChar char="●"/>
+              <a:defRPr sz="1800" b="0" i="0" u="none" strike="noStrike" cap="none">
+                <a:solidFill>
+                  <a:schemeClr val="tx1"/>
+                </a:solidFill>
+                <a:latin typeface="Aptos" panose="020B0004020202020204" pitchFamily="34" charset="0"/>
+                <a:ea typeface="Arial"/>
+                <a:cs typeface="Arial"/>
+                <a:sym typeface="Arial"/>
+              </a:defRPr>
+            </a:lvl1pPr>
+            <a:lvl2pPr marL="914400" marR="0" lvl="1" indent="-317500" algn="l" rtl="0">
+              <a:lnSpc>
+                <a:spcPct val="100000"/>
+              </a:lnSpc>
+              <a:spcBef>
+                <a:spcPts val="1600"/>
+              </a:spcBef>
+              <a:spcAft>
+                <a:spcPts val="0"/>
+              </a:spcAft>
+              <a:buClr>
+                <a:srgbClr val="000000"/>
+              </a:buClr>
+              <a:buSzPts val="1400"/>
+              <a:buFont typeface="Arial"/>
+              <a:buChar char="○"/>
+              <a:defRPr sz="1400" b="0" i="0" u="none" strike="noStrike" cap="none">
+                <a:solidFill>
+                  <a:srgbClr val="000000"/>
+                </a:solidFill>
+                <a:latin typeface="Arial"/>
+                <a:ea typeface="Arial"/>
+                <a:cs typeface="Arial"/>
+                <a:sym typeface="Arial"/>
+              </a:defRPr>
+            </a:lvl2pPr>
+            <a:lvl3pPr marL="1371600" marR="0" lvl="2" indent="-317500" algn="l" rtl="0">
+              <a:lnSpc>
+                <a:spcPct val="100000"/>
+              </a:lnSpc>
+              <a:spcBef>
+                <a:spcPts val="1600"/>
+              </a:spcBef>
+              <a:spcAft>
+                <a:spcPts val="0"/>
+              </a:spcAft>
+              <a:buClr>
+                <a:srgbClr val="000000"/>
+              </a:buClr>
+              <a:buSzPts val="1400"/>
+              <a:buFont typeface="Arial"/>
+              <a:buChar char="■"/>
+              <a:defRPr sz="1400" b="0" i="0" u="none" strike="noStrike" cap="none">
+                <a:solidFill>
+                  <a:srgbClr val="000000"/>
+                </a:solidFill>
+                <a:latin typeface="Arial"/>
+                <a:ea typeface="Arial"/>
+                <a:cs typeface="Arial"/>
+                <a:sym typeface="Arial"/>
+              </a:defRPr>
+            </a:lvl3pPr>
+            <a:lvl4pPr marL="1828800" marR="0" lvl="3" indent="-317500" algn="l" rtl="0">
+              <a:lnSpc>
+                <a:spcPct val="100000"/>
+              </a:lnSpc>
+              <a:spcBef>
+                <a:spcPts val="1600"/>
+              </a:spcBef>
+              <a:spcAft>
+                <a:spcPts val="0"/>
+              </a:spcAft>
+              <a:buClr>
+                <a:srgbClr val="000000"/>
+              </a:buClr>
+              <a:buSzPts val="1400"/>
+              <a:buFont typeface="Arial"/>
+              <a:buChar char="●"/>
+              <a:defRPr sz="1400" b="0" i="0" u="none" strike="noStrike" cap="none">
+                <a:solidFill>
+                  <a:srgbClr val="000000"/>
+                </a:solidFill>
+                <a:latin typeface="Arial"/>
+                <a:ea typeface="Arial"/>
+                <a:cs typeface="Arial"/>
+                <a:sym typeface="Arial"/>
+              </a:defRPr>
+            </a:lvl4pPr>
+            <a:lvl5pPr marL="2286000" marR="0" lvl="4" indent="-317500" algn="l" rtl="0">
+              <a:lnSpc>
+                <a:spcPct val="100000"/>
+              </a:lnSpc>
+              <a:spcBef>
+                <a:spcPts val="1600"/>
+              </a:spcBef>
+              <a:spcAft>
+                <a:spcPts val="0"/>
+              </a:spcAft>
+              <a:buClr>
+                <a:srgbClr val="000000"/>
+              </a:buClr>
+              <a:buSzPts val="1400"/>
+              <a:buFont typeface="Arial"/>
+              <a:buChar char="○"/>
+              <a:defRPr sz="1400" b="0" i="0" u="none" strike="noStrike" cap="none">
+                <a:solidFill>
+                  <a:srgbClr val="000000"/>
+                </a:solidFill>
+                <a:latin typeface="Arial"/>
+                <a:ea typeface="Arial"/>
+                <a:cs typeface="Arial"/>
+                <a:sym typeface="Arial"/>
+              </a:defRPr>
+            </a:lvl5pPr>
+            <a:lvl6pPr marL="2743200" marR="0" lvl="5" indent="-317500" algn="l" rtl="0">
+              <a:lnSpc>
+                <a:spcPct val="100000"/>
+              </a:lnSpc>
+              <a:spcBef>
+                <a:spcPts val="1600"/>
+              </a:spcBef>
+              <a:spcAft>
+                <a:spcPts val="0"/>
+              </a:spcAft>
+              <a:buClr>
+                <a:srgbClr val="000000"/>
+              </a:buClr>
+              <a:buSzPts val="1400"/>
+              <a:buFont typeface="Arial"/>
+              <a:buChar char="■"/>
+              <a:defRPr sz="1400" b="0" i="0" u="none" strike="noStrike" cap="none">
+                <a:solidFill>
+                  <a:srgbClr val="000000"/>
+                </a:solidFill>
+                <a:latin typeface="Arial"/>
+                <a:ea typeface="Arial"/>
+                <a:cs typeface="Arial"/>
+                <a:sym typeface="Arial"/>
+              </a:defRPr>
+            </a:lvl6pPr>
+            <a:lvl7pPr marL="3200400" marR="0" lvl="6" indent="-317500" algn="l" rtl="0">
+              <a:lnSpc>
+                <a:spcPct val="100000"/>
+              </a:lnSpc>
+              <a:spcBef>
+                <a:spcPts val="1600"/>
+              </a:spcBef>
+              <a:spcAft>
+                <a:spcPts val="0"/>
+              </a:spcAft>
+              <a:buClr>
+                <a:srgbClr val="000000"/>
+              </a:buClr>
+              <a:buSzPts val="1400"/>
+              <a:buFont typeface="Arial"/>
+              <a:buChar char="●"/>
+              <a:defRPr sz="1400" b="0" i="0" u="none" strike="noStrike" cap="none">
+                <a:solidFill>
+                  <a:srgbClr val="000000"/>
+                </a:solidFill>
+                <a:latin typeface="Arial"/>
+                <a:ea typeface="Arial"/>
+                <a:cs typeface="Arial"/>
+                <a:sym typeface="Arial"/>
+              </a:defRPr>
+            </a:lvl7pPr>
+            <a:lvl8pPr marL="3657600" marR="0" lvl="7" indent="-317500" algn="l" rtl="0">
+              <a:lnSpc>
+                <a:spcPct val="100000"/>
+              </a:lnSpc>
+              <a:spcBef>
+                <a:spcPts val="1600"/>
+              </a:spcBef>
+              <a:spcAft>
+                <a:spcPts val="0"/>
+              </a:spcAft>
+              <a:buClr>
+                <a:srgbClr val="000000"/>
+              </a:buClr>
+              <a:buSzPts val="1400"/>
+              <a:buFont typeface="Arial"/>
+              <a:buChar char="○"/>
+              <a:defRPr sz="1400" b="0" i="0" u="none" strike="noStrike" cap="none">
+                <a:solidFill>
+                  <a:srgbClr val="000000"/>
+                </a:solidFill>
+                <a:latin typeface="Arial"/>
+                <a:ea typeface="Arial"/>
+                <a:cs typeface="Arial"/>
+                <a:sym typeface="Arial"/>
+              </a:defRPr>
+            </a:lvl8pPr>
+            <a:lvl9pPr marL="4114800" marR="0" lvl="8" indent="-317500" algn="l" rtl="0">
+              <a:lnSpc>
+                <a:spcPct val="100000"/>
+              </a:lnSpc>
+              <a:spcBef>
+                <a:spcPts val="1600"/>
+              </a:spcBef>
+              <a:spcAft>
+                <a:spcPts val="1600"/>
+              </a:spcAft>
+              <a:buClr>
+                <a:srgbClr val="000000"/>
+              </a:buClr>
+              <a:buSzPts val="1400"/>
+              <a:buFont typeface="Arial"/>
+              <a:buChar char="■"/>
+              <a:defRPr sz="1400" b="0" i="0" u="none" strike="noStrike" cap="none">
+                <a:solidFill>
+                  <a:srgbClr val="000000"/>
+                </a:solidFill>
+                <a:latin typeface="Arial"/>
+                <a:ea typeface="Arial"/>
+                <a:cs typeface="Arial"/>
+                <a:sym typeface="Arial"/>
+              </a:defRPr>
+            </a:lvl9pPr>
+          </a:lstStyle>
+          <a:p>
+            <a:pPr marL="114300" indent="0">
+              <a:buFont typeface="Arial"/>
+              <a:buNone/>
+            </a:pPr>
+            <a:r>
+              <a:rPr lang="en-GB" sz="1400" dirty="0"/>
+              <a:t>Further descriptions: </a:t>
+            </a:r>
+            <a:r>
+              <a:rPr lang="en-GB" sz="1400" dirty="0">
+                <a:hlinkClick r:id="rId3"/>
+              </a:rPr>
+              <a:t>https://time-series-features.gitbook.io/catch22/information-about-catch22/feature-descriptions</a:t>
+            </a:r>
+            <a:endParaRPr lang="en-GB" sz="1400" dirty="0"/>
           </a:p>
         </p:txBody>
       </p:sp>
@@ -12274,6 +13031,558 @@
     <p:extLst>
       <p:ext uri="{BB962C8B-B14F-4D97-AF65-F5344CB8AC3E}">
         <p14:creationId xmlns:p14="http://schemas.microsoft.com/office/powerpoint/2010/main" val="2877408820"/>
+      </p:ext>
+    </p:extLst>
+  </p:cSld>
+  <p:clrMapOvr>
+    <a:masterClrMapping/>
+  </p:clrMapOvr>
+</p:sld>
+</file>
+
+<file path=ppt/slides/slide9.xml><?xml version="1.0" encoding="utf-8"?>
+<p:sld xmlns:a="http://schemas.openxmlformats.org/drawingml/2006/main" xmlns:r="http://schemas.openxmlformats.org/officeDocument/2006/relationships" xmlns:p="http://schemas.openxmlformats.org/presentationml/2006/main">
+  <p:cSld>
+    <p:spTree>
+      <p:nvGrpSpPr>
+        <p:cNvPr id="1" name=""/>
+        <p:cNvGrpSpPr/>
+        <p:nvPr/>
+      </p:nvGrpSpPr>
+      <p:grpSpPr>
+        <a:xfrm>
+          <a:off x="0" y="0"/>
+          <a:ext cx="0" cy="0"/>
+          <a:chOff x="0" y="0"/>
+          <a:chExt cx="0" cy="0"/>
+        </a:xfrm>
+      </p:grpSpPr>
+      <p:sp>
+        <p:nvSpPr>
+          <p:cNvPr id="2" name="Text Placeholder 1">
+            <a:extLst>
+              <a:ext uri="{FF2B5EF4-FFF2-40B4-BE49-F238E27FC236}">
+                <a16:creationId xmlns:a16="http://schemas.microsoft.com/office/drawing/2014/main" id="{4E2E7867-6C62-6814-B5A6-64F1AF853927}"/>
+              </a:ext>
+            </a:extLst>
+          </p:cNvPr>
+          <p:cNvSpPr>
+            <a:spLocks noGrp="1"/>
+          </p:cNvSpPr>
+          <p:nvPr>
+            <p:ph type="body" idx="1"/>
+          </p:nvPr>
+        </p:nvSpPr>
+        <p:spPr>
+          <a:xfrm>
+            <a:off x="549712" y="1514121"/>
+            <a:ext cx="5680400" cy="4555200"/>
+          </a:xfrm>
+        </p:spPr>
+        <p:txBody>
+          <a:bodyPr/>
+          <a:lstStyle/>
+          <a:p>
+            <a:pPr marL="114300" indent="0">
+              <a:buNone/>
+            </a:pPr>
+            <a:r>
+              <a:rPr lang="en-GB" sz="2000" b="1" dirty="0" err="1"/>
+              <a:t>TSFresh</a:t>
+            </a:r>
+            <a:r>
+              <a:rPr lang="en-GB" sz="2000" b="1" dirty="0"/>
+              <a:t> feature set</a:t>
+            </a:r>
+          </a:p>
+          <a:p>
+            <a:pPr marL="114300" indent="0">
+              <a:buFont typeface="Arial"/>
+              <a:buNone/>
+            </a:pPr>
+            <a:endParaRPr lang="en-GB" sz="2000" b="1" dirty="0"/>
+          </a:p>
+          <a:p>
+            <a:pPr marL="114300" indent="0">
+              <a:buFont typeface="Arial"/>
+              <a:buNone/>
+            </a:pPr>
+            <a:endParaRPr lang="en-GB" sz="2000" b="1" dirty="0"/>
+          </a:p>
+          <a:p>
+            <a:pPr marL="114300" indent="0">
+              <a:buFont typeface="Arial"/>
+              <a:buNone/>
+            </a:pPr>
+            <a:r>
+              <a:rPr lang="en-GB" sz="2000" dirty="0"/>
+              <a:t>Just under 800 features (no features selection).</a:t>
+            </a:r>
+          </a:p>
+          <a:p>
+            <a:pPr marL="114300" indent="0">
+              <a:buFont typeface="Arial"/>
+              <a:buNone/>
+            </a:pPr>
+            <a:endParaRPr lang="en-GB" sz="2000" dirty="0"/>
+          </a:p>
+          <a:p>
+            <a:pPr marL="114300" indent="0">
+              <a:buFont typeface="Arial"/>
+              <a:buNone/>
+            </a:pPr>
+            <a:r>
+              <a:rPr lang="en-GB" sz="2000" dirty="0"/>
+              <a:t>Implemented in Python.</a:t>
+            </a:r>
+          </a:p>
+          <a:p>
+            <a:pPr marL="114300" indent="0">
+              <a:buFont typeface="Arial"/>
+              <a:buNone/>
+            </a:pPr>
+            <a:endParaRPr lang="en-GB" sz="2000" dirty="0"/>
+          </a:p>
+          <a:p>
+            <a:pPr marL="114300" indent="0">
+              <a:buFont typeface="Arial"/>
+              <a:buNone/>
+            </a:pPr>
+            <a:r>
+              <a:rPr lang="en-GB" sz="2000" dirty="0"/>
+              <a:t>One of the more popular feature sets (Over 8000 GitHub start and 1000 citations)</a:t>
+            </a:r>
+          </a:p>
+          <a:p>
+            <a:pPr marL="114300" indent="0">
+              <a:buFont typeface="Arial"/>
+              <a:buNone/>
+            </a:pPr>
+            <a:endParaRPr lang="en-GB" sz="2000" dirty="0"/>
+          </a:p>
+          <a:p>
+            <a:pPr marL="114300" indent="0">
+              <a:buFont typeface="Arial"/>
+              <a:buNone/>
+            </a:pPr>
+            <a:endParaRPr lang="en-GB" sz="2000" dirty="0"/>
+          </a:p>
+          <a:p>
+            <a:pPr marL="114300" indent="0">
+              <a:buFont typeface="Arial"/>
+              <a:buNone/>
+            </a:pPr>
+            <a:r>
+              <a:rPr lang="en-GB" sz="2000" i="1" u="sng" dirty="0"/>
+              <a:t>https://github.com/blue-yonder/tsfresh</a:t>
+            </a:r>
+          </a:p>
+          <a:p>
+            <a:pPr marL="114300" indent="0">
+              <a:buNone/>
+            </a:pPr>
+            <a:endParaRPr lang="en-GB" sz="2000" dirty="0"/>
+          </a:p>
+        </p:txBody>
+      </p:sp>
+      <p:sp>
+        <p:nvSpPr>
+          <p:cNvPr id="3" name="Title 2">
+            <a:extLst>
+              <a:ext uri="{FF2B5EF4-FFF2-40B4-BE49-F238E27FC236}">
+                <a16:creationId xmlns:a16="http://schemas.microsoft.com/office/drawing/2014/main" id="{899533FC-BE2F-24D0-E4BA-AC770051A2B3}"/>
+              </a:ext>
+            </a:extLst>
+          </p:cNvPr>
+          <p:cNvSpPr>
+            <a:spLocks noGrp="1"/>
+          </p:cNvSpPr>
+          <p:nvPr>
+            <p:ph type="title"/>
+          </p:nvPr>
+        </p:nvSpPr>
+        <p:spPr/>
+        <p:txBody>
+          <a:bodyPr/>
+          <a:lstStyle/>
+          <a:p>
+            <a:pPr marL="114300" indent="0">
+              <a:buFont typeface="Arial"/>
+              <a:buNone/>
+            </a:pPr>
+            <a:r>
+              <a:rPr lang="en-GB" sz="2400" b="1" dirty="0"/>
+              <a:t>Time Series Feature extraction based on scalable hypothesis tests (</a:t>
+            </a:r>
+            <a:r>
+              <a:rPr lang="en-GB" sz="2400" b="1" dirty="0" err="1"/>
+              <a:t>TSFresh</a:t>
+            </a:r>
+            <a:r>
+              <a:rPr lang="en-GB" sz="2400" b="1" dirty="0"/>
+              <a:t>)</a:t>
+            </a:r>
+          </a:p>
+        </p:txBody>
+      </p:sp>
+      <p:pic>
+        <p:nvPicPr>
+          <p:cNvPr id="5" name="Picture 4">
+            <a:extLst>
+              <a:ext uri="{FF2B5EF4-FFF2-40B4-BE49-F238E27FC236}">
+                <a16:creationId xmlns:a16="http://schemas.microsoft.com/office/drawing/2014/main" id="{6A382F17-A944-C9CE-4792-2AD38277D8C0}"/>
+              </a:ext>
+            </a:extLst>
+          </p:cNvPr>
+          <p:cNvPicPr>
+            <a:picLocks noChangeAspect="1"/>
+          </p:cNvPicPr>
+          <p:nvPr/>
+        </p:nvPicPr>
+        <p:blipFill>
+          <a:blip r:embed="rId3"/>
+          <a:stretch>
+            <a:fillRect/>
+          </a:stretch>
+        </p:blipFill>
+        <p:spPr>
+          <a:xfrm>
+            <a:off x="7058586" y="2228489"/>
+            <a:ext cx="3931205" cy="2401021"/>
+          </a:xfrm>
+          <a:prstGeom prst="rect">
+            <a:avLst/>
+          </a:prstGeom>
+        </p:spPr>
+      </p:pic>
+      <p:sp>
+        <p:nvSpPr>
+          <p:cNvPr id="4" name="Text Placeholder 1">
+            <a:extLst>
+              <a:ext uri="{FF2B5EF4-FFF2-40B4-BE49-F238E27FC236}">
+                <a16:creationId xmlns:a16="http://schemas.microsoft.com/office/drawing/2014/main" id="{D5EE724A-60FD-D922-453C-9202E32FECE8}"/>
+              </a:ext>
+            </a:extLst>
+          </p:cNvPr>
+          <p:cNvSpPr txBox="1">
+            <a:spLocks/>
+          </p:cNvSpPr>
+          <p:nvPr/>
+        </p:nvSpPr>
+        <p:spPr>
+          <a:xfrm>
+            <a:off x="208336" y="6069321"/>
+            <a:ext cx="11568064" cy="597399"/>
+          </a:xfrm>
+          <a:prstGeom prst="rect">
+            <a:avLst/>
+          </a:prstGeom>
+        </p:spPr>
+        <p:txBody>
+          <a:bodyPr spcFirstLastPara="1" wrap="square" lIns="91425" tIns="91425" rIns="91425" bIns="91425" anchor="t" anchorCtr="0"/>
+          <a:lstStyle>
+            <a:defPPr marR="0" lvl="0" algn="l" rtl="0">
+              <a:lnSpc>
+                <a:spcPct val="100000"/>
+              </a:lnSpc>
+              <a:spcBef>
+                <a:spcPts val="0"/>
+              </a:spcBef>
+              <a:spcAft>
+                <a:spcPts val="0"/>
+              </a:spcAft>
+            </a:defPPr>
+            <a:lvl1pPr marL="457200" marR="0" lvl="0" indent="-342900" algn="l" rtl="0">
+              <a:lnSpc>
+                <a:spcPct val="100000"/>
+              </a:lnSpc>
+              <a:spcBef>
+                <a:spcPts val="0"/>
+              </a:spcBef>
+              <a:spcAft>
+                <a:spcPts val="0"/>
+              </a:spcAft>
+              <a:buClr>
+                <a:srgbClr val="500064"/>
+              </a:buClr>
+              <a:buSzPts val="1800"/>
+              <a:buFont typeface="Arial"/>
+              <a:buChar char="●"/>
+              <a:defRPr sz="1800" b="0" i="0" u="none" strike="noStrike" cap="none">
+                <a:solidFill>
+                  <a:schemeClr val="tx1"/>
+                </a:solidFill>
+                <a:latin typeface="Aptos" panose="020B0004020202020204" pitchFamily="34" charset="0"/>
+                <a:ea typeface="Arial"/>
+                <a:cs typeface="Arial"/>
+                <a:sym typeface="Arial"/>
+              </a:defRPr>
+            </a:lvl1pPr>
+            <a:lvl2pPr marL="914400" marR="0" lvl="1" indent="-317500" algn="l" rtl="0">
+              <a:lnSpc>
+                <a:spcPct val="100000"/>
+              </a:lnSpc>
+              <a:spcBef>
+                <a:spcPts val="1600"/>
+              </a:spcBef>
+              <a:spcAft>
+                <a:spcPts val="0"/>
+              </a:spcAft>
+              <a:buClr>
+                <a:srgbClr val="000000"/>
+              </a:buClr>
+              <a:buSzPts val="1400"/>
+              <a:buFont typeface="Arial"/>
+              <a:buChar char="○"/>
+              <a:defRPr sz="1400" b="0" i="0" u="none" strike="noStrike" cap="none">
+                <a:solidFill>
+                  <a:srgbClr val="000000"/>
+                </a:solidFill>
+                <a:latin typeface="Arial"/>
+                <a:ea typeface="Arial"/>
+                <a:cs typeface="Arial"/>
+                <a:sym typeface="Arial"/>
+              </a:defRPr>
+            </a:lvl2pPr>
+            <a:lvl3pPr marL="1371600" marR="0" lvl="2" indent="-317500" algn="l" rtl="0">
+              <a:lnSpc>
+                <a:spcPct val="100000"/>
+              </a:lnSpc>
+              <a:spcBef>
+                <a:spcPts val="1600"/>
+              </a:spcBef>
+              <a:spcAft>
+                <a:spcPts val="0"/>
+              </a:spcAft>
+              <a:buClr>
+                <a:srgbClr val="000000"/>
+              </a:buClr>
+              <a:buSzPts val="1400"/>
+              <a:buFont typeface="Arial"/>
+              <a:buChar char="■"/>
+              <a:defRPr sz="1400" b="0" i="0" u="none" strike="noStrike" cap="none">
+                <a:solidFill>
+                  <a:srgbClr val="000000"/>
+                </a:solidFill>
+                <a:latin typeface="Arial"/>
+                <a:ea typeface="Arial"/>
+                <a:cs typeface="Arial"/>
+                <a:sym typeface="Arial"/>
+              </a:defRPr>
+            </a:lvl3pPr>
+            <a:lvl4pPr marL="1828800" marR="0" lvl="3" indent="-317500" algn="l" rtl="0">
+              <a:lnSpc>
+                <a:spcPct val="100000"/>
+              </a:lnSpc>
+              <a:spcBef>
+                <a:spcPts val="1600"/>
+              </a:spcBef>
+              <a:spcAft>
+                <a:spcPts val="0"/>
+              </a:spcAft>
+              <a:buClr>
+                <a:srgbClr val="000000"/>
+              </a:buClr>
+              <a:buSzPts val="1400"/>
+              <a:buFont typeface="Arial"/>
+              <a:buChar char="●"/>
+              <a:defRPr sz="1400" b="0" i="0" u="none" strike="noStrike" cap="none">
+                <a:solidFill>
+                  <a:srgbClr val="000000"/>
+                </a:solidFill>
+                <a:latin typeface="Arial"/>
+                <a:ea typeface="Arial"/>
+                <a:cs typeface="Arial"/>
+                <a:sym typeface="Arial"/>
+              </a:defRPr>
+            </a:lvl4pPr>
+            <a:lvl5pPr marL="2286000" marR="0" lvl="4" indent="-317500" algn="l" rtl="0">
+              <a:lnSpc>
+                <a:spcPct val="100000"/>
+              </a:lnSpc>
+              <a:spcBef>
+                <a:spcPts val="1600"/>
+              </a:spcBef>
+              <a:spcAft>
+                <a:spcPts val="0"/>
+              </a:spcAft>
+              <a:buClr>
+                <a:srgbClr val="000000"/>
+              </a:buClr>
+              <a:buSzPts val="1400"/>
+              <a:buFont typeface="Arial"/>
+              <a:buChar char="○"/>
+              <a:defRPr sz="1400" b="0" i="0" u="none" strike="noStrike" cap="none">
+                <a:solidFill>
+                  <a:srgbClr val="000000"/>
+                </a:solidFill>
+                <a:latin typeface="Arial"/>
+                <a:ea typeface="Arial"/>
+                <a:cs typeface="Arial"/>
+                <a:sym typeface="Arial"/>
+              </a:defRPr>
+            </a:lvl5pPr>
+            <a:lvl6pPr marL="2743200" marR="0" lvl="5" indent="-317500" algn="l" rtl="0">
+              <a:lnSpc>
+                <a:spcPct val="100000"/>
+              </a:lnSpc>
+              <a:spcBef>
+                <a:spcPts val="1600"/>
+              </a:spcBef>
+              <a:spcAft>
+                <a:spcPts val="0"/>
+              </a:spcAft>
+              <a:buClr>
+                <a:srgbClr val="000000"/>
+              </a:buClr>
+              <a:buSzPts val="1400"/>
+              <a:buFont typeface="Arial"/>
+              <a:buChar char="■"/>
+              <a:defRPr sz="1400" b="0" i="0" u="none" strike="noStrike" cap="none">
+                <a:solidFill>
+                  <a:srgbClr val="000000"/>
+                </a:solidFill>
+                <a:latin typeface="Arial"/>
+                <a:ea typeface="Arial"/>
+                <a:cs typeface="Arial"/>
+                <a:sym typeface="Arial"/>
+              </a:defRPr>
+            </a:lvl6pPr>
+            <a:lvl7pPr marL="3200400" marR="0" lvl="6" indent="-317500" algn="l" rtl="0">
+              <a:lnSpc>
+                <a:spcPct val="100000"/>
+              </a:lnSpc>
+              <a:spcBef>
+                <a:spcPts val="1600"/>
+              </a:spcBef>
+              <a:spcAft>
+                <a:spcPts val="0"/>
+              </a:spcAft>
+              <a:buClr>
+                <a:srgbClr val="000000"/>
+              </a:buClr>
+              <a:buSzPts val="1400"/>
+              <a:buFont typeface="Arial"/>
+              <a:buChar char="●"/>
+              <a:defRPr sz="1400" b="0" i="0" u="none" strike="noStrike" cap="none">
+                <a:solidFill>
+                  <a:srgbClr val="000000"/>
+                </a:solidFill>
+                <a:latin typeface="Arial"/>
+                <a:ea typeface="Arial"/>
+                <a:cs typeface="Arial"/>
+                <a:sym typeface="Arial"/>
+              </a:defRPr>
+            </a:lvl7pPr>
+            <a:lvl8pPr marL="3657600" marR="0" lvl="7" indent="-317500" algn="l" rtl="0">
+              <a:lnSpc>
+                <a:spcPct val="100000"/>
+              </a:lnSpc>
+              <a:spcBef>
+                <a:spcPts val="1600"/>
+              </a:spcBef>
+              <a:spcAft>
+                <a:spcPts val="0"/>
+              </a:spcAft>
+              <a:buClr>
+                <a:srgbClr val="000000"/>
+              </a:buClr>
+              <a:buSzPts val="1400"/>
+              <a:buFont typeface="Arial"/>
+              <a:buChar char="○"/>
+              <a:defRPr sz="1400" b="0" i="0" u="none" strike="noStrike" cap="none">
+                <a:solidFill>
+                  <a:srgbClr val="000000"/>
+                </a:solidFill>
+                <a:latin typeface="Arial"/>
+                <a:ea typeface="Arial"/>
+                <a:cs typeface="Arial"/>
+                <a:sym typeface="Arial"/>
+              </a:defRPr>
+            </a:lvl8pPr>
+            <a:lvl9pPr marL="4114800" marR="0" lvl="8" indent="-317500" algn="l" rtl="0">
+              <a:lnSpc>
+                <a:spcPct val="100000"/>
+              </a:lnSpc>
+              <a:spcBef>
+                <a:spcPts val="1600"/>
+              </a:spcBef>
+              <a:spcAft>
+                <a:spcPts val="1600"/>
+              </a:spcAft>
+              <a:buClr>
+                <a:srgbClr val="000000"/>
+              </a:buClr>
+              <a:buSzPts val="1400"/>
+              <a:buFont typeface="Arial"/>
+              <a:buChar char="■"/>
+              <a:defRPr sz="1400" b="0" i="0" u="none" strike="noStrike" cap="none">
+                <a:solidFill>
+                  <a:srgbClr val="000000"/>
+                </a:solidFill>
+                <a:latin typeface="Arial"/>
+                <a:ea typeface="Arial"/>
+                <a:cs typeface="Arial"/>
+                <a:sym typeface="Arial"/>
+              </a:defRPr>
+            </a:lvl9pPr>
+          </a:lstStyle>
+          <a:p>
+            <a:pPr marL="114300" indent="0">
+              <a:buFont typeface="Arial"/>
+              <a:buNone/>
+            </a:pPr>
+            <a:r>
+              <a:rPr lang="en-GB" sz="1400" dirty="0"/>
+              <a:t>Christ, M., Braun, N., </a:t>
+            </a:r>
+            <a:r>
+              <a:rPr lang="en-GB" sz="1400" dirty="0" err="1"/>
+              <a:t>Neuffer</a:t>
+            </a:r>
+            <a:r>
+              <a:rPr lang="en-GB" sz="1400" dirty="0"/>
+              <a:t>, J. and </a:t>
+            </a:r>
+            <a:r>
+              <a:rPr lang="en-GB" sz="1400" dirty="0" err="1"/>
+              <a:t>Kempa-Liehr</a:t>
+            </a:r>
+            <a:r>
+              <a:rPr lang="en-GB" sz="1400" dirty="0"/>
+              <a:t>, A.W., 2018. Time series feature extraction on basis of scalable hypothesis tests (</a:t>
+            </a:r>
+            <a:r>
+              <a:rPr lang="en-GB" sz="1400" dirty="0" err="1"/>
+              <a:t>tsfresh</a:t>
+            </a:r>
+            <a:r>
+              <a:rPr lang="en-GB" sz="1400" dirty="0"/>
+              <a:t>–a python package). </a:t>
+            </a:r>
+            <a:r>
+              <a:rPr lang="en-GB" sz="1400" i="1" dirty="0"/>
+              <a:t>Neurocomputing</a:t>
+            </a:r>
+            <a:r>
+              <a:rPr lang="en-GB" sz="1400" dirty="0"/>
+              <a:t>, </a:t>
+            </a:r>
+            <a:r>
+              <a:rPr lang="en-GB" sz="1400" i="1" dirty="0"/>
+              <a:t>307</a:t>
+            </a:r>
+            <a:r>
+              <a:rPr lang="en-GB" sz="1400" dirty="0"/>
+              <a:t>, pp.72-77.</a:t>
+            </a:r>
+          </a:p>
+        </p:txBody>
+      </p:sp>
+    </p:spTree>
+    <p:extLst>
+      <p:ext uri="{BB962C8B-B14F-4D97-AF65-F5344CB8AC3E}">
+        <p14:creationId xmlns:p14="http://schemas.microsoft.com/office/powerpoint/2010/main" val="93847987"/>
       </p:ext>
     </p:extLst>
   </p:cSld>

</xml_diff>

<commit_message>
KDD MM Slides finish (#31)
* aeon main

* more notebook

* references

* more notebook

* features notebook v1

* notebooks

* rename and add to intro

* add to convolutions and move related talks

* draft slides

* distance update

* update

* slides and quant image
</commit_message>
<xml_diff>
--- a/KDD-2024/Slides/part4_feature_based.pptx
+++ b/KDD-2024/Slides/part4_feature_based.pptx
@@ -5,25 +5,24 @@
     <p:sldMasterId id="2147483659" r:id="rId1"/>
   </p:sldMasterIdLst>
   <p:notesMasterIdLst>
-    <p:notesMasterId r:id="rId18"/>
+    <p:notesMasterId r:id="rId17"/>
   </p:notesMasterIdLst>
   <p:sldIdLst>
     <p:sldId id="256" r:id="rId2"/>
-    <p:sldId id="337" r:id="rId3"/>
-    <p:sldId id="351" r:id="rId4"/>
-    <p:sldId id="451" r:id="rId5"/>
-    <p:sldId id="439" r:id="rId6"/>
-    <p:sldId id="453" r:id="rId7"/>
-    <p:sldId id="440" r:id="rId8"/>
-    <p:sldId id="448" r:id="rId9"/>
-    <p:sldId id="450" r:id="rId10"/>
-    <p:sldId id="449" r:id="rId11"/>
-    <p:sldId id="358" r:id="rId12"/>
-    <p:sldId id="442" r:id="rId13"/>
-    <p:sldId id="443" r:id="rId14"/>
-    <p:sldId id="441" r:id="rId15"/>
-    <p:sldId id="452" r:id="rId16"/>
-    <p:sldId id="265" r:id="rId17"/>
+    <p:sldId id="351" r:id="rId3"/>
+    <p:sldId id="451" r:id="rId4"/>
+    <p:sldId id="439" r:id="rId5"/>
+    <p:sldId id="453" r:id="rId6"/>
+    <p:sldId id="440" r:id="rId7"/>
+    <p:sldId id="448" r:id="rId8"/>
+    <p:sldId id="450" r:id="rId9"/>
+    <p:sldId id="449" r:id="rId10"/>
+    <p:sldId id="358" r:id="rId11"/>
+    <p:sldId id="442" r:id="rId12"/>
+    <p:sldId id="443" r:id="rId13"/>
+    <p:sldId id="441" r:id="rId14"/>
+    <p:sldId id="452" r:id="rId15"/>
+    <p:sldId id="265" r:id="rId16"/>
   </p:sldIdLst>
   <p:sldSz cx="12192000" cy="6858000"/>
   <p:notesSz cx="6858000" cy="1114425"/>
@@ -895,7 +894,7 @@
     </p:spTree>
     <p:extLst>
       <p:ext uri="{BB962C8B-B14F-4D97-AF65-F5344CB8AC3E}">
-        <p14:creationId xmlns:p14="http://schemas.microsoft.com/office/powerpoint/2010/main" val="2292001981"/>
+        <p14:creationId xmlns:p14="http://schemas.microsoft.com/office/powerpoint/2010/main" val="96696920"/>
       </p:ext>
     </p:extLst>
   </p:cSld>
@@ -949,7 +948,6 @@
           <a:bodyPr/>
           <a:lstStyle/>
           <a:p>
-            <a:pPr marL="457200" indent="-298450"/>
             <a:endParaRPr lang="en-GB" dirty="0"/>
           </a:p>
         </p:txBody>
@@ -957,7 +955,7 @@
     </p:spTree>
     <p:extLst>
       <p:ext uri="{BB962C8B-B14F-4D97-AF65-F5344CB8AC3E}">
-        <p14:creationId xmlns:p14="http://schemas.microsoft.com/office/powerpoint/2010/main" val="96696920"/>
+        <p14:creationId xmlns:p14="http://schemas.microsoft.com/office/powerpoint/2010/main" val="4006884163"/>
       </p:ext>
     </p:extLst>
   </p:cSld>
@@ -1018,7 +1016,7 @@
     </p:spTree>
     <p:extLst>
       <p:ext uri="{BB962C8B-B14F-4D97-AF65-F5344CB8AC3E}">
-        <p14:creationId xmlns:p14="http://schemas.microsoft.com/office/powerpoint/2010/main" val="4006884163"/>
+        <p14:creationId xmlns:p14="http://schemas.microsoft.com/office/powerpoint/2010/main" val="4100088519"/>
       </p:ext>
     </p:extLst>
   </p:cSld>
@@ -1029,67 +1027,6 @@
 </file>
 
 <file path=ppt/notesSlides/notesSlide13.xml><?xml version="1.0" encoding="utf-8"?>
-<p:notes xmlns:a="http://schemas.openxmlformats.org/drawingml/2006/main" xmlns:r="http://schemas.openxmlformats.org/officeDocument/2006/relationships" xmlns:p="http://schemas.openxmlformats.org/presentationml/2006/main">
-  <p:cSld>
-    <p:spTree>
-      <p:nvGrpSpPr>
-        <p:cNvPr id="1" name=""/>
-        <p:cNvGrpSpPr/>
-        <p:nvPr/>
-      </p:nvGrpSpPr>
-      <p:grpSpPr>
-        <a:xfrm>
-          <a:off x="0" y="0"/>
-          <a:ext cx="0" cy="0"/>
-          <a:chOff x="0" y="0"/>
-          <a:chExt cx="0" cy="0"/>
-        </a:xfrm>
-      </p:grpSpPr>
-      <p:sp>
-        <p:nvSpPr>
-          <p:cNvPr id="2" name="Slide Image Placeholder 1"/>
-          <p:cNvSpPr>
-            <a:spLocks noGrp="1" noRot="1" noChangeAspect="1"/>
-          </p:cNvSpPr>
-          <p:nvPr>
-            <p:ph type="sldImg"/>
-          </p:nvPr>
-        </p:nvSpPr>
-        <p:spPr/>
-      </p:sp>
-      <p:sp>
-        <p:nvSpPr>
-          <p:cNvPr id="3" name="Notes Placeholder 2"/>
-          <p:cNvSpPr>
-            <a:spLocks noGrp="1"/>
-          </p:cNvSpPr>
-          <p:nvPr>
-            <p:ph type="body" idx="1"/>
-          </p:nvPr>
-        </p:nvSpPr>
-        <p:spPr/>
-        <p:txBody>
-          <a:bodyPr/>
-          <a:lstStyle/>
-          <a:p>
-            <a:endParaRPr lang="en-GB" dirty="0"/>
-          </a:p>
-        </p:txBody>
-      </p:sp>
-    </p:spTree>
-    <p:extLst>
-      <p:ext uri="{BB962C8B-B14F-4D97-AF65-F5344CB8AC3E}">
-        <p14:creationId xmlns:p14="http://schemas.microsoft.com/office/powerpoint/2010/main" val="4100088519"/>
-      </p:ext>
-    </p:extLst>
-  </p:cSld>
-  <p:clrMapOvr>
-    <a:masterClrMapping/>
-  </p:clrMapOvr>
-</p:notes>
-</file>
-
-<file path=ppt/notesSlides/notesSlide14.xml><?xml version="1.0" encoding="utf-8"?>
 <p:notes xmlns:a="http://schemas.openxmlformats.org/drawingml/2006/main" xmlns:r="http://schemas.openxmlformats.org/officeDocument/2006/relationships" xmlns:p="http://schemas.openxmlformats.org/presentationml/2006/main" showMasterSp="0" showMasterPhAnim="0">
   <p:cSld>
     <p:spTree>
@@ -1237,7 +1174,7 @@
     </p:spTree>
     <p:extLst>
       <p:ext uri="{BB962C8B-B14F-4D97-AF65-F5344CB8AC3E}">
-        <p14:creationId xmlns:p14="http://schemas.microsoft.com/office/powerpoint/2010/main" val="1441073430"/>
+        <p14:creationId xmlns:p14="http://schemas.microsoft.com/office/powerpoint/2010/main" val="3423971097"/>
       </p:ext>
     </p:extLst>
   </p:cSld>
@@ -1299,7 +1236,7 @@
     </p:spTree>
     <p:extLst>
       <p:ext uri="{BB962C8B-B14F-4D97-AF65-F5344CB8AC3E}">
-        <p14:creationId xmlns:p14="http://schemas.microsoft.com/office/powerpoint/2010/main" val="3423971097"/>
+        <p14:creationId xmlns:p14="http://schemas.microsoft.com/office/powerpoint/2010/main" val="1437090905"/>
       </p:ext>
     </p:extLst>
   </p:cSld>
@@ -1353,7 +1290,9 @@
           <a:bodyPr/>
           <a:lstStyle/>
           <a:p>
-            <a:pPr marL="457200" indent="-298450"/>
+            <a:pPr marL="158750" indent="0">
+              <a:buNone/>
+            </a:pPr>
             <a:endParaRPr lang="en-GB" dirty="0"/>
           </a:p>
         </p:txBody>
@@ -1361,7 +1300,7 @@
     </p:spTree>
     <p:extLst>
       <p:ext uri="{BB962C8B-B14F-4D97-AF65-F5344CB8AC3E}">
-        <p14:creationId xmlns:p14="http://schemas.microsoft.com/office/powerpoint/2010/main" val="1437090905"/>
+        <p14:creationId xmlns:p14="http://schemas.microsoft.com/office/powerpoint/2010/main" val="10915162"/>
       </p:ext>
     </p:extLst>
   </p:cSld>
@@ -1415,9 +1354,6 @@
           <a:bodyPr/>
           <a:lstStyle/>
           <a:p>
-            <a:pPr marL="158750" indent="0">
-              <a:buNone/>
-            </a:pPr>
             <a:endParaRPr lang="en-GB" dirty="0"/>
           </a:p>
         </p:txBody>
@@ -1425,7 +1361,7 @@
     </p:spTree>
     <p:extLst>
       <p:ext uri="{BB962C8B-B14F-4D97-AF65-F5344CB8AC3E}">
-        <p14:creationId xmlns:p14="http://schemas.microsoft.com/office/powerpoint/2010/main" val="10915162"/>
+        <p14:creationId xmlns:p14="http://schemas.microsoft.com/office/powerpoint/2010/main" val="1523493122"/>
       </p:ext>
     </p:extLst>
   </p:cSld>
@@ -1486,7 +1422,7 @@
     </p:spTree>
     <p:extLst>
       <p:ext uri="{BB962C8B-B14F-4D97-AF65-F5344CB8AC3E}">
-        <p14:creationId xmlns:p14="http://schemas.microsoft.com/office/powerpoint/2010/main" val="1523493122"/>
+        <p14:creationId xmlns:p14="http://schemas.microsoft.com/office/powerpoint/2010/main" val="3164069869"/>
       </p:ext>
     </p:extLst>
   </p:cSld>
@@ -1540,6 +1476,7 @@
           <a:bodyPr/>
           <a:lstStyle/>
           <a:p>
+            <a:pPr marL="457200" indent="-298450"/>
             <a:endParaRPr lang="en-GB" dirty="0"/>
           </a:p>
         </p:txBody>
@@ -1547,7 +1484,7 @@
     </p:spTree>
     <p:extLst>
       <p:ext uri="{BB962C8B-B14F-4D97-AF65-F5344CB8AC3E}">
-        <p14:creationId xmlns:p14="http://schemas.microsoft.com/office/powerpoint/2010/main" val="3164069869"/>
+        <p14:creationId xmlns:p14="http://schemas.microsoft.com/office/powerpoint/2010/main" val="4191338137"/>
       </p:ext>
     </p:extLst>
   </p:cSld>
@@ -1601,7 +1538,6 @@
           <a:bodyPr/>
           <a:lstStyle/>
           <a:p>
-            <a:pPr marL="457200" indent="-298450"/>
             <a:endParaRPr lang="en-GB" dirty="0"/>
           </a:p>
         </p:txBody>
@@ -1609,7 +1545,7 @@
     </p:spTree>
     <p:extLst>
       <p:ext uri="{BB962C8B-B14F-4D97-AF65-F5344CB8AC3E}">
-        <p14:creationId xmlns:p14="http://schemas.microsoft.com/office/powerpoint/2010/main" val="4191338137"/>
+        <p14:creationId xmlns:p14="http://schemas.microsoft.com/office/powerpoint/2010/main" val="3458466144"/>
       </p:ext>
     </p:extLst>
   </p:cSld>
@@ -1663,6 +1599,7 @@
           <a:bodyPr/>
           <a:lstStyle/>
           <a:p>
+            <a:pPr marL="457200" indent="-298450"/>
             <a:endParaRPr lang="en-GB" dirty="0"/>
           </a:p>
         </p:txBody>
@@ -1670,7 +1607,7 @@
     </p:spTree>
     <p:extLst>
       <p:ext uri="{BB962C8B-B14F-4D97-AF65-F5344CB8AC3E}">
-        <p14:creationId xmlns:p14="http://schemas.microsoft.com/office/powerpoint/2010/main" val="3458466144"/>
+        <p14:creationId xmlns:p14="http://schemas.microsoft.com/office/powerpoint/2010/main" val="2292001981"/>
       </p:ext>
     </p:extLst>
   </p:cSld>
@@ -3635,558 +3572,6 @@
       </p:grpSpPr>
       <p:sp>
         <p:nvSpPr>
-          <p:cNvPr id="2" name="Text Placeholder 1">
-            <a:extLst>
-              <a:ext uri="{FF2B5EF4-FFF2-40B4-BE49-F238E27FC236}">
-                <a16:creationId xmlns:a16="http://schemas.microsoft.com/office/drawing/2014/main" id="{4E2E7867-6C62-6814-B5A6-64F1AF853927}"/>
-              </a:ext>
-            </a:extLst>
-          </p:cNvPr>
-          <p:cNvSpPr>
-            <a:spLocks noGrp="1"/>
-          </p:cNvSpPr>
-          <p:nvPr>
-            <p:ph type="body" idx="1"/>
-          </p:nvPr>
-        </p:nvSpPr>
-        <p:spPr>
-          <a:xfrm>
-            <a:off x="549712" y="1514121"/>
-            <a:ext cx="5680400" cy="4555200"/>
-          </a:xfrm>
-        </p:spPr>
-        <p:txBody>
-          <a:bodyPr/>
-          <a:lstStyle/>
-          <a:p>
-            <a:pPr marL="114300" indent="0">
-              <a:buNone/>
-            </a:pPr>
-            <a:r>
-              <a:rPr lang="en-GB" sz="2000" b="1" dirty="0" err="1"/>
-              <a:t>TSFresh</a:t>
-            </a:r>
-            <a:r>
-              <a:rPr lang="en-GB" sz="2000" b="1" dirty="0"/>
-              <a:t> feature set</a:t>
-            </a:r>
-          </a:p>
-          <a:p>
-            <a:pPr marL="114300" indent="0">
-              <a:buFont typeface="Arial"/>
-              <a:buNone/>
-            </a:pPr>
-            <a:endParaRPr lang="en-GB" sz="2000" b="1" dirty="0"/>
-          </a:p>
-          <a:p>
-            <a:pPr marL="114300" indent="0">
-              <a:buFont typeface="Arial"/>
-              <a:buNone/>
-            </a:pPr>
-            <a:endParaRPr lang="en-GB" sz="2000" b="1" dirty="0"/>
-          </a:p>
-          <a:p>
-            <a:pPr marL="114300" indent="0">
-              <a:buFont typeface="Arial"/>
-              <a:buNone/>
-            </a:pPr>
-            <a:r>
-              <a:rPr lang="en-GB" sz="2000" dirty="0"/>
-              <a:t>Just under 800 features (no features selection).</a:t>
-            </a:r>
-          </a:p>
-          <a:p>
-            <a:pPr marL="114300" indent="0">
-              <a:buFont typeface="Arial"/>
-              <a:buNone/>
-            </a:pPr>
-            <a:endParaRPr lang="en-GB" sz="2000" dirty="0"/>
-          </a:p>
-          <a:p>
-            <a:pPr marL="114300" indent="0">
-              <a:buFont typeface="Arial"/>
-              <a:buNone/>
-            </a:pPr>
-            <a:r>
-              <a:rPr lang="en-GB" sz="2000" dirty="0"/>
-              <a:t>Implemented in Python.</a:t>
-            </a:r>
-          </a:p>
-          <a:p>
-            <a:pPr marL="114300" indent="0">
-              <a:buFont typeface="Arial"/>
-              <a:buNone/>
-            </a:pPr>
-            <a:endParaRPr lang="en-GB" sz="2000" dirty="0"/>
-          </a:p>
-          <a:p>
-            <a:pPr marL="114300" indent="0">
-              <a:buFont typeface="Arial"/>
-              <a:buNone/>
-            </a:pPr>
-            <a:r>
-              <a:rPr lang="en-GB" sz="2000" dirty="0"/>
-              <a:t>One of the more popular feature sets (Over 8000 GitHub start and 1000 citations)</a:t>
-            </a:r>
-          </a:p>
-          <a:p>
-            <a:pPr marL="114300" indent="0">
-              <a:buFont typeface="Arial"/>
-              <a:buNone/>
-            </a:pPr>
-            <a:endParaRPr lang="en-GB" sz="2000" dirty="0"/>
-          </a:p>
-          <a:p>
-            <a:pPr marL="114300" indent="0">
-              <a:buFont typeface="Arial"/>
-              <a:buNone/>
-            </a:pPr>
-            <a:endParaRPr lang="en-GB" sz="2000" dirty="0"/>
-          </a:p>
-          <a:p>
-            <a:pPr marL="114300" indent="0">
-              <a:buFont typeface="Arial"/>
-              <a:buNone/>
-            </a:pPr>
-            <a:r>
-              <a:rPr lang="en-GB" sz="2000" i="1" u="sng" dirty="0"/>
-              <a:t>https://github.com/blue-yonder/tsfresh</a:t>
-            </a:r>
-          </a:p>
-          <a:p>
-            <a:pPr marL="114300" indent="0">
-              <a:buNone/>
-            </a:pPr>
-            <a:endParaRPr lang="en-GB" sz="2000" dirty="0"/>
-          </a:p>
-        </p:txBody>
-      </p:sp>
-      <p:sp>
-        <p:nvSpPr>
-          <p:cNvPr id="3" name="Title 2">
-            <a:extLst>
-              <a:ext uri="{FF2B5EF4-FFF2-40B4-BE49-F238E27FC236}">
-                <a16:creationId xmlns:a16="http://schemas.microsoft.com/office/drawing/2014/main" id="{899533FC-BE2F-24D0-E4BA-AC770051A2B3}"/>
-              </a:ext>
-            </a:extLst>
-          </p:cNvPr>
-          <p:cNvSpPr>
-            <a:spLocks noGrp="1"/>
-          </p:cNvSpPr>
-          <p:nvPr>
-            <p:ph type="title"/>
-          </p:nvPr>
-        </p:nvSpPr>
-        <p:spPr/>
-        <p:txBody>
-          <a:bodyPr/>
-          <a:lstStyle/>
-          <a:p>
-            <a:pPr marL="114300" indent="0">
-              <a:buFont typeface="Arial"/>
-              <a:buNone/>
-            </a:pPr>
-            <a:r>
-              <a:rPr lang="en-GB" sz="2400" b="1" dirty="0"/>
-              <a:t>Time Series Feature extraction based on scalable hypothesis tests (</a:t>
-            </a:r>
-            <a:r>
-              <a:rPr lang="en-GB" sz="2400" b="1" dirty="0" err="1"/>
-              <a:t>TSFresh</a:t>
-            </a:r>
-            <a:r>
-              <a:rPr lang="en-GB" sz="2400" b="1" dirty="0"/>
-              <a:t>)</a:t>
-            </a:r>
-          </a:p>
-        </p:txBody>
-      </p:sp>
-      <p:pic>
-        <p:nvPicPr>
-          <p:cNvPr id="5" name="Picture 4">
-            <a:extLst>
-              <a:ext uri="{FF2B5EF4-FFF2-40B4-BE49-F238E27FC236}">
-                <a16:creationId xmlns:a16="http://schemas.microsoft.com/office/drawing/2014/main" id="{6A382F17-A944-C9CE-4792-2AD38277D8C0}"/>
-              </a:ext>
-            </a:extLst>
-          </p:cNvPr>
-          <p:cNvPicPr>
-            <a:picLocks noChangeAspect="1"/>
-          </p:cNvPicPr>
-          <p:nvPr/>
-        </p:nvPicPr>
-        <p:blipFill>
-          <a:blip r:embed="rId3"/>
-          <a:stretch>
-            <a:fillRect/>
-          </a:stretch>
-        </p:blipFill>
-        <p:spPr>
-          <a:xfrm>
-            <a:off x="7058586" y="2228489"/>
-            <a:ext cx="3931205" cy="2401021"/>
-          </a:xfrm>
-          <a:prstGeom prst="rect">
-            <a:avLst/>
-          </a:prstGeom>
-        </p:spPr>
-      </p:pic>
-      <p:sp>
-        <p:nvSpPr>
-          <p:cNvPr id="4" name="Text Placeholder 1">
-            <a:extLst>
-              <a:ext uri="{FF2B5EF4-FFF2-40B4-BE49-F238E27FC236}">
-                <a16:creationId xmlns:a16="http://schemas.microsoft.com/office/drawing/2014/main" id="{D5EE724A-60FD-D922-453C-9202E32FECE8}"/>
-              </a:ext>
-            </a:extLst>
-          </p:cNvPr>
-          <p:cNvSpPr txBox="1">
-            <a:spLocks/>
-          </p:cNvSpPr>
-          <p:nvPr/>
-        </p:nvSpPr>
-        <p:spPr>
-          <a:xfrm>
-            <a:off x="208336" y="6069321"/>
-            <a:ext cx="11568064" cy="597399"/>
-          </a:xfrm>
-          <a:prstGeom prst="rect">
-            <a:avLst/>
-          </a:prstGeom>
-        </p:spPr>
-        <p:txBody>
-          <a:bodyPr spcFirstLastPara="1" wrap="square" lIns="91425" tIns="91425" rIns="91425" bIns="91425" anchor="t" anchorCtr="0"/>
-          <a:lstStyle>
-            <a:defPPr marR="0" lvl="0" algn="l" rtl="0">
-              <a:lnSpc>
-                <a:spcPct val="100000"/>
-              </a:lnSpc>
-              <a:spcBef>
-                <a:spcPts val="0"/>
-              </a:spcBef>
-              <a:spcAft>
-                <a:spcPts val="0"/>
-              </a:spcAft>
-            </a:defPPr>
-            <a:lvl1pPr marL="457200" marR="0" lvl="0" indent="-342900" algn="l" rtl="0">
-              <a:lnSpc>
-                <a:spcPct val="100000"/>
-              </a:lnSpc>
-              <a:spcBef>
-                <a:spcPts val="0"/>
-              </a:spcBef>
-              <a:spcAft>
-                <a:spcPts val="0"/>
-              </a:spcAft>
-              <a:buClr>
-                <a:srgbClr val="500064"/>
-              </a:buClr>
-              <a:buSzPts val="1800"/>
-              <a:buFont typeface="Arial"/>
-              <a:buChar char="●"/>
-              <a:defRPr sz="1800" b="0" i="0" u="none" strike="noStrike" cap="none">
-                <a:solidFill>
-                  <a:schemeClr val="tx1"/>
-                </a:solidFill>
-                <a:latin typeface="Aptos" panose="020B0004020202020204" pitchFamily="34" charset="0"/>
-                <a:ea typeface="Arial"/>
-                <a:cs typeface="Arial"/>
-                <a:sym typeface="Arial"/>
-              </a:defRPr>
-            </a:lvl1pPr>
-            <a:lvl2pPr marL="914400" marR="0" lvl="1" indent="-317500" algn="l" rtl="0">
-              <a:lnSpc>
-                <a:spcPct val="100000"/>
-              </a:lnSpc>
-              <a:spcBef>
-                <a:spcPts val="1600"/>
-              </a:spcBef>
-              <a:spcAft>
-                <a:spcPts val="0"/>
-              </a:spcAft>
-              <a:buClr>
-                <a:srgbClr val="000000"/>
-              </a:buClr>
-              <a:buSzPts val="1400"/>
-              <a:buFont typeface="Arial"/>
-              <a:buChar char="○"/>
-              <a:defRPr sz="1400" b="0" i="0" u="none" strike="noStrike" cap="none">
-                <a:solidFill>
-                  <a:srgbClr val="000000"/>
-                </a:solidFill>
-                <a:latin typeface="Arial"/>
-                <a:ea typeface="Arial"/>
-                <a:cs typeface="Arial"/>
-                <a:sym typeface="Arial"/>
-              </a:defRPr>
-            </a:lvl2pPr>
-            <a:lvl3pPr marL="1371600" marR="0" lvl="2" indent="-317500" algn="l" rtl="0">
-              <a:lnSpc>
-                <a:spcPct val="100000"/>
-              </a:lnSpc>
-              <a:spcBef>
-                <a:spcPts val="1600"/>
-              </a:spcBef>
-              <a:spcAft>
-                <a:spcPts val="0"/>
-              </a:spcAft>
-              <a:buClr>
-                <a:srgbClr val="000000"/>
-              </a:buClr>
-              <a:buSzPts val="1400"/>
-              <a:buFont typeface="Arial"/>
-              <a:buChar char="■"/>
-              <a:defRPr sz="1400" b="0" i="0" u="none" strike="noStrike" cap="none">
-                <a:solidFill>
-                  <a:srgbClr val="000000"/>
-                </a:solidFill>
-                <a:latin typeface="Arial"/>
-                <a:ea typeface="Arial"/>
-                <a:cs typeface="Arial"/>
-                <a:sym typeface="Arial"/>
-              </a:defRPr>
-            </a:lvl3pPr>
-            <a:lvl4pPr marL="1828800" marR="0" lvl="3" indent="-317500" algn="l" rtl="0">
-              <a:lnSpc>
-                <a:spcPct val="100000"/>
-              </a:lnSpc>
-              <a:spcBef>
-                <a:spcPts val="1600"/>
-              </a:spcBef>
-              <a:spcAft>
-                <a:spcPts val="0"/>
-              </a:spcAft>
-              <a:buClr>
-                <a:srgbClr val="000000"/>
-              </a:buClr>
-              <a:buSzPts val="1400"/>
-              <a:buFont typeface="Arial"/>
-              <a:buChar char="●"/>
-              <a:defRPr sz="1400" b="0" i="0" u="none" strike="noStrike" cap="none">
-                <a:solidFill>
-                  <a:srgbClr val="000000"/>
-                </a:solidFill>
-                <a:latin typeface="Arial"/>
-                <a:ea typeface="Arial"/>
-                <a:cs typeface="Arial"/>
-                <a:sym typeface="Arial"/>
-              </a:defRPr>
-            </a:lvl4pPr>
-            <a:lvl5pPr marL="2286000" marR="0" lvl="4" indent="-317500" algn="l" rtl="0">
-              <a:lnSpc>
-                <a:spcPct val="100000"/>
-              </a:lnSpc>
-              <a:spcBef>
-                <a:spcPts val="1600"/>
-              </a:spcBef>
-              <a:spcAft>
-                <a:spcPts val="0"/>
-              </a:spcAft>
-              <a:buClr>
-                <a:srgbClr val="000000"/>
-              </a:buClr>
-              <a:buSzPts val="1400"/>
-              <a:buFont typeface="Arial"/>
-              <a:buChar char="○"/>
-              <a:defRPr sz="1400" b="0" i="0" u="none" strike="noStrike" cap="none">
-                <a:solidFill>
-                  <a:srgbClr val="000000"/>
-                </a:solidFill>
-                <a:latin typeface="Arial"/>
-                <a:ea typeface="Arial"/>
-                <a:cs typeface="Arial"/>
-                <a:sym typeface="Arial"/>
-              </a:defRPr>
-            </a:lvl5pPr>
-            <a:lvl6pPr marL="2743200" marR="0" lvl="5" indent="-317500" algn="l" rtl="0">
-              <a:lnSpc>
-                <a:spcPct val="100000"/>
-              </a:lnSpc>
-              <a:spcBef>
-                <a:spcPts val="1600"/>
-              </a:spcBef>
-              <a:spcAft>
-                <a:spcPts val="0"/>
-              </a:spcAft>
-              <a:buClr>
-                <a:srgbClr val="000000"/>
-              </a:buClr>
-              <a:buSzPts val="1400"/>
-              <a:buFont typeface="Arial"/>
-              <a:buChar char="■"/>
-              <a:defRPr sz="1400" b="0" i="0" u="none" strike="noStrike" cap="none">
-                <a:solidFill>
-                  <a:srgbClr val="000000"/>
-                </a:solidFill>
-                <a:latin typeface="Arial"/>
-                <a:ea typeface="Arial"/>
-                <a:cs typeface="Arial"/>
-                <a:sym typeface="Arial"/>
-              </a:defRPr>
-            </a:lvl6pPr>
-            <a:lvl7pPr marL="3200400" marR="0" lvl="6" indent="-317500" algn="l" rtl="0">
-              <a:lnSpc>
-                <a:spcPct val="100000"/>
-              </a:lnSpc>
-              <a:spcBef>
-                <a:spcPts val="1600"/>
-              </a:spcBef>
-              <a:spcAft>
-                <a:spcPts val="0"/>
-              </a:spcAft>
-              <a:buClr>
-                <a:srgbClr val="000000"/>
-              </a:buClr>
-              <a:buSzPts val="1400"/>
-              <a:buFont typeface="Arial"/>
-              <a:buChar char="●"/>
-              <a:defRPr sz="1400" b="0" i="0" u="none" strike="noStrike" cap="none">
-                <a:solidFill>
-                  <a:srgbClr val="000000"/>
-                </a:solidFill>
-                <a:latin typeface="Arial"/>
-                <a:ea typeface="Arial"/>
-                <a:cs typeface="Arial"/>
-                <a:sym typeface="Arial"/>
-              </a:defRPr>
-            </a:lvl7pPr>
-            <a:lvl8pPr marL="3657600" marR="0" lvl="7" indent="-317500" algn="l" rtl="0">
-              <a:lnSpc>
-                <a:spcPct val="100000"/>
-              </a:lnSpc>
-              <a:spcBef>
-                <a:spcPts val="1600"/>
-              </a:spcBef>
-              <a:spcAft>
-                <a:spcPts val="0"/>
-              </a:spcAft>
-              <a:buClr>
-                <a:srgbClr val="000000"/>
-              </a:buClr>
-              <a:buSzPts val="1400"/>
-              <a:buFont typeface="Arial"/>
-              <a:buChar char="○"/>
-              <a:defRPr sz="1400" b="0" i="0" u="none" strike="noStrike" cap="none">
-                <a:solidFill>
-                  <a:srgbClr val="000000"/>
-                </a:solidFill>
-                <a:latin typeface="Arial"/>
-                <a:ea typeface="Arial"/>
-                <a:cs typeface="Arial"/>
-                <a:sym typeface="Arial"/>
-              </a:defRPr>
-            </a:lvl8pPr>
-            <a:lvl9pPr marL="4114800" marR="0" lvl="8" indent="-317500" algn="l" rtl="0">
-              <a:lnSpc>
-                <a:spcPct val="100000"/>
-              </a:lnSpc>
-              <a:spcBef>
-                <a:spcPts val="1600"/>
-              </a:spcBef>
-              <a:spcAft>
-                <a:spcPts val="1600"/>
-              </a:spcAft>
-              <a:buClr>
-                <a:srgbClr val="000000"/>
-              </a:buClr>
-              <a:buSzPts val="1400"/>
-              <a:buFont typeface="Arial"/>
-              <a:buChar char="■"/>
-              <a:defRPr sz="1400" b="0" i="0" u="none" strike="noStrike" cap="none">
-                <a:solidFill>
-                  <a:srgbClr val="000000"/>
-                </a:solidFill>
-                <a:latin typeface="Arial"/>
-                <a:ea typeface="Arial"/>
-                <a:cs typeface="Arial"/>
-                <a:sym typeface="Arial"/>
-              </a:defRPr>
-            </a:lvl9pPr>
-          </a:lstStyle>
-          <a:p>
-            <a:pPr marL="114300" indent="0">
-              <a:buFont typeface="Arial"/>
-              <a:buNone/>
-            </a:pPr>
-            <a:r>
-              <a:rPr lang="en-GB" sz="1400" dirty="0"/>
-              <a:t>Christ, M., Braun, N., </a:t>
-            </a:r>
-            <a:r>
-              <a:rPr lang="en-GB" sz="1400" dirty="0" err="1"/>
-              <a:t>Neuffer</a:t>
-            </a:r>
-            <a:r>
-              <a:rPr lang="en-GB" sz="1400" dirty="0"/>
-              <a:t>, J. and </a:t>
-            </a:r>
-            <a:r>
-              <a:rPr lang="en-GB" sz="1400" dirty="0" err="1"/>
-              <a:t>Kempa-Liehr</a:t>
-            </a:r>
-            <a:r>
-              <a:rPr lang="en-GB" sz="1400" dirty="0"/>
-              <a:t>, A.W., 2018. Time series feature extraction on basis of scalable hypothesis tests (</a:t>
-            </a:r>
-            <a:r>
-              <a:rPr lang="en-GB" sz="1400" dirty="0" err="1"/>
-              <a:t>tsfresh</a:t>
-            </a:r>
-            <a:r>
-              <a:rPr lang="en-GB" sz="1400" dirty="0"/>
-              <a:t>–a python package). </a:t>
-            </a:r>
-            <a:r>
-              <a:rPr lang="en-GB" sz="1400" i="1" dirty="0"/>
-              <a:t>Neurocomputing</a:t>
-            </a:r>
-            <a:r>
-              <a:rPr lang="en-GB" sz="1400" dirty="0"/>
-              <a:t>, </a:t>
-            </a:r>
-            <a:r>
-              <a:rPr lang="en-GB" sz="1400" i="1" dirty="0"/>
-              <a:t>307</a:t>
-            </a:r>
-            <a:r>
-              <a:rPr lang="en-GB" sz="1400" dirty="0"/>
-              <a:t>, pp.72-77.</a:t>
-            </a:r>
-          </a:p>
-        </p:txBody>
-      </p:sp>
-    </p:spTree>
-    <p:extLst>
-      <p:ext uri="{BB962C8B-B14F-4D97-AF65-F5344CB8AC3E}">
-        <p14:creationId xmlns:p14="http://schemas.microsoft.com/office/powerpoint/2010/main" val="93847987"/>
-      </p:ext>
-    </p:extLst>
-  </p:cSld>
-  <p:clrMapOvr>
-    <a:masterClrMapping/>
-  </p:clrMapOvr>
-</p:sld>
-</file>
-
-<file path=ppt/slides/slide11.xml><?xml version="1.0" encoding="utf-8"?>
-<p:sld xmlns:a="http://schemas.openxmlformats.org/drawingml/2006/main" xmlns:r="http://schemas.openxmlformats.org/officeDocument/2006/relationships" xmlns:p="http://schemas.openxmlformats.org/presentationml/2006/main">
-  <p:cSld>
-    <p:spTree>
-      <p:nvGrpSpPr>
-        <p:cNvPr id="1" name=""/>
-        <p:cNvGrpSpPr/>
-        <p:nvPr/>
-      </p:nvGrpSpPr>
-      <p:grpSpPr>
-        <a:xfrm>
-          <a:off x="0" y="0"/>
-          <a:ext cx="0" cy="0"/>
-          <a:chOff x="0" y="0"/>
-          <a:chExt cx="0" cy="0"/>
-        </a:xfrm>
-      </p:grpSpPr>
-      <p:sp>
-        <p:nvSpPr>
           <p:cNvPr id="3" name="Title 2">
             <a:extLst>
               <a:ext uri="{FF2B5EF4-FFF2-40B4-BE49-F238E27FC236}">
@@ -4248,24 +3633,384 @@
           <a:lstStyle/>
           <a:p>
             <a:r>
-              <a:rPr lang="en-GB" sz="2000" b="1" dirty="0" err="1">
-                <a:effectLst/>
-                <a:latin typeface="+mn-lt"/>
-              </a:rPr>
-              <a:t>todo</a:t>
+              <a:rPr lang="en-GB" sz="2000" b="1" dirty="0" err="1"/>
+              <a:t>linear_trend_timewise</a:t>
+            </a:r>
+            <a:r>
+              <a:rPr lang="en-GB" sz="2000" b="1" dirty="0"/>
+              <a:t> </a:t>
+            </a:r>
+            <a:r>
+              <a:rPr lang="en-GB" sz="2000" dirty="0"/>
+              <a:t>- Calculate a linear least-squares regression for the values of the time series versus the sequence from 0 to length of the time series minus one</a:t>
             </a:r>
             <a:endParaRPr lang="en-GB" sz="2000" dirty="0">
               <a:effectLst/>
-              <a:latin typeface="+mn-lt"/>
             </a:endParaRPr>
           </a:p>
           <a:p>
-            <a:endParaRPr lang="en-GB" sz="2000" dirty="0">
-              <a:latin typeface="Times New Roman" panose="02020603050405020304" pitchFamily="18" charset="0"/>
-            </a:endParaRPr>
-          </a:p>
-          <a:p>
+            <a:pPr marL="114300" indent="0">
+              <a:buNone/>
+            </a:pPr>
             <a:endParaRPr lang="en-GB" sz="2000" dirty="0"/>
+          </a:p>
+          <a:p>
+            <a:endParaRPr lang="en-GB" sz="2000" dirty="0"/>
+          </a:p>
+          <a:p>
+            <a:r>
+              <a:rPr lang="en-GB" sz="2000" b="1" dirty="0" err="1"/>
+              <a:t>partial_autocorrelation</a:t>
+            </a:r>
+            <a:r>
+              <a:rPr lang="en-GB" sz="2000" b="1" dirty="0"/>
+              <a:t> </a:t>
+            </a:r>
+            <a:r>
+              <a:rPr lang="en-GB" sz="2000" dirty="0"/>
+              <a:t>-</a:t>
+            </a:r>
+            <a:r>
+              <a:rPr lang="en-GB" sz="2000" dirty="0">
+                <a:effectLst/>
+              </a:rPr>
+              <a:t> </a:t>
+            </a:r>
+            <a:r>
+              <a:rPr lang="en-GB" sz="2000" dirty="0"/>
+              <a:t>Calculates the value of the partial autocorrelation function at the given lag</a:t>
+            </a:r>
+          </a:p>
+          <a:p>
+            <a:endParaRPr lang="en-GB" sz="2000" dirty="0"/>
+          </a:p>
+          <a:p>
+            <a:endParaRPr lang="en-GB" sz="2000" dirty="0"/>
+          </a:p>
+          <a:p>
+            <a:r>
+              <a:rPr lang="en-GB" sz="2000" b="1" dirty="0" err="1"/>
+              <a:t>sum_of_reoccurring_values</a:t>
+            </a:r>
+            <a:r>
+              <a:rPr lang="en-GB" sz="2000" b="1" dirty="0"/>
+              <a:t> </a:t>
+            </a:r>
+            <a:r>
+              <a:rPr lang="en-GB" sz="2000" dirty="0"/>
+              <a:t>- Returns the sum of all values, that are present in the time series more than once</a:t>
+            </a:r>
+          </a:p>
+          <a:p>
+            <a:endParaRPr lang="en-GB" sz="2000" dirty="0"/>
+          </a:p>
+          <a:p>
+            <a:endParaRPr lang="en-GB" sz="2000" dirty="0"/>
+          </a:p>
+          <a:p>
+            <a:r>
+              <a:rPr lang="en-GB" sz="2000" b="1" dirty="0" err="1"/>
+              <a:t>longest_strike_above_mean</a:t>
+            </a:r>
+            <a:r>
+              <a:rPr lang="en-GB" sz="2000" b="1" dirty="0"/>
+              <a:t> </a:t>
+            </a:r>
+            <a:r>
+              <a:rPr lang="en-GB" sz="2000" dirty="0"/>
+              <a:t>- Returns the length of the longest consecutive subsequence in x that is bigger than the mean of x</a:t>
+            </a:r>
+          </a:p>
+        </p:txBody>
+      </p:sp>
+      <p:sp>
+        <p:nvSpPr>
+          <p:cNvPr id="2" name="Text Placeholder 1">
+            <a:extLst>
+              <a:ext uri="{FF2B5EF4-FFF2-40B4-BE49-F238E27FC236}">
+                <a16:creationId xmlns:a16="http://schemas.microsoft.com/office/drawing/2014/main" id="{40557986-10CD-EB1A-E6A7-44E14628358D}"/>
+              </a:ext>
+            </a:extLst>
+          </p:cNvPr>
+          <p:cNvSpPr txBox="1">
+            <a:spLocks/>
+          </p:cNvSpPr>
+          <p:nvPr/>
+        </p:nvSpPr>
+        <p:spPr>
+          <a:xfrm>
+            <a:off x="208336" y="6278880"/>
+            <a:ext cx="11568064" cy="387840"/>
+          </a:xfrm>
+          <a:prstGeom prst="rect">
+            <a:avLst/>
+          </a:prstGeom>
+        </p:spPr>
+        <p:txBody>
+          <a:bodyPr spcFirstLastPara="1" wrap="square" lIns="91425" tIns="91425" rIns="91425" bIns="91425" anchor="t" anchorCtr="0"/>
+          <a:lstStyle>
+            <a:defPPr marR="0" lvl="0" algn="l" rtl="0">
+              <a:lnSpc>
+                <a:spcPct val="100000"/>
+              </a:lnSpc>
+              <a:spcBef>
+                <a:spcPts val="0"/>
+              </a:spcBef>
+              <a:spcAft>
+                <a:spcPts val="0"/>
+              </a:spcAft>
+            </a:defPPr>
+            <a:lvl1pPr marL="457200" marR="0" lvl="0" indent="-342900" algn="l" rtl="0">
+              <a:lnSpc>
+                <a:spcPct val="100000"/>
+              </a:lnSpc>
+              <a:spcBef>
+                <a:spcPts val="0"/>
+              </a:spcBef>
+              <a:spcAft>
+                <a:spcPts val="0"/>
+              </a:spcAft>
+              <a:buClr>
+                <a:srgbClr val="500064"/>
+              </a:buClr>
+              <a:buSzPts val="1800"/>
+              <a:buFont typeface="Arial"/>
+              <a:buChar char="●"/>
+              <a:defRPr sz="1800" b="0" i="0" u="none" strike="noStrike" cap="none">
+                <a:solidFill>
+                  <a:schemeClr val="tx1"/>
+                </a:solidFill>
+                <a:latin typeface="Aptos" panose="020B0004020202020204" pitchFamily="34" charset="0"/>
+                <a:ea typeface="Arial"/>
+                <a:cs typeface="Arial"/>
+                <a:sym typeface="Arial"/>
+              </a:defRPr>
+            </a:lvl1pPr>
+            <a:lvl2pPr marL="914400" marR="0" lvl="1" indent="-317500" algn="l" rtl="0">
+              <a:lnSpc>
+                <a:spcPct val="100000"/>
+              </a:lnSpc>
+              <a:spcBef>
+                <a:spcPts val="1600"/>
+              </a:spcBef>
+              <a:spcAft>
+                <a:spcPts val="0"/>
+              </a:spcAft>
+              <a:buClr>
+                <a:srgbClr val="000000"/>
+              </a:buClr>
+              <a:buSzPts val="1400"/>
+              <a:buFont typeface="Arial"/>
+              <a:buChar char="○"/>
+              <a:defRPr sz="1400" b="0" i="0" u="none" strike="noStrike" cap="none">
+                <a:solidFill>
+                  <a:srgbClr val="000000"/>
+                </a:solidFill>
+                <a:latin typeface="Arial"/>
+                <a:ea typeface="Arial"/>
+                <a:cs typeface="Arial"/>
+                <a:sym typeface="Arial"/>
+              </a:defRPr>
+            </a:lvl2pPr>
+            <a:lvl3pPr marL="1371600" marR="0" lvl="2" indent="-317500" algn="l" rtl="0">
+              <a:lnSpc>
+                <a:spcPct val="100000"/>
+              </a:lnSpc>
+              <a:spcBef>
+                <a:spcPts val="1600"/>
+              </a:spcBef>
+              <a:spcAft>
+                <a:spcPts val="0"/>
+              </a:spcAft>
+              <a:buClr>
+                <a:srgbClr val="000000"/>
+              </a:buClr>
+              <a:buSzPts val="1400"/>
+              <a:buFont typeface="Arial"/>
+              <a:buChar char="■"/>
+              <a:defRPr sz="1400" b="0" i="0" u="none" strike="noStrike" cap="none">
+                <a:solidFill>
+                  <a:srgbClr val="000000"/>
+                </a:solidFill>
+                <a:latin typeface="Arial"/>
+                <a:ea typeface="Arial"/>
+                <a:cs typeface="Arial"/>
+                <a:sym typeface="Arial"/>
+              </a:defRPr>
+            </a:lvl3pPr>
+            <a:lvl4pPr marL="1828800" marR="0" lvl="3" indent="-317500" algn="l" rtl="0">
+              <a:lnSpc>
+                <a:spcPct val="100000"/>
+              </a:lnSpc>
+              <a:spcBef>
+                <a:spcPts val="1600"/>
+              </a:spcBef>
+              <a:spcAft>
+                <a:spcPts val="0"/>
+              </a:spcAft>
+              <a:buClr>
+                <a:srgbClr val="000000"/>
+              </a:buClr>
+              <a:buSzPts val="1400"/>
+              <a:buFont typeface="Arial"/>
+              <a:buChar char="●"/>
+              <a:defRPr sz="1400" b="0" i="0" u="none" strike="noStrike" cap="none">
+                <a:solidFill>
+                  <a:srgbClr val="000000"/>
+                </a:solidFill>
+                <a:latin typeface="Arial"/>
+                <a:ea typeface="Arial"/>
+                <a:cs typeface="Arial"/>
+                <a:sym typeface="Arial"/>
+              </a:defRPr>
+            </a:lvl4pPr>
+            <a:lvl5pPr marL="2286000" marR="0" lvl="4" indent="-317500" algn="l" rtl="0">
+              <a:lnSpc>
+                <a:spcPct val="100000"/>
+              </a:lnSpc>
+              <a:spcBef>
+                <a:spcPts val="1600"/>
+              </a:spcBef>
+              <a:spcAft>
+                <a:spcPts val="0"/>
+              </a:spcAft>
+              <a:buClr>
+                <a:srgbClr val="000000"/>
+              </a:buClr>
+              <a:buSzPts val="1400"/>
+              <a:buFont typeface="Arial"/>
+              <a:buChar char="○"/>
+              <a:defRPr sz="1400" b="0" i="0" u="none" strike="noStrike" cap="none">
+                <a:solidFill>
+                  <a:srgbClr val="000000"/>
+                </a:solidFill>
+                <a:latin typeface="Arial"/>
+                <a:ea typeface="Arial"/>
+                <a:cs typeface="Arial"/>
+                <a:sym typeface="Arial"/>
+              </a:defRPr>
+            </a:lvl5pPr>
+            <a:lvl6pPr marL="2743200" marR="0" lvl="5" indent="-317500" algn="l" rtl="0">
+              <a:lnSpc>
+                <a:spcPct val="100000"/>
+              </a:lnSpc>
+              <a:spcBef>
+                <a:spcPts val="1600"/>
+              </a:spcBef>
+              <a:spcAft>
+                <a:spcPts val="0"/>
+              </a:spcAft>
+              <a:buClr>
+                <a:srgbClr val="000000"/>
+              </a:buClr>
+              <a:buSzPts val="1400"/>
+              <a:buFont typeface="Arial"/>
+              <a:buChar char="■"/>
+              <a:defRPr sz="1400" b="0" i="0" u="none" strike="noStrike" cap="none">
+                <a:solidFill>
+                  <a:srgbClr val="000000"/>
+                </a:solidFill>
+                <a:latin typeface="Arial"/>
+                <a:ea typeface="Arial"/>
+                <a:cs typeface="Arial"/>
+                <a:sym typeface="Arial"/>
+              </a:defRPr>
+            </a:lvl6pPr>
+            <a:lvl7pPr marL="3200400" marR="0" lvl="6" indent="-317500" algn="l" rtl="0">
+              <a:lnSpc>
+                <a:spcPct val="100000"/>
+              </a:lnSpc>
+              <a:spcBef>
+                <a:spcPts val="1600"/>
+              </a:spcBef>
+              <a:spcAft>
+                <a:spcPts val="0"/>
+              </a:spcAft>
+              <a:buClr>
+                <a:srgbClr val="000000"/>
+              </a:buClr>
+              <a:buSzPts val="1400"/>
+              <a:buFont typeface="Arial"/>
+              <a:buChar char="●"/>
+              <a:defRPr sz="1400" b="0" i="0" u="none" strike="noStrike" cap="none">
+                <a:solidFill>
+                  <a:srgbClr val="000000"/>
+                </a:solidFill>
+                <a:latin typeface="Arial"/>
+                <a:ea typeface="Arial"/>
+                <a:cs typeface="Arial"/>
+                <a:sym typeface="Arial"/>
+              </a:defRPr>
+            </a:lvl7pPr>
+            <a:lvl8pPr marL="3657600" marR="0" lvl="7" indent="-317500" algn="l" rtl="0">
+              <a:lnSpc>
+                <a:spcPct val="100000"/>
+              </a:lnSpc>
+              <a:spcBef>
+                <a:spcPts val="1600"/>
+              </a:spcBef>
+              <a:spcAft>
+                <a:spcPts val="0"/>
+              </a:spcAft>
+              <a:buClr>
+                <a:srgbClr val="000000"/>
+              </a:buClr>
+              <a:buSzPts val="1400"/>
+              <a:buFont typeface="Arial"/>
+              <a:buChar char="○"/>
+              <a:defRPr sz="1400" b="0" i="0" u="none" strike="noStrike" cap="none">
+                <a:solidFill>
+                  <a:srgbClr val="000000"/>
+                </a:solidFill>
+                <a:latin typeface="Arial"/>
+                <a:ea typeface="Arial"/>
+                <a:cs typeface="Arial"/>
+                <a:sym typeface="Arial"/>
+              </a:defRPr>
+            </a:lvl8pPr>
+            <a:lvl9pPr marL="4114800" marR="0" lvl="8" indent="-317500" algn="l" rtl="0">
+              <a:lnSpc>
+                <a:spcPct val="100000"/>
+              </a:lnSpc>
+              <a:spcBef>
+                <a:spcPts val="1600"/>
+              </a:spcBef>
+              <a:spcAft>
+                <a:spcPts val="1600"/>
+              </a:spcAft>
+              <a:buClr>
+                <a:srgbClr val="000000"/>
+              </a:buClr>
+              <a:buSzPts val="1400"/>
+              <a:buFont typeface="Arial"/>
+              <a:buChar char="■"/>
+              <a:defRPr sz="1400" b="0" i="0" u="none" strike="noStrike" cap="none">
+                <a:solidFill>
+                  <a:srgbClr val="000000"/>
+                </a:solidFill>
+                <a:latin typeface="Arial"/>
+                <a:ea typeface="Arial"/>
+                <a:cs typeface="Arial"/>
+                <a:sym typeface="Arial"/>
+              </a:defRPr>
+            </a:lvl9pPr>
+          </a:lstStyle>
+          <a:p>
+            <a:pPr marL="114300" indent="0">
+              <a:buFont typeface="Arial"/>
+              <a:buNone/>
+            </a:pPr>
+            <a:r>
+              <a:rPr lang="en-GB" sz="1400" dirty="0"/>
+              <a:t>Further descriptions: </a:t>
+            </a:r>
+            <a:r>
+              <a:rPr lang="en-GB" sz="1400" dirty="0">
+                <a:hlinkClick r:id="rId3"/>
+              </a:rPr>
+              <a:t>https://tsfresh.readthedocs.io/en/latest/text/list_of_features.html</a:t>
+            </a:r>
+            <a:endParaRPr lang="en-GB" sz="1400" dirty="0"/>
           </a:p>
         </p:txBody>
       </p:sp>
@@ -4282,7 +4027,7 @@
 </p:sld>
 </file>
 
-<file path=ppt/slides/slide12.xml><?xml version="1.0" encoding="utf-8"?>
+<file path=ppt/slides/slide11.xml><?xml version="1.0" encoding="utf-8"?>
 <p:sld xmlns:a="http://schemas.openxmlformats.org/drawingml/2006/main" xmlns:r="http://schemas.openxmlformats.org/officeDocument/2006/relationships" xmlns:p="http://schemas.openxmlformats.org/presentationml/2006/main">
   <p:cSld>
     <p:spTree>
@@ -5349,7 +5094,7 @@
 </p:sld>
 </file>
 
-<file path=ppt/slides/slide13.xml><?xml version="1.0" encoding="utf-8"?>
+<file path=ppt/slides/slide12.xml><?xml version="1.0" encoding="utf-8"?>
 <p:sld xmlns:a="http://schemas.openxmlformats.org/drawingml/2006/main" xmlns:r="http://schemas.openxmlformats.org/officeDocument/2006/relationships" xmlns:p="http://schemas.openxmlformats.org/presentationml/2006/main">
   <p:cSld>
     <p:spTree>
@@ -5641,7 +5386,7 @@
 </p:sld>
 </file>
 
-<file path=ppt/slides/slide14.xml><?xml version="1.0" encoding="utf-8"?>
+<file path=ppt/slides/slide13.xml><?xml version="1.0" encoding="utf-8"?>
 <p:sld xmlns:a="http://schemas.openxmlformats.org/drawingml/2006/main" xmlns:r="http://schemas.openxmlformats.org/officeDocument/2006/relationships" xmlns:p="http://schemas.openxmlformats.org/presentationml/2006/main">
   <p:cSld>
     <p:spTree>
@@ -6476,7 +6221,7 @@
 </p:sld>
 </file>
 
-<file path=ppt/slides/slide15.xml><?xml version="1.0" encoding="utf-8"?>
+<file path=ppt/slides/slide14.xml><?xml version="1.0" encoding="utf-8"?>
 <p:sld xmlns:a="http://schemas.openxmlformats.org/drawingml/2006/main" xmlns:r="http://schemas.openxmlformats.org/officeDocument/2006/relationships" xmlns:p="http://schemas.openxmlformats.org/presentationml/2006/main">
   <p:cSld>
     <p:spTree>
@@ -6509,14 +6254,22 @@
             <p:ph type="body" idx="1"/>
           </p:nvPr>
         </p:nvSpPr>
-        <p:spPr/>
+        <p:spPr>
+          <a:xfrm>
+            <a:off x="415600" y="1402521"/>
+            <a:ext cx="5033896" cy="4555200"/>
+          </a:xfrm>
+        </p:spPr>
         <p:txBody>
           <a:bodyPr/>
           <a:lstStyle/>
           <a:p>
-            <a:r>
-              <a:rPr lang="en-GB" dirty="0"/>
-              <a:t>CD</a:t>
+            <a:pPr marL="114300" indent="0">
+              <a:buNone/>
+            </a:pPr>
+            <a:r>
+              <a:rPr lang="en-GB" sz="2000" dirty="0"/>
+              <a:t>While a lot faster, the smaller feature sets are usually perform worse.</a:t>
             </a:r>
           </a:p>
         </p:txBody>
@@ -6549,6 +6302,401 @@
           </a:p>
         </p:txBody>
       </p:sp>
+      <p:pic>
+        <p:nvPicPr>
+          <p:cNvPr id="5" name="Picture 4">
+            <a:extLst>
+              <a:ext uri="{FF2B5EF4-FFF2-40B4-BE49-F238E27FC236}">
+                <a16:creationId xmlns:a16="http://schemas.microsoft.com/office/drawing/2014/main" id="{A8FEC70E-C88B-827B-CB83-6FD181B1259F}"/>
+              </a:ext>
+            </a:extLst>
+          </p:cNvPr>
+          <p:cNvPicPr>
+            <a:picLocks noChangeAspect="1"/>
+          </p:cNvPicPr>
+          <p:nvPr/>
+        </p:nvPicPr>
+        <p:blipFill rotWithShape="1">
+          <a:blip r:embed="rId2"/>
+          <a:srcRect r="1564"/>
+          <a:stretch/>
+        </p:blipFill>
+        <p:spPr>
+          <a:xfrm>
+            <a:off x="97087" y="3255264"/>
+            <a:ext cx="6846972" cy="2348889"/>
+          </a:xfrm>
+          <a:prstGeom prst="rect">
+            <a:avLst/>
+          </a:prstGeom>
+        </p:spPr>
+      </p:pic>
+      <p:pic>
+        <p:nvPicPr>
+          <p:cNvPr id="7" name="Picture 6">
+            <a:extLst>
+              <a:ext uri="{FF2B5EF4-FFF2-40B4-BE49-F238E27FC236}">
+                <a16:creationId xmlns:a16="http://schemas.microsoft.com/office/drawing/2014/main" id="{87F2D56C-6658-DA8E-DACF-713469FC4B01}"/>
+              </a:ext>
+            </a:extLst>
+          </p:cNvPr>
+          <p:cNvPicPr>
+            <a:picLocks noChangeAspect="1"/>
+          </p:cNvPicPr>
+          <p:nvPr/>
+        </p:nvPicPr>
+        <p:blipFill>
+          <a:blip r:embed="rId3"/>
+          <a:stretch>
+            <a:fillRect/>
+          </a:stretch>
+        </p:blipFill>
+        <p:spPr>
+          <a:xfrm>
+            <a:off x="6961633" y="1452760"/>
+            <a:ext cx="5033896" cy="4454721"/>
+          </a:xfrm>
+          <a:prstGeom prst="rect">
+            <a:avLst/>
+          </a:prstGeom>
+        </p:spPr>
+      </p:pic>
+      <p:sp>
+        <p:nvSpPr>
+          <p:cNvPr id="8" name="Text Placeholder 1">
+            <a:extLst>
+              <a:ext uri="{FF2B5EF4-FFF2-40B4-BE49-F238E27FC236}">
+                <a16:creationId xmlns:a16="http://schemas.microsoft.com/office/drawing/2014/main" id="{B78EE9E4-C6A7-54D1-B074-15A4AAE2C383}"/>
+              </a:ext>
+            </a:extLst>
+          </p:cNvPr>
+          <p:cNvSpPr txBox="1">
+            <a:spLocks/>
+          </p:cNvSpPr>
+          <p:nvPr/>
+        </p:nvSpPr>
+        <p:spPr>
+          <a:xfrm>
+            <a:off x="208336" y="6069321"/>
+            <a:ext cx="11568064" cy="597399"/>
+          </a:xfrm>
+          <a:prstGeom prst="rect">
+            <a:avLst/>
+          </a:prstGeom>
+        </p:spPr>
+        <p:txBody>
+          <a:bodyPr spcFirstLastPara="1" wrap="square" lIns="91425" tIns="91425" rIns="91425" bIns="91425" anchor="t" anchorCtr="0"/>
+          <a:lstStyle>
+            <a:defPPr marR="0" lvl="0" algn="l" rtl="0">
+              <a:lnSpc>
+                <a:spcPct val="100000"/>
+              </a:lnSpc>
+              <a:spcBef>
+                <a:spcPts val="0"/>
+              </a:spcBef>
+              <a:spcAft>
+                <a:spcPts val="0"/>
+              </a:spcAft>
+            </a:defPPr>
+            <a:lvl1pPr marL="457200" marR="0" lvl="0" indent="-342900" algn="l" rtl="0">
+              <a:lnSpc>
+                <a:spcPct val="100000"/>
+              </a:lnSpc>
+              <a:spcBef>
+                <a:spcPts val="0"/>
+              </a:spcBef>
+              <a:spcAft>
+                <a:spcPts val="0"/>
+              </a:spcAft>
+              <a:buClr>
+                <a:srgbClr val="500064"/>
+              </a:buClr>
+              <a:buSzPts val="1800"/>
+              <a:buFont typeface="Arial"/>
+              <a:buChar char="●"/>
+              <a:defRPr sz="1800" b="0" i="0" u="none" strike="noStrike" cap="none">
+                <a:solidFill>
+                  <a:schemeClr val="tx1"/>
+                </a:solidFill>
+                <a:latin typeface="Aptos" panose="020B0004020202020204" pitchFamily="34" charset="0"/>
+                <a:ea typeface="Arial"/>
+                <a:cs typeface="Arial"/>
+                <a:sym typeface="Arial"/>
+              </a:defRPr>
+            </a:lvl1pPr>
+            <a:lvl2pPr marL="914400" marR="0" lvl="1" indent="-317500" algn="l" rtl="0">
+              <a:lnSpc>
+                <a:spcPct val="100000"/>
+              </a:lnSpc>
+              <a:spcBef>
+                <a:spcPts val="1600"/>
+              </a:spcBef>
+              <a:spcAft>
+                <a:spcPts val="0"/>
+              </a:spcAft>
+              <a:buClr>
+                <a:srgbClr val="000000"/>
+              </a:buClr>
+              <a:buSzPts val="1400"/>
+              <a:buFont typeface="Arial"/>
+              <a:buChar char="○"/>
+              <a:defRPr sz="1400" b="0" i="0" u="none" strike="noStrike" cap="none">
+                <a:solidFill>
+                  <a:srgbClr val="000000"/>
+                </a:solidFill>
+                <a:latin typeface="Arial"/>
+                <a:ea typeface="Arial"/>
+                <a:cs typeface="Arial"/>
+                <a:sym typeface="Arial"/>
+              </a:defRPr>
+            </a:lvl2pPr>
+            <a:lvl3pPr marL="1371600" marR="0" lvl="2" indent="-317500" algn="l" rtl="0">
+              <a:lnSpc>
+                <a:spcPct val="100000"/>
+              </a:lnSpc>
+              <a:spcBef>
+                <a:spcPts val="1600"/>
+              </a:spcBef>
+              <a:spcAft>
+                <a:spcPts val="0"/>
+              </a:spcAft>
+              <a:buClr>
+                <a:srgbClr val="000000"/>
+              </a:buClr>
+              <a:buSzPts val="1400"/>
+              <a:buFont typeface="Arial"/>
+              <a:buChar char="■"/>
+              <a:defRPr sz="1400" b="0" i="0" u="none" strike="noStrike" cap="none">
+                <a:solidFill>
+                  <a:srgbClr val="000000"/>
+                </a:solidFill>
+                <a:latin typeface="Arial"/>
+                <a:ea typeface="Arial"/>
+                <a:cs typeface="Arial"/>
+                <a:sym typeface="Arial"/>
+              </a:defRPr>
+            </a:lvl3pPr>
+            <a:lvl4pPr marL="1828800" marR="0" lvl="3" indent="-317500" algn="l" rtl="0">
+              <a:lnSpc>
+                <a:spcPct val="100000"/>
+              </a:lnSpc>
+              <a:spcBef>
+                <a:spcPts val="1600"/>
+              </a:spcBef>
+              <a:spcAft>
+                <a:spcPts val="0"/>
+              </a:spcAft>
+              <a:buClr>
+                <a:srgbClr val="000000"/>
+              </a:buClr>
+              <a:buSzPts val="1400"/>
+              <a:buFont typeface="Arial"/>
+              <a:buChar char="●"/>
+              <a:defRPr sz="1400" b="0" i="0" u="none" strike="noStrike" cap="none">
+                <a:solidFill>
+                  <a:srgbClr val="000000"/>
+                </a:solidFill>
+                <a:latin typeface="Arial"/>
+                <a:ea typeface="Arial"/>
+                <a:cs typeface="Arial"/>
+                <a:sym typeface="Arial"/>
+              </a:defRPr>
+            </a:lvl4pPr>
+            <a:lvl5pPr marL="2286000" marR="0" lvl="4" indent="-317500" algn="l" rtl="0">
+              <a:lnSpc>
+                <a:spcPct val="100000"/>
+              </a:lnSpc>
+              <a:spcBef>
+                <a:spcPts val="1600"/>
+              </a:spcBef>
+              <a:spcAft>
+                <a:spcPts val="0"/>
+              </a:spcAft>
+              <a:buClr>
+                <a:srgbClr val="000000"/>
+              </a:buClr>
+              <a:buSzPts val="1400"/>
+              <a:buFont typeface="Arial"/>
+              <a:buChar char="○"/>
+              <a:defRPr sz="1400" b="0" i="0" u="none" strike="noStrike" cap="none">
+                <a:solidFill>
+                  <a:srgbClr val="000000"/>
+                </a:solidFill>
+                <a:latin typeface="Arial"/>
+                <a:ea typeface="Arial"/>
+                <a:cs typeface="Arial"/>
+                <a:sym typeface="Arial"/>
+              </a:defRPr>
+            </a:lvl5pPr>
+            <a:lvl6pPr marL="2743200" marR="0" lvl="5" indent="-317500" algn="l" rtl="0">
+              <a:lnSpc>
+                <a:spcPct val="100000"/>
+              </a:lnSpc>
+              <a:spcBef>
+                <a:spcPts val="1600"/>
+              </a:spcBef>
+              <a:spcAft>
+                <a:spcPts val="0"/>
+              </a:spcAft>
+              <a:buClr>
+                <a:srgbClr val="000000"/>
+              </a:buClr>
+              <a:buSzPts val="1400"/>
+              <a:buFont typeface="Arial"/>
+              <a:buChar char="■"/>
+              <a:defRPr sz="1400" b="0" i="0" u="none" strike="noStrike" cap="none">
+                <a:solidFill>
+                  <a:srgbClr val="000000"/>
+                </a:solidFill>
+                <a:latin typeface="Arial"/>
+                <a:ea typeface="Arial"/>
+                <a:cs typeface="Arial"/>
+                <a:sym typeface="Arial"/>
+              </a:defRPr>
+            </a:lvl6pPr>
+            <a:lvl7pPr marL="3200400" marR="0" lvl="6" indent="-317500" algn="l" rtl="0">
+              <a:lnSpc>
+                <a:spcPct val="100000"/>
+              </a:lnSpc>
+              <a:spcBef>
+                <a:spcPts val="1600"/>
+              </a:spcBef>
+              <a:spcAft>
+                <a:spcPts val="0"/>
+              </a:spcAft>
+              <a:buClr>
+                <a:srgbClr val="000000"/>
+              </a:buClr>
+              <a:buSzPts val="1400"/>
+              <a:buFont typeface="Arial"/>
+              <a:buChar char="●"/>
+              <a:defRPr sz="1400" b="0" i="0" u="none" strike="noStrike" cap="none">
+                <a:solidFill>
+                  <a:srgbClr val="000000"/>
+                </a:solidFill>
+                <a:latin typeface="Arial"/>
+                <a:ea typeface="Arial"/>
+                <a:cs typeface="Arial"/>
+                <a:sym typeface="Arial"/>
+              </a:defRPr>
+            </a:lvl7pPr>
+            <a:lvl8pPr marL="3657600" marR="0" lvl="7" indent="-317500" algn="l" rtl="0">
+              <a:lnSpc>
+                <a:spcPct val="100000"/>
+              </a:lnSpc>
+              <a:spcBef>
+                <a:spcPts val="1600"/>
+              </a:spcBef>
+              <a:spcAft>
+                <a:spcPts val="0"/>
+              </a:spcAft>
+              <a:buClr>
+                <a:srgbClr val="000000"/>
+              </a:buClr>
+              <a:buSzPts val="1400"/>
+              <a:buFont typeface="Arial"/>
+              <a:buChar char="○"/>
+              <a:defRPr sz="1400" b="0" i="0" u="none" strike="noStrike" cap="none">
+                <a:solidFill>
+                  <a:srgbClr val="000000"/>
+                </a:solidFill>
+                <a:latin typeface="Arial"/>
+                <a:ea typeface="Arial"/>
+                <a:cs typeface="Arial"/>
+                <a:sym typeface="Arial"/>
+              </a:defRPr>
+            </a:lvl8pPr>
+            <a:lvl9pPr marL="4114800" marR="0" lvl="8" indent="-317500" algn="l" rtl="0">
+              <a:lnSpc>
+                <a:spcPct val="100000"/>
+              </a:lnSpc>
+              <a:spcBef>
+                <a:spcPts val="1600"/>
+              </a:spcBef>
+              <a:spcAft>
+                <a:spcPts val="1600"/>
+              </a:spcAft>
+              <a:buClr>
+                <a:srgbClr val="000000"/>
+              </a:buClr>
+              <a:buSzPts val="1400"/>
+              <a:buFont typeface="Arial"/>
+              <a:buChar char="■"/>
+              <a:defRPr sz="1400" b="0" i="0" u="none" strike="noStrike" cap="none">
+                <a:solidFill>
+                  <a:srgbClr val="000000"/>
+                </a:solidFill>
+                <a:latin typeface="Arial"/>
+                <a:ea typeface="Arial"/>
+                <a:cs typeface="Arial"/>
+                <a:sym typeface="Arial"/>
+              </a:defRPr>
+            </a:lvl9pPr>
+          </a:lstStyle>
+          <a:p>
+            <a:pPr marL="114300" indent="0">
+              <a:buFont typeface="Arial"/>
+              <a:buNone/>
+            </a:pPr>
+            <a:r>
+              <a:rPr lang="en-GB" sz="1400" dirty="0"/>
+              <a:t>Dau, H.A., Bagnall, A., </a:t>
+            </a:r>
+            <a:r>
+              <a:rPr lang="en-GB" sz="1400" dirty="0" err="1"/>
+              <a:t>Kamgar</a:t>
+            </a:r>
+            <a:r>
+              <a:rPr lang="en-GB" sz="1400" dirty="0"/>
+              <a:t>, K., Yeh, C.C.M., Zhu, Y., </a:t>
+            </a:r>
+            <a:r>
+              <a:rPr lang="en-GB" sz="1400" dirty="0" err="1"/>
+              <a:t>Gharghabi</a:t>
+            </a:r>
+            <a:r>
+              <a:rPr lang="en-GB" sz="1400" dirty="0"/>
+              <a:t>, S., </a:t>
+            </a:r>
+            <a:r>
+              <a:rPr lang="en-GB" sz="1400" dirty="0" err="1"/>
+              <a:t>Ratanamahatana</a:t>
+            </a:r>
+            <a:r>
+              <a:rPr lang="en-GB" sz="1400" dirty="0"/>
+              <a:t>, C.A. and Keogh, E., 2019. The UCR time series archive. </a:t>
+            </a:r>
+            <a:r>
+              <a:rPr lang="en-GB" sz="1400" i="1" dirty="0"/>
+              <a:t>IEEE/CAA Journal of </a:t>
+            </a:r>
+            <a:r>
+              <a:rPr lang="en-GB" sz="1400" i="1" dirty="0" err="1"/>
+              <a:t>Automatica</a:t>
+            </a:r>
+            <a:r>
+              <a:rPr lang="en-GB" sz="1400" i="1" dirty="0"/>
+              <a:t> </a:t>
+            </a:r>
+            <a:r>
+              <a:rPr lang="en-GB" sz="1400" i="1" dirty="0" err="1"/>
+              <a:t>Sinica</a:t>
+            </a:r>
+            <a:r>
+              <a:rPr lang="en-GB" sz="1400" dirty="0"/>
+              <a:t>, </a:t>
+            </a:r>
+            <a:r>
+              <a:rPr lang="en-GB" sz="1400" i="1" dirty="0"/>
+              <a:t>6</a:t>
+            </a:r>
+            <a:r>
+              <a:rPr lang="en-GB" sz="1400" dirty="0"/>
+              <a:t>(6), pp.1293-1305.</a:t>
+            </a:r>
+          </a:p>
+        </p:txBody>
+      </p:sp>
     </p:spTree>
     <p:extLst>
       <p:ext uri="{BB962C8B-B14F-4D97-AF65-F5344CB8AC3E}">
@@ -6562,7 +6710,7 @@
 </p:sld>
 </file>
 
-<file path=ppt/slides/slide16.xml><?xml version="1.0" encoding="utf-8"?>
+<file path=ppt/slides/slide15.xml><?xml version="1.0" encoding="utf-8"?>
 <p:sld xmlns:a="http://schemas.openxmlformats.org/drawingml/2006/main" xmlns:r="http://schemas.openxmlformats.org/officeDocument/2006/relationships" xmlns:p="http://schemas.openxmlformats.org/presentationml/2006/main">
   <p:cSld>
     <p:spTree>
@@ -7186,131 +7334,6 @@
 </file>
 
 <file path=ppt/slides/slide2.xml><?xml version="1.0" encoding="utf-8"?>
-<p:sld xmlns:a="http://schemas.openxmlformats.org/drawingml/2006/main" xmlns:r="http://schemas.openxmlformats.org/officeDocument/2006/relationships" xmlns:p="http://schemas.openxmlformats.org/presentationml/2006/main">
-  <p:cSld>
-    <p:spTree>
-      <p:nvGrpSpPr>
-        <p:cNvPr id="1" name=""/>
-        <p:cNvGrpSpPr/>
-        <p:nvPr/>
-      </p:nvGrpSpPr>
-      <p:grpSpPr>
-        <a:xfrm>
-          <a:off x="0" y="0"/>
-          <a:ext cx="0" cy="0"/>
-          <a:chOff x="0" y="0"/>
-          <a:chExt cx="0" cy="0"/>
-        </a:xfrm>
-      </p:grpSpPr>
-      <p:sp>
-        <p:nvSpPr>
-          <p:cNvPr id="3" name="Title 2">
-            <a:extLst>
-              <a:ext uri="{FF2B5EF4-FFF2-40B4-BE49-F238E27FC236}">
-                <a16:creationId xmlns:a16="http://schemas.microsoft.com/office/drawing/2014/main" id="{CCF86655-7DDA-4074-B8EC-4CEC97924A42}"/>
-              </a:ext>
-            </a:extLst>
-          </p:cNvPr>
-          <p:cNvSpPr>
-            <a:spLocks noGrp="1"/>
-          </p:cNvSpPr>
-          <p:nvPr>
-            <p:ph type="title"/>
-          </p:nvPr>
-        </p:nvSpPr>
-        <p:spPr/>
-        <p:txBody>
-          <a:bodyPr/>
-          <a:lstStyle/>
-          <a:p>
-            <a:r>
-              <a:rPr lang="en-GB" dirty="0"/>
-              <a:t>Time Series Machine Learning (</a:t>
-            </a:r>
-            <a:r>
-              <a:rPr lang="en-GB" dirty="0" err="1"/>
-              <a:t>tsml</a:t>
-            </a:r>
-            <a:r>
-              <a:rPr lang="en-GB" dirty="0"/>
-              <a:t>)</a:t>
-            </a:r>
-          </a:p>
-        </p:txBody>
-      </p:sp>
-      <p:pic>
-        <p:nvPicPr>
-          <p:cNvPr id="20" name="Picture 19">
-            <a:extLst>
-              <a:ext uri="{FF2B5EF4-FFF2-40B4-BE49-F238E27FC236}">
-                <a16:creationId xmlns:a16="http://schemas.microsoft.com/office/drawing/2014/main" id="{0566F619-B263-4A92-93F4-CBFBA3345EE5}"/>
-              </a:ext>
-            </a:extLst>
-          </p:cNvPr>
-          <p:cNvPicPr>
-            <a:picLocks noChangeAspect="1"/>
-          </p:cNvPicPr>
-          <p:nvPr/>
-        </p:nvPicPr>
-        <p:blipFill>
-          <a:blip r:embed="rId3"/>
-          <a:stretch>
-            <a:fillRect/>
-          </a:stretch>
-        </p:blipFill>
-        <p:spPr>
-          <a:xfrm>
-            <a:off x="364779" y="1328737"/>
-            <a:ext cx="5731221" cy="3067316"/>
-          </a:xfrm>
-          <a:prstGeom prst="rect">
-            <a:avLst/>
-          </a:prstGeom>
-        </p:spPr>
-      </p:pic>
-      <p:pic>
-        <p:nvPicPr>
-          <p:cNvPr id="2" name="Picture 1">
-            <a:extLst>
-              <a:ext uri="{FF2B5EF4-FFF2-40B4-BE49-F238E27FC236}">
-                <a16:creationId xmlns:a16="http://schemas.microsoft.com/office/drawing/2014/main" id="{511435FD-39BD-ED7D-1401-0277C528459C}"/>
-              </a:ext>
-            </a:extLst>
-          </p:cNvPr>
-          <p:cNvPicPr>
-            <a:picLocks noChangeAspect="1"/>
-          </p:cNvPicPr>
-          <p:nvPr/>
-        </p:nvPicPr>
-        <p:blipFill rotWithShape="1">
-          <a:blip r:embed="rId4"/>
-          <a:srcRect t="129" b="-1"/>
-          <a:stretch/>
-        </p:blipFill>
-        <p:spPr>
-          <a:xfrm>
-            <a:off x="6096000" y="3279648"/>
-            <a:ext cx="5948416" cy="3276667"/>
-          </a:xfrm>
-          <a:prstGeom prst="rect">
-            <a:avLst/>
-          </a:prstGeom>
-        </p:spPr>
-      </p:pic>
-    </p:spTree>
-    <p:extLst>
-      <p:ext uri="{BB962C8B-B14F-4D97-AF65-F5344CB8AC3E}">
-        <p14:creationId xmlns:p14="http://schemas.microsoft.com/office/powerpoint/2010/main" val="4279366238"/>
-      </p:ext>
-    </p:extLst>
-  </p:cSld>
-  <p:clrMapOvr>
-    <a:masterClrMapping/>
-  </p:clrMapOvr>
-</p:sld>
-</file>
-
-<file path=ppt/slides/slide3.xml><?xml version="1.0" encoding="utf-8"?>
 <p:sld xmlns:a="http://schemas.openxmlformats.org/drawingml/2006/main" xmlns:r="http://schemas.openxmlformats.org/officeDocument/2006/relationships" xmlns:p="http://schemas.openxmlformats.org/presentationml/2006/main">
   <p:cSld>
     <p:spTree>
@@ -7416,7 +7439,7 @@
             </a:pPr>
             <a:r>
               <a:rPr lang="en-GB" sz="2000" dirty="0"/>
-              <a:t>One of the easiest approaches is to just summarise the full set of series into a collection of feature vectors.</a:t>
+              <a:t>One of the easiest approaches is to just summarise the full set of series into a collection of feature vectors. Other categories also use pipelines, i.e. ROCKET.</a:t>
             </a:r>
           </a:p>
         </p:txBody>
@@ -8002,7 +8025,7 @@
 </p:sld>
 </file>
 
-<file path=ppt/slides/slide4.xml><?xml version="1.0" encoding="utf-8"?>
+<file path=ppt/slides/slide3.xml><?xml version="1.0" encoding="utf-8"?>
 <p:sld xmlns:a="http://schemas.openxmlformats.org/drawingml/2006/main" xmlns:r="http://schemas.openxmlformats.org/officeDocument/2006/relationships" xmlns:p="http://schemas.openxmlformats.org/presentationml/2006/main">
   <p:cSld>
     <p:spTree>
@@ -8065,7 +8088,7 @@
         </p:nvSpPr>
         <p:spPr>
           <a:xfrm>
-            <a:off x="415600" y="1536633"/>
+            <a:off x="415600" y="1317177"/>
             <a:ext cx="11360800" cy="4555200"/>
           </a:xfrm>
         </p:spPr>
@@ -8073,13 +8096,268 @@
           <a:bodyPr/>
           <a:lstStyle/>
           <a:p>
-            <a:r>
-              <a:rPr lang="en-GB" sz="2000" dirty="0" err="1"/>
-              <a:t>todo</a:t>
-            </a:r>
+            <a:pPr marL="114300" indent="0">
+              <a:buNone/>
+            </a:pPr>
+            <a:r>
+              <a:rPr lang="en-GB" sz="2000" dirty="0"/>
+              <a:t>We include statistics that average, select single values or are otherwise well-known and simple to understand in this category</a:t>
+            </a:r>
+          </a:p>
+          <a:p>
             <a:endParaRPr lang="en-GB" sz="2000" dirty="0"/>
           </a:p>
           <a:p>
+            <a:r>
+              <a:rPr lang="en-GB" sz="2000" dirty="0"/>
+              <a:t>Averages: </a:t>
+            </a:r>
+            <a:r>
+              <a:rPr lang="en-GB" sz="2000" b="1" dirty="0"/>
+              <a:t>mean</a:t>
+            </a:r>
+            <a:r>
+              <a:rPr lang="en-GB" sz="2000" dirty="0"/>
+              <a:t>,</a:t>
+            </a:r>
+            <a:r>
+              <a:rPr lang="en-GB" sz="2000" b="1" dirty="0"/>
+              <a:t> std</a:t>
+            </a:r>
+            <a:r>
+              <a:rPr lang="en-GB" sz="2000" dirty="0"/>
+              <a:t>,</a:t>
+            </a:r>
+            <a:r>
+              <a:rPr lang="en-GB" sz="2000" b="1" dirty="0"/>
+              <a:t> min</a:t>
+            </a:r>
+            <a:r>
+              <a:rPr lang="en-GB" sz="2000" dirty="0"/>
+              <a:t>,</a:t>
+            </a:r>
+            <a:r>
+              <a:rPr lang="en-GB" sz="2000" b="1" dirty="0"/>
+              <a:t> max</a:t>
+            </a:r>
+            <a:r>
+              <a:rPr lang="en-GB" sz="2000" dirty="0"/>
+              <a:t>,</a:t>
+            </a:r>
+            <a:r>
+              <a:rPr lang="en-GB" sz="2000" b="1" dirty="0"/>
+              <a:t> 25% percentile</a:t>
+            </a:r>
+            <a:r>
+              <a:rPr lang="en-GB" sz="2000" dirty="0"/>
+              <a:t>,</a:t>
+            </a:r>
+            <a:r>
+              <a:rPr lang="en-GB" sz="2000" b="1" dirty="0"/>
+              <a:t> 50% percentile</a:t>
+            </a:r>
+            <a:r>
+              <a:rPr lang="en-GB" sz="2000" dirty="0"/>
+              <a:t>,</a:t>
+            </a:r>
+            <a:r>
+              <a:rPr lang="en-GB" sz="2000" b="1" dirty="0"/>
+              <a:t> 75 % percentile</a:t>
+            </a:r>
+          </a:p>
+          <a:p>
+            <a:endParaRPr lang="en-GB" sz="2000" dirty="0"/>
+          </a:p>
+          <a:p>
+            <a:endParaRPr lang="en-GB" sz="2000" dirty="0"/>
+          </a:p>
+          <a:p>
+            <a:r>
+              <a:rPr lang="en-GB" sz="2000" dirty="0"/>
+              <a:t>Percentiles: </a:t>
+            </a:r>
+            <a:r>
+              <a:rPr lang="en-GB" sz="2000" b="1" dirty="0"/>
+              <a:t>2.15% percentile</a:t>
+            </a:r>
+            <a:r>
+              <a:rPr lang="en-GB" sz="2000" dirty="0"/>
+              <a:t>, </a:t>
+            </a:r>
+            <a:r>
+              <a:rPr lang="en-GB" sz="2000" b="1" dirty="0"/>
+              <a:t>8.87% percentile</a:t>
+            </a:r>
+            <a:r>
+              <a:rPr lang="en-GB" sz="2000" dirty="0"/>
+              <a:t>, </a:t>
+            </a:r>
+            <a:r>
+              <a:rPr lang="en-GB" sz="2000" b="1" dirty="0"/>
+              <a:t>25% percentile</a:t>
+            </a:r>
+            <a:r>
+              <a:rPr lang="en-GB" sz="2000" dirty="0"/>
+              <a:t>, </a:t>
+            </a:r>
+            <a:r>
+              <a:rPr lang="en-GB" sz="2000" b="1" dirty="0"/>
+              <a:t>50% percentile</a:t>
+            </a:r>
+            <a:r>
+              <a:rPr lang="en-GB" sz="2000" dirty="0"/>
+              <a:t>, </a:t>
+            </a:r>
+            <a:r>
+              <a:rPr lang="en-GB" sz="2000" b="1" dirty="0"/>
+              <a:t>75% percentile</a:t>
+            </a:r>
+            <a:r>
+              <a:rPr lang="en-GB" sz="2000" dirty="0"/>
+              <a:t>, </a:t>
+            </a:r>
+            <a:r>
+              <a:rPr lang="en-GB" sz="2000" b="1" dirty="0"/>
+              <a:t>91.13% percentile</a:t>
+            </a:r>
+            <a:r>
+              <a:rPr lang="en-GB" sz="2000" dirty="0"/>
+              <a:t>, </a:t>
+            </a:r>
+            <a:r>
+              <a:rPr lang="en-GB" sz="2000" b="1" dirty="0"/>
+              <a:t>97.85% percentile</a:t>
+            </a:r>
+            <a:endParaRPr lang="en-GB" sz="2000" dirty="0"/>
+          </a:p>
+          <a:p>
+            <a:endParaRPr lang="en-GB" sz="2000" dirty="0"/>
+          </a:p>
+          <a:p>
+            <a:endParaRPr lang="en-GB" sz="2000" dirty="0"/>
+          </a:p>
+          <a:p>
+            <a:r>
+              <a:rPr lang="en-GB" sz="2000" dirty="0"/>
+              <a:t>Bowley: </a:t>
+            </a:r>
+            <a:r>
+              <a:rPr lang="en-GB" sz="2000" b="1" dirty="0"/>
+              <a:t>min</a:t>
+            </a:r>
+            <a:r>
+              <a:rPr lang="en-GB" sz="2000" dirty="0"/>
+              <a:t>, </a:t>
+            </a:r>
+            <a:r>
+              <a:rPr lang="en-GB" sz="2000" b="1" dirty="0"/>
+              <a:t>max</a:t>
+            </a:r>
+            <a:r>
+              <a:rPr lang="en-GB" sz="2000" dirty="0"/>
+              <a:t>, </a:t>
+            </a:r>
+            <a:r>
+              <a:rPr lang="en-GB" sz="2000" b="1" dirty="0"/>
+              <a:t>10% percentile</a:t>
+            </a:r>
+            <a:r>
+              <a:rPr lang="en-GB" sz="2000" dirty="0"/>
+              <a:t>, </a:t>
+            </a:r>
+            <a:r>
+              <a:rPr lang="en-GB" sz="2000" b="1" dirty="0"/>
+              <a:t>25% percentile</a:t>
+            </a:r>
+            <a:r>
+              <a:rPr lang="en-GB" sz="2000" dirty="0"/>
+              <a:t>, </a:t>
+            </a:r>
+            <a:r>
+              <a:rPr lang="en-GB" sz="2000" b="1" dirty="0"/>
+              <a:t>50% percentile</a:t>
+            </a:r>
+            <a:r>
+              <a:rPr lang="en-GB" sz="2000" dirty="0"/>
+              <a:t>, </a:t>
+            </a:r>
+            <a:r>
+              <a:rPr lang="en-GB" sz="2000" b="1" dirty="0"/>
+              <a:t>75% percentile</a:t>
+            </a:r>
+            <a:r>
+              <a:rPr lang="en-GB" sz="2000" dirty="0"/>
+              <a:t>, </a:t>
+            </a:r>
+            <a:r>
+              <a:rPr lang="en-GB" sz="2000" b="1" dirty="0"/>
+              <a:t>90% percentile</a:t>
+            </a:r>
+            <a:endParaRPr lang="en-GB" sz="2000" dirty="0"/>
+          </a:p>
+          <a:p>
+            <a:endParaRPr lang="en-GB" sz="2000" dirty="0"/>
+          </a:p>
+          <a:p>
+            <a:endParaRPr lang="en-GB" sz="2000" dirty="0"/>
+          </a:p>
+          <a:p>
+            <a:r>
+              <a:rPr lang="en-GB" sz="2000" dirty="0"/>
+              <a:t>Tukey: </a:t>
+            </a:r>
+            <a:r>
+              <a:rPr lang="en-GB" sz="2000" b="1" dirty="0"/>
+              <a:t>min</a:t>
+            </a:r>
+            <a:r>
+              <a:rPr lang="en-GB" sz="2000" dirty="0"/>
+              <a:t>, </a:t>
+            </a:r>
+            <a:r>
+              <a:rPr lang="en-GB" sz="2000" b="1" dirty="0"/>
+              <a:t>max</a:t>
+            </a:r>
+            <a:r>
+              <a:rPr lang="en-GB" sz="2000" dirty="0"/>
+              <a:t>, </a:t>
+            </a:r>
+            <a:r>
+              <a:rPr lang="en-GB" sz="2000" b="1" dirty="0"/>
+              <a:t>12.5% percentile</a:t>
+            </a:r>
+            <a:r>
+              <a:rPr lang="en-GB" sz="2000" dirty="0"/>
+              <a:t>, </a:t>
+            </a:r>
+            <a:r>
+              <a:rPr lang="en-GB" sz="2000" b="1" dirty="0"/>
+              <a:t>25% percentile</a:t>
+            </a:r>
+            <a:r>
+              <a:rPr lang="en-GB" sz="2000" dirty="0"/>
+              <a:t>, </a:t>
+            </a:r>
+            <a:r>
+              <a:rPr lang="en-GB" sz="2000" b="1" dirty="0"/>
+              <a:t>50% percentile</a:t>
+            </a:r>
+            <a:r>
+              <a:rPr lang="en-GB" sz="2000" dirty="0"/>
+              <a:t>, </a:t>
+            </a:r>
+            <a:r>
+              <a:rPr lang="en-GB" sz="2000" b="1" dirty="0"/>
+              <a:t>75% percentile</a:t>
+            </a:r>
+            <a:r>
+              <a:rPr lang="en-GB" sz="2000" dirty="0"/>
+              <a:t>, </a:t>
+            </a:r>
+            <a:r>
+              <a:rPr lang="en-GB" sz="2000" b="1" dirty="0"/>
+              <a:t>87.5% percentile</a:t>
+            </a:r>
             <a:endParaRPr lang="en-GB" sz="2000" dirty="0"/>
           </a:p>
         </p:txBody>
@@ -8097,7 +8375,7 @@
 </p:sld>
 </file>
 
-<file path=ppt/slides/slide5.xml><?xml version="1.0" encoding="utf-8"?>
+<file path=ppt/slides/slide4.xml><?xml version="1.0" encoding="utf-8"?>
 <p:sld xmlns:a="http://schemas.openxmlformats.org/drawingml/2006/main" xmlns:r="http://schemas.openxmlformats.org/officeDocument/2006/relationships" xmlns:p="http://schemas.openxmlformats.org/presentationml/2006/main">
   <p:cSld>
     <p:spTree>
@@ -10639,7 +10917,7 @@
 </p:sld>
 </file>
 
-<file path=ppt/slides/slide6.xml><?xml version="1.0" encoding="utf-8"?>
+<file path=ppt/slides/slide5.xml><?xml version="1.0" encoding="utf-8"?>
 <p:sld xmlns:a="http://schemas.openxmlformats.org/drawingml/2006/main" xmlns:r="http://schemas.openxmlformats.org/officeDocument/2006/relationships" xmlns:p="http://schemas.openxmlformats.org/presentationml/2006/main">
   <p:cSld>
     <p:spTree>
@@ -10792,7 +11070,7 @@
 </p:sld>
 </file>
 
-<file path=ppt/slides/slide7.xml><?xml version="1.0" encoding="utf-8"?>
+<file path=ppt/slides/slide6.xml><?xml version="1.0" encoding="utf-8"?>
 <p:sld xmlns:a="http://schemas.openxmlformats.org/drawingml/2006/main" xmlns:r="http://schemas.openxmlformats.org/officeDocument/2006/relationships" xmlns:p="http://schemas.openxmlformats.org/presentationml/2006/main">
   <p:cSld>
     <p:spTree>
@@ -11362,7 +11640,7 @@
 </p:sld>
 </file>
 
-<file path=ppt/slides/slide8.xml><?xml version="1.0" encoding="utf-8"?>
+<file path=ppt/slides/slide7.xml><?xml version="1.0" encoding="utf-8"?>
 <p:sld xmlns:a="http://schemas.openxmlformats.org/drawingml/2006/main" xmlns:r="http://schemas.openxmlformats.org/officeDocument/2006/relationships" xmlns:p="http://schemas.openxmlformats.org/presentationml/2006/main">
   <p:cSld>
     <p:spTree>
@@ -12177,7 +12455,7 @@
 </p:sld>
 </file>
 
-<file path=ppt/slides/slide9.xml><?xml version="1.0" encoding="utf-8"?>
+<file path=ppt/slides/slide8.xml><?xml version="1.0" encoding="utf-8"?>
 <p:sld xmlns:a="http://schemas.openxmlformats.org/drawingml/2006/main" xmlns:r="http://schemas.openxmlformats.org/officeDocument/2006/relationships" xmlns:p="http://schemas.openxmlformats.org/presentationml/2006/main">
   <p:cSld>
     <p:spTree>
@@ -12249,11 +12527,150 @@
           <a:lstStyle/>
           <a:p>
             <a:r>
-              <a:rPr lang="en-GB" sz="2000" b="1" dirty="0" err="1">
+              <a:rPr lang="en-GB" sz="2000" b="1" dirty="0">
                 <a:effectLst/>
                 <a:latin typeface="+mn-lt"/>
               </a:rPr>
-              <a:t>todo</a:t>
+              <a:t>SB_BinaryStats_mean_longstretch1 (</a:t>
+            </a:r>
+            <a:r>
+              <a:rPr lang="en-GB" sz="2000" dirty="0" err="1">
+                <a:effectLst/>
+                <a:latin typeface="+mn-lt"/>
+              </a:rPr>
+              <a:t>stretch_high</a:t>
+            </a:r>
+            <a:r>
+              <a:rPr lang="en-GB" sz="2000" b="1" dirty="0">
+                <a:effectLst/>
+                <a:latin typeface="+mn-lt"/>
+              </a:rPr>
+              <a:t>) </a:t>
+            </a:r>
+            <a:r>
+              <a:rPr lang="en-GB" sz="2000" dirty="0">
+                <a:effectLst/>
+                <a:latin typeface="+mn-lt"/>
+              </a:rPr>
+              <a:t>- Longest period of consecutive values</a:t>
+            </a:r>
+            <a:br>
+              <a:rPr lang="en-GB" sz="2000" dirty="0">
+                <a:latin typeface="+mn-lt"/>
+              </a:rPr>
+            </a:br>
+            <a:r>
+              <a:rPr lang="en-GB" sz="2000" dirty="0">
+                <a:effectLst/>
+                <a:latin typeface="+mn-lt"/>
+              </a:rPr>
+              <a:t>above the mean</a:t>
+            </a:r>
+          </a:p>
+          <a:p>
+            <a:pPr marL="114300" indent="0">
+              <a:buNone/>
+            </a:pPr>
+            <a:endParaRPr lang="en-GB" sz="2000" dirty="0">
+              <a:latin typeface="+mn-lt"/>
+            </a:endParaRPr>
+          </a:p>
+          <a:p>
+            <a:endParaRPr lang="en-GB" sz="2000" dirty="0">
+              <a:latin typeface="+mn-lt"/>
+            </a:endParaRPr>
+          </a:p>
+          <a:p>
+            <a:r>
+              <a:rPr lang="en-GB" sz="2000" b="1" dirty="0">
+                <a:effectLst/>
+                <a:latin typeface="+mn-lt"/>
+              </a:rPr>
+              <a:t>SP_Summaries_welch_rect_area_5_1 (</a:t>
+            </a:r>
+            <a:r>
+              <a:rPr lang="en-GB" sz="2000" dirty="0" err="1">
+                <a:effectLst/>
+                <a:latin typeface="+mn-lt"/>
+              </a:rPr>
+              <a:t>low_freq_power</a:t>
+            </a:r>
+            <a:r>
+              <a:rPr lang="en-GB" sz="2000" b="1" dirty="0">
+                <a:effectLst/>
+                <a:latin typeface="+mn-lt"/>
+              </a:rPr>
+              <a:t>) </a:t>
+            </a:r>
+            <a:r>
+              <a:rPr lang="en-GB" sz="2000" dirty="0">
+                <a:effectLst/>
+                <a:latin typeface="+mn-lt"/>
+              </a:rPr>
+              <a:t>- Total power in lowest fifth of frequencies in the Fourier power spectrum</a:t>
+            </a:r>
+          </a:p>
+          <a:p>
+            <a:endParaRPr lang="en-GB" sz="2000" dirty="0">
+              <a:latin typeface="+mn-lt"/>
+            </a:endParaRPr>
+          </a:p>
+          <a:p>
+            <a:endParaRPr lang="en-GB" sz="2000" dirty="0">
+              <a:latin typeface="+mn-lt"/>
+            </a:endParaRPr>
+          </a:p>
+          <a:p>
+            <a:r>
+              <a:rPr lang="en-GB" sz="2000" b="1" dirty="0">
+                <a:latin typeface="+mn-lt"/>
+              </a:rPr>
+              <a:t>FC_LocalSimple_mean3_stderr </a:t>
+            </a:r>
+            <a:r>
+              <a:rPr lang="en-GB" sz="2000" b="1" dirty="0">
+                <a:effectLst/>
+                <a:latin typeface="+mn-lt"/>
+              </a:rPr>
+              <a:t>(</a:t>
+            </a:r>
+            <a:r>
+              <a:rPr kumimoji="0" lang="en-US" altLang="en-US" sz="2000" b="0" i="0" u="none" strike="noStrike" cap="none" normalizeH="0" baseline="0" dirty="0" err="1">
+                <a:ln>
+                  <a:noFill/>
+                </a:ln>
+                <a:solidFill>
+                  <a:schemeClr val="tx1"/>
+                </a:solidFill>
+                <a:effectLst/>
+                <a:latin typeface="Arial Unicode MS"/>
+              </a:rPr>
+              <a:t>forecast_error</a:t>
+            </a:r>
+            <a:r>
+              <a:rPr kumimoji="0" lang="en-US" altLang="en-US" sz="1600" b="0" i="0" u="none" strike="noStrike" cap="none" normalizeH="0" baseline="0" dirty="0">
+                <a:ln>
+                  <a:noFill/>
+                </a:ln>
+                <a:solidFill>
+                  <a:schemeClr val="tx1"/>
+                </a:solidFill>
+                <a:effectLst/>
+              </a:rPr>
+              <a:t> </a:t>
+            </a:r>
+            <a:r>
+              <a:rPr lang="en-GB" sz="2000" b="1" dirty="0">
+                <a:effectLst/>
+                <a:latin typeface="+mn-lt"/>
+              </a:rPr>
+              <a:t>) </a:t>
+            </a:r>
+            <a:r>
+              <a:rPr lang="en-GB" sz="2000" dirty="0">
+                <a:latin typeface="+mn-lt"/>
+              </a:rPr>
+              <a:t>– Mean error from a rolling 3-sample mean forecasting</a:t>
             </a:r>
             <a:endParaRPr lang="en-GB" sz="2000" dirty="0">
               <a:effectLst/>
@@ -12261,12 +12678,352 @@
             </a:endParaRPr>
           </a:p>
           <a:p>
+            <a:pPr marL="114300" indent="0">
+              <a:buNone/>
+            </a:pPr>
+            <a:endParaRPr lang="en-GB" sz="2000" dirty="0">
+              <a:latin typeface="+mn-lt"/>
+            </a:endParaRPr>
+          </a:p>
+          <a:p>
+            <a:pPr marL="114300" indent="0">
+              <a:buNone/>
+            </a:pPr>
+            <a:endParaRPr lang="en-GB" sz="2000" dirty="0">
+              <a:latin typeface="+mn-lt"/>
+            </a:endParaRPr>
+          </a:p>
+          <a:p>
+            <a:r>
+              <a:rPr lang="en-GB" sz="2000" b="1" dirty="0">
+                <a:effectLst/>
+                <a:latin typeface="+mn-lt"/>
+              </a:rPr>
+              <a:t>DN_OutlierInclude_p_001_mdrmd (</a:t>
+            </a:r>
+            <a:r>
+              <a:rPr lang="en-GB" sz="2000" dirty="0" err="1">
+                <a:effectLst/>
+                <a:latin typeface="+mn-lt"/>
+              </a:rPr>
+              <a:t>outlier_timing_pos</a:t>
+            </a:r>
+            <a:r>
+              <a:rPr lang="en-GB" sz="2000" b="1" dirty="0">
+                <a:effectLst/>
+                <a:latin typeface="+mn-lt"/>
+              </a:rPr>
+              <a:t>) </a:t>
+            </a:r>
+            <a:r>
+              <a:rPr lang="en-GB" sz="2000" dirty="0">
+                <a:effectLst/>
+                <a:latin typeface="+mn-lt"/>
+              </a:rPr>
+              <a:t>– Time intervals between successive extreme events above the mean</a:t>
+            </a:r>
+          </a:p>
+          <a:p>
+            <a:pPr marL="114300" indent="0">
+              <a:buNone/>
+            </a:pPr>
             <a:endParaRPr lang="en-GB" sz="2000" dirty="0">
               <a:latin typeface="Times New Roman" panose="02020603050405020304" pitchFamily="18" charset="0"/>
             </a:endParaRPr>
           </a:p>
           <a:p>
             <a:endParaRPr lang="en-GB" sz="2000" dirty="0"/>
+          </a:p>
+        </p:txBody>
+      </p:sp>
+      <p:sp>
+        <p:nvSpPr>
+          <p:cNvPr id="2" name="Text Placeholder 1">
+            <a:extLst>
+              <a:ext uri="{FF2B5EF4-FFF2-40B4-BE49-F238E27FC236}">
+                <a16:creationId xmlns:a16="http://schemas.microsoft.com/office/drawing/2014/main" id="{3F2C0817-DE85-46D4-0511-88F4E8158A7A}"/>
+              </a:ext>
+            </a:extLst>
+          </p:cNvPr>
+          <p:cNvSpPr txBox="1">
+            <a:spLocks/>
+          </p:cNvSpPr>
+          <p:nvPr/>
+        </p:nvSpPr>
+        <p:spPr>
+          <a:xfrm>
+            <a:off x="208336" y="6278880"/>
+            <a:ext cx="11568064" cy="387840"/>
+          </a:xfrm>
+          <a:prstGeom prst="rect">
+            <a:avLst/>
+          </a:prstGeom>
+        </p:spPr>
+        <p:txBody>
+          <a:bodyPr spcFirstLastPara="1" wrap="square" lIns="91425" tIns="91425" rIns="91425" bIns="91425" anchor="t" anchorCtr="0"/>
+          <a:lstStyle>
+            <a:defPPr marR="0" lvl="0" algn="l" rtl="0">
+              <a:lnSpc>
+                <a:spcPct val="100000"/>
+              </a:lnSpc>
+              <a:spcBef>
+                <a:spcPts val="0"/>
+              </a:spcBef>
+              <a:spcAft>
+                <a:spcPts val="0"/>
+              </a:spcAft>
+            </a:defPPr>
+            <a:lvl1pPr marL="457200" marR="0" lvl="0" indent="-342900" algn="l" rtl="0">
+              <a:lnSpc>
+                <a:spcPct val="100000"/>
+              </a:lnSpc>
+              <a:spcBef>
+                <a:spcPts val="0"/>
+              </a:spcBef>
+              <a:spcAft>
+                <a:spcPts val="0"/>
+              </a:spcAft>
+              <a:buClr>
+                <a:srgbClr val="500064"/>
+              </a:buClr>
+              <a:buSzPts val="1800"/>
+              <a:buFont typeface="Arial"/>
+              <a:buChar char="●"/>
+              <a:defRPr sz="1800" b="0" i="0" u="none" strike="noStrike" cap="none">
+                <a:solidFill>
+                  <a:schemeClr val="tx1"/>
+                </a:solidFill>
+                <a:latin typeface="Aptos" panose="020B0004020202020204" pitchFamily="34" charset="0"/>
+                <a:ea typeface="Arial"/>
+                <a:cs typeface="Arial"/>
+                <a:sym typeface="Arial"/>
+              </a:defRPr>
+            </a:lvl1pPr>
+            <a:lvl2pPr marL="914400" marR="0" lvl="1" indent="-317500" algn="l" rtl="0">
+              <a:lnSpc>
+                <a:spcPct val="100000"/>
+              </a:lnSpc>
+              <a:spcBef>
+                <a:spcPts val="1600"/>
+              </a:spcBef>
+              <a:spcAft>
+                <a:spcPts val="0"/>
+              </a:spcAft>
+              <a:buClr>
+                <a:srgbClr val="000000"/>
+              </a:buClr>
+              <a:buSzPts val="1400"/>
+              <a:buFont typeface="Arial"/>
+              <a:buChar char="○"/>
+              <a:defRPr sz="1400" b="0" i="0" u="none" strike="noStrike" cap="none">
+                <a:solidFill>
+                  <a:srgbClr val="000000"/>
+                </a:solidFill>
+                <a:latin typeface="Arial"/>
+                <a:ea typeface="Arial"/>
+                <a:cs typeface="Arial"/>
+                <a:sym typeface="Arial"/>
+              </a:defRPr>
+            </a:lvl2pPr>
+            <a:lvl3pPr marL="1371600" marR="0" lvl="2" indent="-317500" algn="l" rtl="0">
+              <a:lnSpc>
+                <a:spcPct val="100000"/>
+              </a:lnSpc>
+              <a:spcBef>
+                <a:spcPts val="1600"/>
+              </a:spcBef>
+              <a:spcAft>
+                <a:spcPts val="0"/>
+              </a:spcAft>
+              <a:buClr>
+                <a:srgbClr val="000000"/>
+              </a:buClr>
+              <a:buSzPts val="1400"/>
+              <a:buFont typeface="Arial"/>
+              <a:buChar char="■"/>
+              <a:defRPr sz="1400" b="0" i="0" u="none" strike="noStrike" cap="none">
+                <a:solidFill>
+                  <a:srgbClr val="000000"/>
+                </a:solidFill>
+                <a:latin typeface="Arial"/>
+                <a:ea typeface="Arial"/>
+                <a:cs typeface="Arial"/>
+                <a:sym typeface="Arial"/>
+              </a:defRPr>
+            </a:lvl3pPr>
+            <a:lvl4pPr marL="1828800" marR="0" lvl="3" indent="-317500" algn="l" rtl="0">
+              <a:lnSpc>
+                <a:spcPct val="100000"/>
+              </a:lnSpc>
+              <a:spcBef>
+                <a:spcPts val="1600"/>
+              </a:spcBef>
+              <a:spcAft>
+                <a:spcPts val="0"/>
+              </a:spcAft>
+              <a:buClr>
+                <a:srgbClr val="000000"/>
+              </a:buClr>
+              <a:buSzPts val="1400"/>
+              <a:buFont typeface="Arial"/>
+              <a:buChar char="●"/>
+              <a:defRPr sz="1400" b="0" i="0" u="none" strike="noStrike" cap="none">
+                <a:solidFill>
+                  <a:srgbClr val="000000"/>
+                </a:solidFill>
+                <a:latin typeface="Arial"/>
+                <a:ea typeface="Arial"/>
+                <a:cs typeface="Arial"/>
+                <a:sym typeface="Arial"/>
+              </a:defRPr>
+            </a:lvl4pPr>
+            <a:lvl5pPr marL="2286000" marR="0" lvl="4" indent="-317500" algn="l" rtl="0">
+              <a:lnSpc>
+                <a:spcPct val="100000"/>
+              </a:lnSpc>
+              <a:spcBef>
+                <a:spcPts val="1600"/>
+              </a:spcBef>
+              <a:spcAft>
+                <a:spcPts val="0"/>
+              </a:spcAft>
+              <a:buClr>
+                <a:srgbClr val="000000"/>
+              </a:buClr>
+              <a:buSzPts val="1400"/>
+              <a:buFont typeface="Arial"/>
+              <a:buChar char="○"/>
+              <a:defRPr sz="1400" b="0" i="0" u="none" strike="noStrike" cap="none">
+                <a:solidFill>
+                  <a:srgbClr val="000000"/>
+                </a:solidFill>
+                <a:latin typeface="Arial"/>
+                <a:ea typeface="Arial"/>
+                <a:cs typeface="Arial"/>
+                <a:sym typeface="Arial"/>
+              </a:defRPr>
+            </a:lvl5pPr>
+            <a:lvl6pPr marL="2743200" marR="0" lvl="5" indent="-317500" algn="l" rtl="0">
+              <a:lnSpc>
+                <a:spcPct val="100000"/>
+              </a:lnSpc>
+              <a:spcBef>
+                <a:spcPts val="1600"/>
+              </a:spcBef>
+              <a:spcAft>
+                <a:spcPts val="0"/>
+              </a:spcAft>
+              <a:buClr>
+                <a:srgbClr val="000000"/>
+              </a:buClr>
+              <a:buSzPts val="1400"/>
+              <a:buFont typeface="Arial"/>
+              <a:buChar char="■"/>
+              <a:defRPr sz="1400" b="0" i="0" u="none" strike="noStrike" cap="none">
+                <a:solidFill>
+                  <a:srgbClr val="000000"/>
+                </a:solidFill>
+                <a:latin typeface="Arial"/>
+                <a:ea typeface="Arial"/>
+                <a:cs typeface="Arial"/>
+                <a:sym typeface="Arial"/>
+              </a:defRPr>
+            </a:lvl6pPr>
+            <a:lvl7pPr marL="3200400" marR="0" lvl="6" indent="-317500" algn="l" rtl="0">
+              <a:lnSpc>
+                <a:spcPct val="100000"/>
+              </a:lnSpc>
+              <a:spcBef>
+                <a:spcPts val="1600"/>
+              </a:spcBef>
+              <a:spcAft>
+                <a:spcPts val="0"/>
+              </a:spcAft>
+              <a:buClr>
+                <a:srgbClr val="000000"/>
+              </a:buClr>
+              <a:buSzPts val="1400"/>
+              <a:buFont typeface="Arial"/>
+              <a:buChar char="●"/>
+              <a:defRPr sz="1400" b="0" i="0" u="none" strike="noStrike" cap="none">
+                <a:solidFill>
+                  <a:srgbClr val="000000"/>
+                </a:solidFill>
+                <a:latin typeface="Arial"/>
+                <a:ea typeface="Arial"/>
+                <a:cs typeface="Arial"/>
+                <a:sym typeface="Arial"/>
+              </a:defRPr>
+            </a:lvl7pPr>
+            <a:lvl8pPr marL="3657600" marR="0" lvl="7" indent="-317500" algn="l" rtl="0">
+              <a:lnSpc>
+                <a:spcPct val="100000"/>
+              </a:lnSpc>
+              <a:spcBef>
+                <a:spcPts val="1600"/>
+              </a:spcBef>
+              <a:spcAft>
+                <a:spcPts val="0"/>
+              </a:spcAft>
+              <a:buClr>
+                <a:srgbClr val="000000"/>
+              </a:buClr>
+              <a:buSzPts val="1400"/>
+              <a:buFont typeface="Arial"/>
+              <a:buChar char="○"/>
+              <a:defRPr sz="1400" b="0" i="0" u="none" strike="noStrike" cap="none">
+                <a:solidFill>
+                  <a:srgbClr val="000000"/>
+                </a:solidFill>
+                <a:latin typeface="Arial"/>
+                <a:ea typeface="Arial"/>
+                <a:cs typeface="Arial"/>
+                <a:sym typeface="Arial"/>
+              </a:defRPr>
+            </a:lvl8pPr>
+            <a:lvl9pPr marL="4114800" marR="0" lvl="8" indent="-317500" algn="l" rtl="0">
+              <a:lnSpc>
+                <a:spcPct val="100000"/>
+              </a:lnSpc>
+              <a:spcBef>
+                <a:spcPts val="1600"/>
+              </a:spcBef>
+              <a:spcAft>
+                <a:spcPts val="1600"/>
+              </a:spcAft>
+              <a:buClr>
+                <a:srgbClr val="000000"/>
+              </a:buClr>
+              <a:buSzPts val="1400"/>
+              <a:buFont typeface="Arial"/>
+              <a:buChar char="■"/>
+              <a:defRPr sz="1400" b="0" i="0" u="none" strike="noStrike" cap="none">
+                <a:solidFill>
+                  <a:srgbClr val="000000"/>
+                </a:solidFill>
+                <a:latin typeface="Arial"/>
+                <a:ea typeface="Arial"/>
+                <a:cs typeface="Arial"/>
+                <a:sym typeface="Arial"/>
+              </a:defRPr>
+            </a:lvl9pPr>
+          </a:lstStyle>
+          <a:p>
+            <a:pPr marL="114300" indent="0">
+              <a:buFont typeface="Arial"/>
+              <a:buNone/>
+            </a:pPr>
+            <a:r>
+              <a:rPr lang="en-GB" sz="1400" dirty="0"/>
+              <a:t>Further descriptions: </a:t>
+            </a:r>
+            <a:r>
+              <a:rPr lang="en-GB" sz="1400" dirty="0">
+                <a:hlinkClick r:id="rId3"/>
+              </a:rPr>
+              <a:t>https://time-series-features.gitbook.io/catch22/information-about-catch22/feature-descriptions</a:t>
+            </a:r>
+            <a:endParaRPr lang="en-GB" sz="1400" dirty="0"/>
           </a:p>
         </p:txBody>
       </p:sp>
@@ -12274,6 +13031,558 @@
     <p:extLst>
       <p:ext uri="{BB962C8B-B14F-4D97-AF65-F5344CB8AC3E}">
         <p14:creationId xmlns:p14="http://schemas.microsoft.com/office/powerpoint/2010/main" val="2877408820"/>
+      </p:ext>
+    </p:extLst>
+  </p:cSld>
+  <p:clrMapOvr>
+    <a:masterClrMapping/>
+  </p:clrMapOvr>
+</p:sld>
+</file>
+
+<file path=ppt/slides/slide9.xml><?xml version="1.0" encoding="utf-8"?>
+<p:sld xmlns:a="http://schemas.openxmlformats.org/drawingml/2006/main" xmlns:r="http://schemas.openxmlformats.org/officeDocument/2006/relationships" xmlns:p="http://schemas.openxmlformats.org/presentationml/2006/main">
+  <p:cSld>
+    <p:spTree>
+      <p:nvGrpSpPr>
+        <p:cNvPr id="1" name=""/>
+        <p:cNvGrpSpPr/>
+        <p:nvPr/>
+      </p:nvGrpSpPr>
+      <p:grpSpPr>
+        <a:xfrm>
+          <a:off x="0" y="0"/>
+          <a:ext cx="0" cy="0"/>
+          <a:chOff x="0" y="0"/>
+          <a:chExt cx="0" cy="0"/>
+        </a:xfrm>
+      </p:grpSpPr>
+      <p:sp>
+        <p:nvSpPr>
+          <p:cNvPr id="2" name="Text Placeholder 1">
+            <a:extLst>
+              <a:ext uri="{FF2B5EF4-FFF2-40B4-BE49-F238E27FC236}">
+                <a16:creationId xmlns:a16="http://schemas.microsoft.com/office/drawing/2014/main" id="{4E2E7867-6C62-6814-B5A6-64F1AF853927}"/>
+              </a:ext>
+            </a:extLst>
+          </p:cNvPr>
+          <p:cNvSpPr>
+            <a:spLocks noGrp="1"/>
+          </p:cNvSpPr>
+          <p:nvPr>
+            <p:ph type="body" idx="1"/>
+          </p:nvPr>
+        </p:nvSpPr>
+        <p:spPr>
+          <a:xfrm>
+            <a:off x="549712" y="1514121"/>
+            <a:ext cx="5680400" cy="4555200"/>
+          </a:xfrm>
+        </p:spPr>
+        <p:txBody>
+          <a:bodyPr/>
+          <a:lstStyle/>
+          <a:p>
+            <a:pPr marL="114300" indent="0">
+              <a:buNone/>
+            </a:pPr>
+            <a:r>
+              <a:rPr lang="en-GB" sz="2000" b="1" dirty="0" err="1"/>
+              <a:t>TSFresh</a:t>
+            </a:r>
+            <a:r>
+              <a:rPr lang="en-GB" sz="2000" b="1" dirty="0"/>
+              <a:t> feature set</a:t>
+            </a:r>
+          </a:p>
+          <a:p>
+            <a:pPr marL="114300" indent="0">
+              <a:buFont typeface="Arial"/>
+              <a:buNone/>
+            </a:pPr>
+            <a:endParaRPr lang="en-GB" sz="2000" b="1" dirty="0"/>
+          </a:p>
+          <a:p>
+            <a:pPr marL="114300" indent="0">
+              <a:buFont typeface="Arial"/>
+              <a:buNone/>
+            </a:pPr>
+            <a:endParaRPr lang="en-GB" sz="2000" b="1" dirty="0"/>
+          </a:p>
+          <a:p>
+            <a:pPr marL="114300" indent="0">
+              <a:buFont typeface="Arial"/>
+              <a:buNone/>
+            </a:pPr>
+            <a:r>
+              <a:rPr lang="en-GB" sz="2000" dirty="0"/>
+              <a:t>Just under 800 features (no features selection).</a:t>
+            </a:r>
+          </a:p>
+          <a:p>
+            <a:pPr marL="114300" indent="0">
+              <a:buFont typeface="Arial"/>
+              <a:buNone/>
+            </a:pPr>
+            <a:endParaRPr lang="en-GB" sz="2000" dirty="0"/>
+          </a:p>
+          <a:p>
+            <a:pPr marL="114300" indent="0">
+              <a:buFont typeface="Arial"/>
+              <a:buNone/>
+            </a:pPr>
+            <a:r>
+              <a:rPr lang="en-GB" sz="2000" dirty="0"/>
+              <a:t>Implemented in Python.</a:t>
+            </a:r>
+          </a:p>
+          <a:p>
+            <a:pPr marL="114300" indent="0">
+              <a:buFont typeface="Arial"/>
+              <a:buNone/>
+            </a:pPr>
+            <a:endParaRPr lang="en-GB" sz="2000" dirty="0"/>
+          </a:p>
+          <a:p>
+            <a:pPr marL="114300" indent="0">
+              <a:buFont typeface="Arial"/>
+              <a:buNone/>
+            </a:pPr>
+            <a:r>
+              <a:rPr lang="en-GB" sz="2000" dirty="0"/>
+              <a:t>One of the more popular feature sets (Over 8000 GitHub start and 1000 citations)</a:t>
+            </a:r>
+          </a:p>
+          <a:p>
+            <a:pPr marL="114300" indent="0">
+              <a:buFont typeface="Arial"/>
+              <a:buNone/>
+            </a:pPr>
+            <a:endParaRPr lang="en-GB" sz="2000" dirty="0"/>
+          </a:p>
+          <a:p>
+            <a:pPr marL="114300" indent="0">
+              <a:buFont typeface="Arial"/>
+              <a:buNone/>
+            </a:pPr>
+            <a:endParaRPr lang="en-GB" sz="2000" dirty="0"/>
+          </a:p>
+          <a:p>
+            <a:pPr marL="114300" indent="0">
+              <a:buFont typeface="Arial"/>
+              <a:buNone/>
+            </a:pPr>
+            <a:r>
+              <a:rPr lang="en-GB" sz="2000" i="1" u="sng" dirty="0"/>
+              <a:t>https://github.com/blue-yonder/tsfresh</a:t>
+            </a:r>
+          </a:p>
+          <a:p>
+            <a:pPr marL="114300" indent="0">
+              <a:buNone/>
+            </a:pPr>
+            <a:endParaRPr lang="en-GB" sz="2000" dirty="0"/>
+          </a:p>
+        </p:txBody>
+      </p:sp>
+      <p:sp>
+        <p:nvSpPr>
+          <p:cNvPr id="3" name="Title 2">
+            <a:extLst>
+              <a:ext uri="{FF2B5EF4-FFF2-40B4-BE49-F238E27FC236}">
+                <a16:creationId xmlns:a16="http://schemas.microsoft.com/office/drawing/2014/main" id="{899533FC-BE2F-24D0-E4BA-AC770051A2B3}"/>
+              </a:ext>
+            </a:extLst>
+          </p:cNvPr>
+          <p:cNvSpPr>
+            <a:spLocks noGrp="1"/>
+          </p:cNvSpPr>
+          <p:nvPr>
+            <p:ph type="title"/>
+          </p:nvPr>
+        </p:nvSpPr>
+        <p:spPr/>
+        <p:txBody>
+          <a:bodyPr/>
+          <a:lstStyle/>
+          <a:p>
+            <a:pPr marL="114300" indent="0">
+              <a:buFont typeface="Arial"/>
+              <a:buNone/>
+            </a:pPr>
+            <a:r>
+              <a:rPr lang="en-GB" sz="2400" b="1" dirty="0"/>
+              <a:t>Time Series Feature extraction based on scalable hypothesis tests (</a:t>
+            </a:r>
+            <a:r>
+              <a:rPr lang="en-GB" sz="2400" b="1" dirty="0" err="1"/>
+              <a:t>TSFresh</a:t>
+            </a:r>
+            <a:r>
+              <a:rPr lang="en-GB" sz="2400" b="1" dirty="0"/>
+              <a:t>)</a:t>
+            </a:r>
+          </a:p>
+        </p:txBody>
+      </p:sp>
+      <p:pic>
+        <p:nvPicPr>
+          <p:cNvPr id="5" name="Picture 4">
+            <a:extLst>
+              <a:ext uri="{FF2B5EF4-FFF2-40B4-BE49-F238E27FC236}">
+                <a16:creationId xmlns:a16="http://schemas.microsoft.com/office/drawing/2014/main" id="{6A382F17-A944-C9CE-4792-2AD38277D8C0}"/>
+              </a:ext>
+            </a:extLst>
+          </p:cNvPr>
+          <p:cNvPicPr>
+            <a:picLocks noChangeAspect="1"/>
+          </p:cNvPicPr>
+          <p:nvPr/>
+        </p:nvPicPr>
+        <p:blipFill>
+          <a:blip r:embed="rId3"/>
+          <a:stretch>
+            <a:fillRect/>
+          </a:stretch>
+        </p:blipFill>
+        <p:spPr>
+          <a:xfrm>
+            <a:off x="7058586" y="2228489"/>
+            <a:ext cx="3931205" cy="2401021"/>
+          </a:xfrm>
+          <a:prstGeom prst="rect">
+            <a:avLst/>
+          </a:prstGeom>
+        </p:spPr>
+      </p:pic>
+      <p:sp>
+        <p:nvSpPr>
+          <p:cNvPr id="4" name="Text Placeholder 1">
+            <a:extLst>
+              <a:ext uri="{FF2B5EF4-FFF2-40B4-BE49-F238E27FC236}">
+                <a16:creationId xmlns:a16="http://schemas.microsoft.com/office/drawing/2014/main" id="{D5EE724A-60FD-D922-453C-9202E32FECE8}"/>
+              </a:ext>
+            </a:extLst>
+          </p:cNvPr>
+          <p:cNvSpPr txBox="1">
+            <a:spLocks/>
+          </p:cNvSpPr>
+          <p:nvPr/>
+        </p:nvSpPr>
+        <p:spPr>
+          <a:xfrm>
+            <a:off x="208336" y="6069321"/>
+            <a:ext cx="11568064" cy="597399"/>
+          </a:xfrm>
+          <a:prstGeom prst="rect">
+            <a:avLst/>
+          </a:prstGeom>
+        </p:spPr>
+        <p:txBody>
+          <a:bodyPr spcFirstLastPara="1" wrap="square" lIns="91425" tIns="91425" rIns="91425" bIns="91425" anchor="t" anchorCtr="0"/>
+          <a:lstStyle>
+            <a:defPPr marR="0" lvl="0" algn="l" rtl="0">
+              <a:lnSpc>
+                <a:spcPct val="100000"/>
+              </a:lnSpc>
+              <a:spcBef>
+                <a:spcPts val="0"/>
+              </a:spcBef>
+              <a:spcAft>
+                <a:spcPts val="0"/>
+              </a:spcAft>
+            </a:defPPr>
+            <a:lvl1pPr marL="457200" marR="0" lvl="0" indent="-342900" algn="l" rtl="0">
+              <a:lnSpc>
+                <a:spcPct val="100000"/>
+              </a:lnSpc>
+              <a:spcBef>
+                <a:spcPts val="0"/>
+              </a:spcBef>
+              <a:spcAft>
+                <a:spcPts val="0"/>
+              </a:spcAft>
+              <a:buClr>
+                <a:srgbClr val="500064"/>
+              </a:buClr>
+              <a:buSzPts val="1800"/>
+              <a:buFont typeface="Arial"/>
+              <a:buChar char="●"/>
+              <a:defRPr sz="1800" b="0" i="0" u="none" strike="noStrike" cap="none">
+                <a:solidFill>
+                  <a:schemeClr val="tx1"/>
+                </a:solidFill>
+                <a:latin typeface="Aptos" panose="020B0004020202020204" pitchFamily="34" charset="0"/>
+                <a:ea typeface="Arial"/>
+                <a:cs typeface="Arial"/>
+                <a:sym typeface="Arial"/>
+              </a:defRPr>
+            </a:lvl1pPr>
+            <a:lvl2pPr marL="914400" marR="0" lvl="1" indent="-317500" algn="l" rtl="0">
+              <a:lnSpc>
+                <a:spcPct val="100000"/>
+              </a:lnSpc>
+              <a:spcBef>
+                <a:spcPts val="1600"/>
+              </a:spcBef>
+              <a:spcAft>
+                <a:spcPts val="0"/>
+              </a:spcAft>
+              <a:buClr>
+                <a:srgbClr val="000000"/>
+              </a:buClr>
+              <a:buSzPts val="1400"/>
+              <a:buFont typeface="Arial"/>
+              <a:buChar char="○"/>
+              <a:defRPr sz="1400" b="0" i="0" u="none" strike="noStrike" cap="none">
+                <a:solidFill>
+                  <a:srgbClr val="000000"/>
+                </a:solidFill>
+                <a:latin typeface="Arial"/>
+                <a:ea typeface="Arial"/>
+                <a:cs typeface="Arial"/>
+                <a:sym typeface="Arial"/>
+              </a:defRPr>
+            </a:lvl2pPr>
+            <a:lvl3pPr marL="1371600" marR="0" lvl="2" indent="-317500" algn="l" rtl="0">
+              <a:lnSpc>
+                <a:spcPct val="100000"/>
+              </a:lnSpc>
+              <a:spcBef>
+                <a:spcPts val="1600"/>
+              </a:spcBef>
+              <a:spcAft>
+                <a:spcPts val="0"/>
+              </a:spcAft>
+              <a:buClr>
+                <a:srgbClr val="000000"/>
+              </a:buClr>
+              <a:buSzPts val="1400"/>
+              <a:buFont typeface="Arial"/>
+              <a:buChar char="■"/>
+              <a:defRPr sz="1400" b="0" i="0" u="none" strike="noStrike" cap="none">
+                <a:solidFill>
+                  <a:srgbClr val="000000"/>
+                </a:solidFill>
+                <a:latin typeface="Arial"/>
+                <a:ea typeface="Arial"/>
+                <a:cs typeface="Arial"/>
+                <a:sym typeface="Arial"/>
+              </a:defRPr>
+            </a:lvl3pPr>
+            <a:lvl4pPr marL="1828800" marR="0" lvl="3" indent="-317500" algn="l" rtl="0">
+              <a:lnSpc>
+                <a:spcPct val="100000"/>
+              </a:lnSpc>
+              <a:spcBef>
+                <a:spcPts val="1600"/>
+              </a:spcBef>
+              <a:spcAft>
+                <a:spcPts val="0"/>
+              </a:spcAft>
+              <a:buClr>
+                <a:srgbClr val="000000"/>
+              </a:buClr>
+              <a:buSzPts val="1400"/>
+              <a:buFont typeface="Arial"/>
+              <a:buChar char="●"/>
+              <a:defRPr sz="1400" b="0" i="0" u="none" strike="noStrike" cap="none">
+                <a:solidFill>
+                  <a:srgbClr val="000000"/>
+                </a:solidFill>
+                <a:latin typeface="Arial"/>
+                <a:ea typeface="Arial"/>
+                <a:cs typeface="Arial"/>
+                <a:sym typeface="Arial"/>
+              </a:defRPr>
+            </a:lvl4pPr>
+            <a:lvl5pPr marL="2286000" marR="0" lvl="4" indent="-317500" algn="l" rtl="0">
+              <a:lnSpc>
+                <a:spcPct val="100000"/>
+              </a:lnSpc>
+              <a:spcBef>
+                <a:spcPts val="1600"/>
+              </a:spcBef>
+              <a:spcAft>
+                <a:spcPts val="0"/>
+              </a:spcAft>
+              <a:buClr>
+                <a:srgbClr val="000000"/>
+              </a:buClr>
+              <a:buSzPts val="1400"/>
+              <a:buFont typeface="Arial"/>
+              <a:buChar char="○"/>
+              <a:defRPr sz="1400" b="0" i="0" u="none" strike="noStrike" cap="none">
+                <a:solidFill>
+                  <a:srgbClr val="000000"/>
+                </a:solidFill>
+                <a:latin typeface="Arial"/>
+                <a:ea typeface="Arial"/>
+                <a:cs typeface="Arial"/>
+                <a:sym typeface="Arial"/>
+              </a:defRPr>
+            </a:lvl5pPr>
+            <a:lvl6pPr marL="2743200" marR="0" lvl="5" indent="-317500" algn="l" rtl="0">
+              <a:lnSpc>
+                <a:spcPct val="100000"/>
+              </a:lnSpc>
+              <a:spcBef>
+                <a:spcPts val="1600"/>
+              </a:spcBef>
+              <a:spcAft>
+                <a:spcPts val="0"/>
+              </a:spcAft>
+              <a:buClr>
+                <a:srgbClr val="000000"/>
+              </a:buClr>
+              <a:buSzPts val="1400"/>
+              <a:buFont typeface="Arial"/>
+              <a:buChar char="■"/>
+              <a:defRPr sz="1400" b="0" i="0" u="none" strike="noStrike" cap="none">
+                <a:solidFill>
+                  <a:srgbClr val="000000"/>
+                </a:solidFill>
+                <a:latin typeface="Arial"/>
+                <a:ea typeface="Arial"/>
+                <a:cs typeface="Arial"/>
+                <a:sym typeface="Arial"/>
+              </a:defRPr>
+            </a:lvl6pPr>
+            <a:lvl7pPr marL="3200400" marR="0" lvl="6" indent="-317500" algn="l" rtl="0">
+              <a:lnSpc>
+                <a:spcPct val="100000"/>
+              </a:lnSpc>
+              <a:spcBef>
+                <a:spcPts val="1600"/>
+              </a:spcBef>
+              <a:spcAft>
+                <a:spcPts val="0"/>
+              </a:spcAft>
+              <a:buClr>
+                <a:srgbClr val="000000"/>
+              </a:buClr>
+              <a:buSzPts val="1400"/>
+              <a:buFont typeface="Arial"/>
+              <a:buChar char="●"/>
+              <a:defRPr sz="1400" b="0" i="0" u="none" strike="noStrike" cap="none">
+                <a:solidFill>
+                  <a:srgbClr val="000000"/>
+                </a:solidFill>
+                <a:latin typeface="Arial"/>
+                <a:ea typeface="Arial"/>
+                <a:cs typeface="Arial"/>
+                <a:sym typeface="Arial"/>
+              </a:defRPr>
+            </a:lvl7pPr>
+            <a:lvl8pPr marL="3657600" marR="0" lvl="7" indent="-317500" algn="l" rtl="0">
+              <a:lnSpc>
+                <a:spcPct val="100000"/>
+              </a:lnSpc>
+              <a:spcBef>
+                <a:spcPts val="1600"/>
+              </a:spcBef>
+              <a:spcAft>
+                <a:spcPts val="0"/>
+              </a:spcAft>
+              <a:buClr>
+                <a:srgbClr val="000000"/>
+              </a:buClr>
+              <a:buSzPts val="1400"/>
+              <a:buFont typeface="Arial"/>
+              <a:buChar char="○"/>
+              <a:defRPr sz="1400" b="0" i="0" u="none" strike="noStrike" cap="none">
+                <a:solidFill>
+                  <a:srgbClr val="000000"/>
+                </a:solidFill>
+                <a:latin typeface="Arial"/>
+                <a:ea typeface="Arial"/>
+                <a:cs typeface="Arial"/>
+                <a:sym typeface="Arial"/>
+              </a:defRPr>
+            </a:lvl8pPr>
+            <a:lvl9pPr marL="4114800" marR="0" lvl="8" indent="-317500" algn="l" rtl="0">
+              <a:lnSpc>
+                <a:spcPct val="100000"/>
+              </a:lnSpc>
+              <a:spcBef>
+                <a:spcPts val="1600"/>
+              </a:spcBef>
+              <a:spcAft>
+                <a:spcPts val="1600"/>
+              </a:spcAft>
+              <a:buClr>
+                <a:srgbClr val="000000"/>
+              </a:buClr>
+              <a:buSzPts val="1400"/>
+              <a:buFont typeface="Arial"/>
+              <a:buChar char="■"/>
+              <a:defRPr sz="1400" b="0" i="0" u="none" strike="noStrike" cap="none">
+                <a:solidFill>
+                  <a:srgbClr val="000000"/>
+                </a:solidFill>
+                <a:latin typeface="Arial"/>
+                <a:ea typeface="Arial"/>
+                <a:cs typeface="Arial"/>
+                <a:sym typeface="Arial"/>
+              </a:defRPr>
+            </a:lvl9pPr>
+          </a:lstStyle>
+          <a:p>
+            <a:pPr marL="114300" indent="0">
+              <a:buFont typeface="Arial"/>
+              <a:buNone/>
+            </a:pPr>
+            <a:r>
+              <a:rPr lang="en-GB" sz="1400" dirty="0"/>
+              <a:t>Christ, M., Braun, N., </a:t>
+            </a:r>
+            <a:r>
+              <a:rPr lang="en-GB" sz="1400" dirty="0" err="1"/>
+              <a:t>Neuffer</a:t>
+            </a:r>
+            <a:r>
+              <a:rPr lang="en-GB" sz="1400" dirty="0"/>
+              <a:t>, J. and </a:t>
+            </a:r>
+            <a:r>
+              <a:rPr lang="en-GB" sz="1400" dirty="0" err="1"/>
+              <a:t>Kempa-Liehr</a:t>
+            </a:r>
+            <a:r>
+              <a:rPr lang="en-GB" sz="1400" dirty="0"/>
+              <a:t>, A.W., 2018. Time series feature extraction on basis of scalable hypothesis tests (</a:t>
+            </a:r>
+            <a:r>
+              <a:rPr lang="en-GB" sz="1400" dirty="0" err="1"/>
+              <a:t>tsfresh</a:t>
+            </a:r>
+            <a:r>
+              <a:rPr lang="en-GB" sz="1400" dirty="0"/>
+              <a:t>–a python package). </a:t>
+            </a:r>
+            <a:r>
+              <a:rPr lang="en-GB" sz="1400" i="1" dirty="0"/>
+              <a:t>Neurocomputing</a:t>
+            </a:r>
+            <a:r>
+              <a:rPr lang="en-GB" sz="1400" dirty="0"/>
+              <a:t>, </a:t>
+            </a:r>
+            <a:r>
+              <a:rPr lang="en-GB" sz="1400" i="1" dirty="0"/>
+              <a:t>307</a:t>
+            </a:r>
+            <a:r>
+              <a:rPr lang="en-GB" sz="1400" dirty="0"/>
+              <a:t>, pp.72-77.</a:t>
+            </a:r>
+          </a:p>
+        </p:txBody>
+      </p:sp>
+    </p:spTree>
+    <p:extLst>
+      <p:ext uri="{BB962C8B-B14F-4D97-AF65-F5344CB8AC3E}">
+        <p14:creationId xmlns:p14="http://schemas.microsoft.com/office/powerpoint/2010/main" val="93847987"/>
       </p:ext>
     </p:extLst>
   </p:cSld>

</xml_diff>